<commit_message>
new images in ppt
</commit_message>
<xml_diff>
--- a/statnetWeb_slides.pptx
+++ b/statnetWeb_slides.pptx
@@ -208,10 +208,10 @@
                 <c:formatCode>General</c:formatCode>
                 <c:ptCount val="2"/>
                 <c:pt idx="0">
-                  <c:v>2</c:v>
+                  <c:v>2.0</c:v>
                 </c:pt>
                 <c:pt idx="1">
-                  <c:v>2</c:v>
+                  <c:v>2.0</c:v>
                 </c:pt>
               </c:numCache>
             </c:numRef>
@@ -262,10 +262,10 @@
                 <c:formatCode>General</c:formatCode>
                 <c:ptCount val="2"/>
                 <c:pt idx="0">
-                  <c:v>1</c:v>
+                  <c:v>1.0</c:v>
                 </c:pt>
                 <c:pt idx="1">
-                  <c:v>1</c:v>
+                  <c:v>1.0</c:v>
                 </c:pt>
               </c:numCache>
             </c:numRef>
@@ -316,10 +316,10 @@
                 <c:formatCode>General</c:formatCode>
                 <c:ptCount val="2"/>
                 <c:pt idx="0">
-                  <c:v>1</c:v>
+                  <c:v>1.0</c:v>
                 </c:pt>
                 <c:pt idx="1">
-                  <c:v>2</c:v>
+                  <c:v>2.0</c:v>
                 </c:pt>
               </c:numCache>
             </c:numRef>
@@ -370,10 +370,10 @@
                 <c:formatCode>General</c:formatCode>
                 <c:ptCount val="2"/>
                 <c:pt idx="0">
-                  <c:v>2</c:v>
+                  <c:v>2.0</c:v>
                 </c:pt>
                 <c:pt idx="1">
-                  <c:v>3</c:v>
+                  <c:v>3.0</c:v>
                 </c:pt>
               </c:numCache>
             </c:numRef>
@@ -424,10 +424,10 @@
                 <c:formatCode>General</c:formatCode>
                 <c:ptCount val="2"/>
                 <c:pt idx="0">
-                  <c:v>1</c:v>
+                  <c:v>1.0</c:v>
                 </c:pt>
                 <c:pt idx="1">
-                  <c:v>1</c:v>
+                  <c:v>1.0</c:v>
                 </c:pt>
               </c:numCache>
             </c:numRef>
@@ -478,10 +478,10 @@
                 <c:formatCode>General</c:formatCode>
                 <c:ptCount val="2"/>
                 <c:pt idx="0">
-                  <c:v>2</c:v>
+                  <c:v>2.0</c:v>
                 </c:pt>
                 <c:pt idx="1">
-                  <c:v>2</c:v>
+                  <c:v>2.0</c:v>
                 </c:pt>
               </c:numCache>
             </c:numRef>
@@ -534,10 +534,10 @@
                 <c:formatCode>General</c:formatCode>
                 <c:ptCount val="2"/>
                 <c:pt idx="0">
-                  <c:v>1</c:v>
+                  <c:v>1.0</c:v>
                 </c:pt>
                 <c:pt idx="1">
-                  <c:v>3</c:v>
+                  <c:v>3.0</c:v>
                 </c:pt>
               </c:numCache>
             </c:numRef>
@@ -553,11 +553,11 @@
         </c:dLbls>
         <c:gapWidth val="150"/>
         <c:overlap val="100"/>
-        <c:axId val="401753224"/>
-        <c:axId val="401750480"/>
+        <c:axId val="-2139935720"/>
+        <c:axId val="-2141564072"/>
       </c:barChart>
       <c:catAx>
-        <c:axId val="401753224"/>
+        <c:axId val="-2139935720"/>
         <c:scaling>
           <c:orientation val="minMax"/>
         </c:scaling>
@@ -600,7 +600,7 @@
             <a:endParaRPr lang="en-US"/>
           </a:p>
         </c:txPr>
-        <c:crossAx val="401750480"/>
+        <c:crossAx val="-2141564072"/>
         <c:crosses val="autoZero"/>
         <c:auto val="1"/>
         <c:lblAlgn val="ctr"/>
@@ -608,7 +608,7 @@
         <c:noMultiLvlLbl val="0"/>
       </c:catAx>
       <c:valAx>
-        <c:axId val="401750480"/>
+        <c:axId val="-2141564072"/>
         <c:scaling>
           <c:orientation val="minMax"/>
         </c:scaling>
@@ -659,7 +659,7 @@
             <a:endParaRPr lang="en-US"/>
           </a:p>
         </c:txPr>
-        <c:crossAx val="401753224"/>
+        <c:crossAx val="-2139935720"/>
         <c:crosses val="autoZero"/>
         <c:crossBetween val="between"/>
       </c:valAx>
@@ -724,7 +724,7 @@
       <a:endParaRPr lang="en-US"/>
     </a:p>
   </c:txPr>
-  <c:externalData r:id="rId3">
+  <c:externalData r:id="rId1">
     <c:autoUpdate val="0"/>
   </c:externalData>
 </c:chartSpace>
@@ -1517,7 +1517,7 @@
           <a:p>
             <a:fld id="{5A069CB8-F204-4D06-B913-C5A26A89888A}" type="datetimeFigureOut">
               <a:rPr lang="en-US" dirty="0"/>
-              <a:t>4/2/2015</a:t>
+              <a:t>4/3/15</a:t>
             </a:fld>
             <a:endParaRPr lang="en-US" dirty="0"/>
           </a:p>
@@ -1720,7 +1720,7 @@
           <a:p>
             <a:fld id="{50B6E300-0A13-4A81-945A-7333C271A069}" type="datetimeFigureOut">
               <a:rPr lang="en-US" dirty="0"/>
-              <a:t>4/2/2015</a:t>
+              <a:t>4/3/15</a:t>
             </a:fld>
             <a:endParaRPr lang="en-US" dirty="0"/>
           </a:p>
@@ -1971,7 +1971,7 @@
           <a:p>
             <a:fld id="{34671962-1EA4-46E7-BCB0-F36CE46D1A59}" type="datetimeFigureOut">
               <a:rPr lang="en-US" dirty="0"/>
-              <a:t>4/2/2015</a:t>
+              <a:t>4/3/15</a:t>
             </a:fld>
             <a:endParaRPr lang="en-US" dirty="0"/>
           </a:p>
@@ -2136,7 +2136,7 @@
           <a:p>
             <a:fld id="{D30BB376-B19C-488D-ABEB-03C7E6E9E3E0}" type="datetimeFigureOut">
               <a:rPr lang="en-US" dirty="0"/>
-              <a:t>4/2/2015</a:t>
+              <a:t>4/3/15</a:t>
             </a:fld>
             <a:endParaRPr lang="en-US" dirty="0"/>
           </a:p>
@@ -2474,7 +2474,7 @@
           <a:p>
             <a:fld id="{486F077B-A50F-4D64-8574-E2D6A98A5553}" type="datetimeFigureOut">
               <a:rPr lang="en-US" dirty="0"/>
-              <a:t>4/2/2015</a:t>
+              <a:t>4/3/15</a:t>
             </a:fld>
             <a:endParaRPr lang="en-US" dirty="0"/>
           </a:p>
@@ -2597,8 +2597,8 @@
         </p:nvSpPr>
         <p:spPr>
           <a:xfrm>
-            <a:off x="1097280" y="286603"/>
-            <a:ext cx="10058400" cy="1450757"/>
+            <a:off x="1097280" y="286604"/>
+            <a:ext cx="10058400" cy="890850"/>
           </a:xfrm>
         </p:spPr>
         <p:txBody>
@@ -2625,8 +2625,8 @@
         </p:nvSpPr>
         <p:spPr>
           <a:xfrm>
-            <a:off x="1097278" y="1845734"/>
-            <a:ext cx="4937760" cy="4023360"/>
+            <a:off x="1097278" y="1349440"/>
+            <a:ext cx="4937760" cy="4519654"/>
           </a:xfrm>
         </p:spPr>
         <p:txBody>
@@ -2682,8 +2682,8 @@
         </p:nvSpPr>
         <p:spPr>
           <a:xfrm>
-            <a:off x="6217920" y="1845735"/>
-            <a:ext cx="4937760" cy="4023360"/>
+            <a:off x="6217920" y="1349440"/>
+            <a:ext cx="4937760" cy="4519655"/>
           </a:xfrm>
         </p:spPr>
         <p:txBody>
@@ -2744,7 +2744,7 @@
           <a:p>
             <a:fld id="{7D9E2A62-1983-43A1-A163-D8AA46534C80}" type="datetimeFigureOut">
               <a:rPr lang="en-US" dirty="0"/>
-              <a:t>4/2/2015</a:t>
+              <a:t>4/3/15</a:t>
             </a:fld>
             <a:endParaRPr lang="en-US" dirty="0"/>
           </a:p>
@@ -2830,7 +2830,7 @@
         <p:spPr>
           <a:xfrm>
             <a:off x="1097280" y="286603"/>
-            <a:ext cx="10058400" cy="1450757"/>
+            <a:ext cx="10058400" cy="904079"/>
           </a:xfrm>
         </p:spPr>
         <p:txBody>
@@ -2857,7 +2857,7 @@
         </p:nvSpPr>
         <p:spPr>
           <a:xfrm>
-            <a:off x="1097280" y="1846052"/>
+            <a:off x="1097280" y="1343319"/>
             <a:ext cx="4937760" cy="736282"/>
           </a:xfrm>
         </p:spPr>
@@ -2928,8 +2928,8 @@
         </p:nvSpPr>
         <p:spPr>
           <a:xfrm>
-            <a:off x="1097280" y="2582334"/>
-            <a:ext cx="4937760" cy="3378200"/>
+            <a:off x="1097280" y="2077079"/>
+            <a:ext cx="4937760" cy="3883455"/>
           </a:xfrm>
         </p:spPr>
         <p:txBody>
@@ -2985,7 +2985,7 @@
         </p:nvSpPr>
         <p:spPr>
           <a:xfrm>
-            <a:off x="6217920" y="1846052"/>
+            <a:off x="6217920" y="1343320"/>
             <a:ext cx="4937760" cy="736282"/>
           </a:xfrm>
         </p:spPr>
@@ -3056,8 +3056,8 @@
         </p:nvSpPr>
         <p:spPr>
           <a:xfrm>
-            <a:off x="6217920" y="2582334"/>
-            <a:ext cx="4937760" cy="3378200"/>
+            <a:off x="6217920" y="2077079"/>
+            <a:ext cx="4937760" cy="3883455"/>
           </a:xfrm>
         </p:spPr>
         <p:txBody>
@@ -3066,35 +3066,35 @@
           <a:p>
             <a:pPr lvl="0"/>
             <a:r>
-              <a:rPr lang="en-US" smtClean="0"/>
+              <a:rPr lang="en-US" dirty="0" smtClean="0"/>
               <a:t>Click to edit Master text styles</a:t>
             </a:r>
           </a:p>
           <a:p>
             <a:pPr lvl="1"/>
             <a:r>
-              <a:rPr lang="en-US" smtClean="0"/>
+              <a:rPr lang="en-US" dirty="0" smtClean="0"/>
               <a:t>Second level</a:t>
             </a:r>
           </a:p>
           <a:p>
             <a:pPr lvl="2"/>
             <a:r>
-              <a:rPr lang="en-US" smtClean="0"/>
+              <a:rPr lang="en-US" dirty="0" smtClean="0"/>
               <a:t>Third level</a:t>
             </a:r>
           </a:p>
           <a:p>
             <a:pPr lvl="3"/>
             <a:r>
-              <a:rPr lang="en-US" smtClean="0"/>
+              <a:rPr lang="en-US" dirty="0" smtClean="0"/>
               <a:t>Fourth level</a:t>
             </a:r>
           </a:p>
           <a:p>
             <a:pPr lvl="4"/>
             <a:r>
-              <a:rPr lang="en-US" smtClean="0"/>
+              <a:rPr lang="en-US" dirty="0" smtClean="0"/>
               <a:t>Fifth level</a:t>
             </a:r>
             <a:endParaRPr lang="en-US" dirty="0"/>
@@ -3118,7 +3118,7 @@
           <a:p>
             <a:fld id="{898F3E3B-34E3-4345-B2A1-994B83598A9C}" type="datetimeFigureOut">
               <a:rPr lang="en-US" dirty="0"/>
-              <a:t>4/2/2015</a:t>
+              <a:t>4/3/15</a:t>
             </a:fld>
             <a:endParaRPr lang="en-US" dirty="0"/>
           </a:p>
@@ -3231,7 +3231,7 @@
           <a:p>
             <a:fld id="{FD816C96-82A1-4D77-8ADA-627AC6FE3D65}" type="datetimeFigureOut">
               <a:rPr lang="en-US" dirty="0"/>
-              <a:t>4/2/2015</a:t>
+              <a:t>4/3/15</a:t>
             </a:fld>
             <a:endParaRPr lang="en-US" dirty="0"/>
           </a:p>
@@ -3397,7 +3397,7 @@
           <a:p>
             <a:fld id="{1D102C1E-28F2-47E9-802D-339E64E2F920}" type="datetimeFigureOut">
               <a:rPr lang="en-US" dirty="0"/>
-              <a:t>4/2/2015</a:t>
+              <a:t>4/3/15</a:t>
             </a:fld>
             <a:endParaRPr lang="en-US" dirty="0"/>
           </a:p>
@@ -3747,7 +3747,7 @@
           <a:p>
             <a:fld id="{24271A48-F18A-45B3-BC05-1E27DA3F88AF}" type="datetimeFigureOut">
               <a:rPr lang="en-US" dirty="0"/>
-              <a:t>4/2/2015</a:t>
+              <a:t>4/3/15</a:t>
             </a:fld>
             <a:endParaRPr lang="en-US" dirty="0"/>
           </a:p>
@@ -4120,7 +4120,7 @@
           <a:p>
             <a:fld id="{65B747F8-9654-4282-85D2-65F41AAE7A75}" type="datetimeFigureOut">
               <a:rPr lang="en-US" dirty="0"/>
-              <a:t>4/2/2015</a:t>
+              <a:t>4/3/15</a:t>
             </a:fld>
             <a:endParaRPr lang="en-US" dirty="0"/>
           </a:p>
@@ -4287,7 +4287,7 @@
         <p:spPr>
           <a:xfrm>
             <a:off x="1097280" y="286603"/>
-            <a:ext cx="10058400" cy="1450757"/>
+            <a:ext cx="10058400" cy="904079"/>
           </a:xfrm>
           <a:prstGeom prst="rect">
             <a:avLst/>
@@ -4300,7 +4300,7 @@
           <a:lstStyle/>
           <a:p>
             <a:r>
-              <a:rPr lang="en-US" smtClean="0"/>
+              <a:rPr lang="en-US" dirty="0" smtClean="0"/>
               <a:t>Click to edit Master title style</a:t>
             </a:r>
             <a:endParaRPr lang="en-US" dirty="0"/>
@@ -4319,8 +4319,8 @@
         </p:nvSpPr>
         <p:spPr>
           <a:xfrm>
-            <a:off x="1097280" y="1845734"/>
-            <a:ext cx="10058400" cy="4023360"/>
+            <a:off x="1097280" y="1494968"/>
+            <a:ext cx="10058400" cy="4374126"/>
           </a:xfrm>
           <a:prstGeom prst="rect">
             <a:avLst/>
@@ -4402,7 +4402,7 @@
           <a:p>
             <a:fld id="{5DC5B261-8843-42D1-AAFC-05E20E2D9B97}" type="datetimeFigureOut">
               <a:rPr lang="en-US" dirty="0"/>
-              <a:t>4/2/2015</a:t>
+              <a:t>4/3/15</a:t>
             </a:fld>
             <a:endParaRPr lang="en-US" dirty="0"/>
           </a:p>
@@ -4491,7 +4491,7 @@
         </p:nvCxnSpPr>
         <p:spPr>
           <a:xfrm>
-            <a:off x="1193532" y="1737845"/>
+            <a:off x="1114159" y="1221883"/>
             <a:ext cx="9966960" cy="0"/>
           </a:xfrm>
           <a:prstGeom prst="line">
@@ -5712,34 +5712,104 @@
             <p:ph sz="half" idx="1"/>
           </p:nvPr>
         </p:nvSpPr>
-        <p:spPr/>
+        <p:spPr>
+          <a:xfrm>
+            <a:off x="1097277" y="1349440"/>
+            <a:ext cx="4696941" cy="4519654"/>
+          </a:xfrm>
+        </p:spPr>
         <p:txBody>
           <a:bodyPr/>
           <a:lstStyle/>
           <a:p>
-            <a:endParaRPr lang="en-US"/>
-          </a:p>
-        </p:txBody>
-      </p:sp>
-      <p:sp>
-        <p:nvSpPr>
-          <p:cNvPr id="5" name="Content Placeholder 4"/>
-          <p:cNvSpPr>
-            <a:spLocks noGrp="1"/>
-          </p:cNvSpPr>
-          <p:nvPr>
-            <p:ph sz="half" idx="2"/>
-          </p:nvPr>
-        </p:nvSpPr>
-        <p:spPr/>
-        <p:txBody>
-          <a:bodyPr/>
-          <a:lstStyle/>
-          <a:p>
-            <a:endParaRPr lang="en-US"/>
-          </a:p>
-        </p:txBody>
-      </p:sp>
+            <a:r>
+              <a:rPr lang="en-US" dirty="0" err="1" smtClean="0"/>
+              <a:t>statnetWeb</a:t>
+            </a:r>
+            <a:r>
+              <a:rPr lang="en-US" dirty="0" smtClean="0"/>
+              <a:t> is an interactive web application </a:t>
+            </a:r>
+            <a:r>
+              <a:rPr lang="en-US" dirty="0"/>
+              <a:t>for social network </a:t>
+            </a:r>
+            <a:r>
+              <a:rPr lang="en-US" dirty="0" smtClean="0"/>
+              <a:t>analysis.</a:t>
+            </a:r>
+          </a:p>
+          <a:p>
+            <a:r>
+              <a:rPr lang="en-US" dirty="0" smtClean="0"/>
+              <a:t>Users </a:t>
+            </a:r>
+            <a:r>
+              <a:rPr lang="en-US" dirty="0"/>
+              <a:t>can perform complete analyses of relational data </a:t>
+            </a:r>
+            <a:endParaRPr lang="en-US" dirty="0" smtClean="0"/>
+          </a:p>
+          <a:p>
+            <a:pPr lvl="1"/>
+            <a:r>
+              <a:rPr lang="en-US" dirty="0" smtClean="0"/>
+              <a:t>Network visualization</a:t>
+            </a:r>
+          </a:p>
+          <a:p>
+            <a:pPr lvl="1"/>
+            <a:r>
+              <a:rPr lang="en-US" dirty="0" smtClean="0"/>
+              <a:t>Model estimation and evaluation</a:t>
+            </a:r>
+          </a:p>
+          <a:p>
+            <a:pPr lvl="1"/>
+            <a:r>
+              <a:rPr lang="en-US" dirty="0" smtClean="0"/>
+              <a:t>Model-based simulation</a:t>
+            </a:r>
+          </a:p>
+          <a:p>
+            <a:r>
+              <a:rPr lang="en-US" dirty="0" smtClean="0"/>
+              <a:t>And download results and figures throughout the process</a:t>
+            </a:r>
+            <a:endParaRPr lang="en-US" dirty="0"/>
+          </a:p>
+        </p:txBody>
+      </p:sp>
+      <p:pic>
+        <p:nvPicPr>
+          <p:cNvPr id="8" name="Picture 7" descr="mesa_racegrade.png"/>
+          <p:cNvPicPr>
+            <a:picLocks noChangeAspect="1"/>
+          </p:cNvPicPr>
+          <p:nvPr/>
+        </p:nvPicPr>
+        <p:blipFill>
+          <a:blip r:embed="rId2">
+            <a:extLst>
+              <a:ext uri="{28A0092B-C50C-407E-A947-70E740481C1C}">
+                <a14:useLocalDpi xmlns:a14="http://schemas.microsoft.com/office/drawing/2010/main" val="0"/>
+              </a:ext>
+            </a:extLst>
+          </a:blip>
+          <a:stretch>
+            <a:fillRect/>
+          </a:stretch>
+        </p:blipFill>
+        <p:spPr>
+          <a:xfrm>
+            <a:off x="6361028" y="1245958"/>
+            <a:ext cx="4499824" cy="4240411"/>
+          </a:xfrm>
+          <a:prstGeom prst="rect">
+            <a:avLst/>
+          </a:prstGeom>
+        </p:spPr>
+      </p:pic>
     </p:spTree>
     <p:extLst>
       <p:ext uri="{BB962C8B-B14F-4D97-AF65-F5344CB8AC3E}">
@@ -5803,31 +5873,52 @@
             <p:ph sz="half" idx="1"/>
           </p:nvPr>
         </p:nvSpPr>
-        <p:spPr/>
+        <p:spPr>
+          <a:xfrm>
+            <a:off x="1097278" y="1349440"/>
+            <a:ext cx="10001692" cy="4519654"/>
+          </a:xfrm>
+        </p:spPr>
         <p:txBody>
           <a:bodyPr/>
           <a:lstStyle/>
           <a:p>
-            <a:endParaRPr lang="en-US"/>
-          </a:p>
-        </p:txBody>
-      </p:sp>
-      <p:sp>
-        <p:nvSpPr>
-          <p:cNvPr id="4" name="Content Placeholder 3"/>
-          <p:cNvSpPr>
-            <a:spLocks noGrp="1"/>
-          </p:cNvSpPr>
-          <p:nvPr>
-            <p:ph sz="half" idx="2"/>
-          </p:nvPr>
-        </p:nvSpPr>
-        <p:spPr/>
-        <p:txBody>
-          <a:bodyPr/>
-          <a:lstStyle/>
-          <a:p>
-            <a:endParaRPr lang="en-US"/>
+            <a:r>
+              <a:rPr lang="en-US" dirty="0"/>
+              <a:t>Network analysis techniques have progressed immensely over the past 60 years and continue to develop quickly</a:t>
+            </a:r>
+            <a:r>
+              <a:rPr lang="en-US" dirty="0" smtClean="0"/>
+              <a:t>.</a:t>
+            </a:r>
+          </a:p>
+          <a:p>
+            <a:pPr lvl="1"/>
+            <a:r>
+              <a:rPr lang="en-US" dirty="0" smtClean="0"/>
+              <a:t>Command line </a:t>
+            </a:r>
+            <a:r>
+              <a:rPr lang="en-US" smtClean="0"/>
+              <a:t>programs: flexible </a:t>
+            </a:r>
+            <a:r>
+              <a:rPr lang="en-US" dirty="0" smtClean="0"/>
+              <a:t>analysis possibilities, requires </a:t>
+            </a:r>
+            <a:r>
+              <a:rPr lang="en-US" smtClean="0"/>
+              <a:t>initial investment </a:t>
+            </a:r>
+            <a:endParaRPr lang="en-US" dirty="0" smtClean="0"/>
+          </a:p>
+          <a:p>
+            <a:pPr lvl="1"/>
+            <a:r>
+              <a:rPr lang="en-US" dirty="0" smtClean="0"/>
+              <a:t>GUI-based programs: available to wider audience, limited analysis possibilities</a:t>
+            </a:r>
+            <a:endParaRPr lang="en-US" dirty="0"/>
           </a:p>
         </p:txBody>
       </p:sp>
@@ -5896,8 +5987,8 @@
         </p:nvSpPr>
         <p:spPr>
           <a:xfrm>
-            <a:off x="1097280" y="2481942"/>
-            <a:ext cx="4937760" cy="3478591"/>
+            <a:off x="1097280" y="1786024"/>
+            <a:ext cx="4937760" cy="4174509"/>
           </a:xfrm>
         </p:spPr>
         <p:txBody>
@@ -5987,13 +6078,13 @@
             <p:ph sz="quarter" idx="4"/>
             <p:extLst>
               <p:ext uri="{D42A27DB-BD31-4B8C-83A1-F6EECF244321}">
-                <p14:modId xmlns:p14="http://schemas.microsoft.com/office/powerpoint/2010/main" val="3017241568"/>
+                <p14:modId xmlns:p14="http://schemas.microsoft.com/office/powerpoint/2010/main" val="2413052801"/>
               </p:ext>
             </p:extLst>
           </p:nvPr>
         </p:nvGraphicFramePr>
         <p:xfrm>
-          <a:off x="4332514" y="1926771"/>
+          <a:off x="4544175" y="1609255"/>
           <a:ext cx="6822849" cy="4034292"/>
         </p:xfrm>
         <a:graphic>
@@ -6667,32 +6758,39 @@
             <p:ph type="title"/>
           </p:nvPr>
         </p:nvSpPr>
+        <p:spPr>
+          <a:xfrm>
+            <a:off x="1097280" y="286604"/>
+            <a:ext cx="10058400" cy="890850"/>
+          </a:xfrm>
+        </p:spPr>
+        <p:txBody>
+          <a:bodyPr/>
+          <a:lstStyle/>
+          <a:p>
+            <a:r>
+              <a:rPr lang="en-US" dirty="0" smtClean="0"/>
+              <a:t>Network Descriptives</a:t>
+            </a:r>
+            <a:endParaRPr lang="en-US" dirty="0"/>
+          </a:p>
+        </p:txBody>
+      </p:sp>
+      <p:sp>
+        <p:nvSpPr>
+          <p:cNvPr id="3" name="Content Placeholder 2"/>
+          <p:cNvSpPr>
+            <a:spLocks noGrp="1"/>
+          </p:cNvSpPr>
+          <p:nvPr>
+            <p:ph sz="half" idx="1"/>
+          </p:nvPr>
+        </p:nvSpPr>
         <p:spPr/>
         <p:txBody>
-          <a:bodyPr/>
-          <a:lstStyle/>
-          <a:p>
-            <a:r>
-              <a:rPr lang="en-US" dirty="0" smtClean="0"/>
-              <a:t>Network Descriptives</a:t>
-            </a:r>
-            <a:endParaRPr lang="en-US" dirty="0"/>
-          </a:p>
-        </p:txBody>
-      </p:sp>
-      <p:sp>
-        <p:nvSpPr>
-          <p:cNvPr id="3" name="Content Placeholder 2"/>
-          <p:cNvSpPr>
-            <a:spLocks noGrp="1"/>
-          </p:cNvSpPr>
-          <p:nvPr>
-            <p:ph sz="half" idx="1"/>
-          </p:nvPr>
-        </p:nvSpPr>
-        <p:spPr/>
-        <p:txBody>
-          <a:bodyPr/>
+          <a:bodyPr>
+            <a:normAutofit/>
+          </a:bodyPr>
           <a:lstStyle/>
           <a:p>
             <a:r>
@@ -6773,7 +6871,9 @@
         </p:nvSpPr>
         <p:spPr/>
         <p:txBody>
-          <a:bodyPr/>
+          <a:bodyPr>
+            <a:normAutofit/>
+          </a:bodyPr>
           <a:lstStyle/>
           <a:p>
             <a:r>
@@ -6803,9 +6903,33 @@
           </a:p>
           <a:p>
             <a:pPr lvl="1"/>
-            <a:r>
-              <a:rPr lang="en-US" dirty="0" smtClean="0"/>
-              <a:t>Play around with color-coding the nodes</a:t>
+            <a:endParaRPr lang="en-US" dirty="0" smtClean="0"/>
+          </a:p>
+          <a:p>
+            <a:pPr lvl="1"/>
+            <a:endParaRPr lang="en-US" dirty="0" smtClean="0"/>
+          </a:p>
+          <a:p>
+            <a:pPr lvl="1"/>
+            <a:endParaRPr lang="en-US" dirty="0" smtClean="0"/>
+          </a:p>
+          <a:p>
+            <a:pPr lvl="1"/>
+            <a:endParaRPr lang="en-US" dirty="0"/>
+          </a:p>
+          <a:p>
+            <a:pPr lvl="1"/>
+            <a:endParaRPr lang="en-US" dirty="0"/>
+          </a:p>
+          <a:p>
+            <a:pPr lvl="1"/>
+            <a:r>
+              <a:rPr lang="en-US" dirty="0" smtClean="0"/>
+              <a:t>Play </a:t>
+            </a:r>
+            <a:r>
+              <a:rPr lang="en-US" dirty="0" smtClean="0"/>
+              <a:t>around with color-coding the nodes</a:t>
             </a:r>
           </a:p>
           <a:p>
@@ -6829,6 +6953,7 @@
               <a:rPr lang="en-US" dirty="0" smtClean="0"/>
               <a:t>.</a:t>
             </a:r>
+            <a:endParaRPr lang="en-US" dirty="0" smtClean="0"/>
           </a:p>
           <a:p>
             <a:r>
@@ -6841,6 +6966,102 @@
           </a:p>
         </p:txBody>
       </p:sp>
+      <p:pic>
+        <p:nvPicPr>
+          <p:cNvPr id="5" name="Picture 4" descr="sw_nwplot.png"/>
+          <p:cNvPicPr>
+            <a:picLocks noChangeAspect="1"/>
+          </p:cNvPicPr>
+          <p:nvPr/>
+        </p:nvPicPr>
+        <p:blipFill>
+          <a:blip r:embed="rId2">
+            <a:extLst>
+              <a:ext uri="{28A0092B-C50C-407E-A947-70E740481C1C}">
+                <a14:useLocalDpi xmlns:a14="http://schemas.microsoft.com/office/drawing/2010/main" val="0"/>
+              </a:ext>
+            </a:extLst>
+          </a:blip>
+          <a:stretch>
+            <a:fillRect/>
+          </a:stretch>
+        </p:blipFill>
+        <p:spPr>
+          <a:xfrm>
+            <a:off x="7064183" y="1993667"/>
+            <a:ext cx="2997978" cy="1525832"/>
+          </a:xfrm>
+          <a:prstGeom prst="rect">
+            <a:avLst/>
+          </a:prstGeom>
+        </p:spPr>
+      </p:pic>
+      <p:cxnSp>
+        <p:nvCxnSpPr>
+          <p:cNvPr id="7" name="Straight Arrow Connector 6"/>
+          <p:cNvCxnSpPr/>
+          <p:nvPr/>
+        </p:nvCxnSpPr>
+        <p:spPr>
+          <a:xfrm flipH="1">
+            <a:off x="9868691" y="2884097"/>
+            <a:ext cx="648211" cy="79379"/>
+          </a:xfrm>
+          <a:prstGeom prst="straightConnector1">
+            <a:avLst/>
+          </a:prstGeom>
+          <a:ln>
+            <a:tailEnd type="arrow"/>
+          </a:ln>
+        </p:spPr>
+        <p:style>
+          <a:lnRef idx="2">
+            <a:schemeClr val="accent1"/>
+          </a:lnRef>
+          <a:fillRef idx="0">
+            <a:schemeClr val="accent1"/>
+          </a:fillRef>
+          <a:effectRef idx="1">
+            <a:schemeClr val="accent1"/>
+          </a:effectRef>
+          <a:fontRef idx="minor">
+            <a:schemeClr val="tx1"/>
+          </a:fontRef>
+        </p:style>
+      </p:cxnSp>
+      <p:cxnSp>
+        <p:nvCxnSpPr>
+          <p:cNvPr id="9" name="Straight Arrow Connector 8"/>
+          <p:cNvCxnSpPr/>
+          <p:nvPr/>
+        </p:nvCxnSpPr>
+        <p:spPr>
+          <a:xfrm flipH="1" flipV="1">
+            <a:off x="9868691" y="3188383"/>
+            <a:ext cx="542381" cy="52919"/>
+          </a:xfrm>
+          <a:prstGeom prst="straightConnector1">
+            <a:avLst/>
+          </a:prstGeom>
+          <a:ln>
+            <a:tailEnd type="arrow"/>
+          </a:ln>
+        </p:spPr>
+        <p:style>
+          <a:lnRef idx="2">
+            <a:schemeClr val="accent1"/>
+          </a:lnRef>
+          <a:fillRef idx="0">
+            <a:schemeClr val="accent1"/>
+          </a:fillRef>
+          <a:effectRef idx="1">
+            <a:schemeClr val="accent1"/>
+          </a:effectRef>
+          <a:fontRef idx="minor">
+            <a:schemeClr val="tx1"/>
+          </a:fontRef>
+        </p:style>
+      </p:cxnSp>
     </p:spTree>
     <p:extLst>
       <p:ext uri="{BB962C8B-B14F-4D97-AF65-F5344CB8AC3E}">
@@ -6974,7 +7195,7 @@
 <file path=ppt/theme/theme1.xml><?xml version="1.0" encoding="utf-8"?>
 <a:theme xmlns:a="http://schemas.openxmlformats.org/drawingml/2006/main" name="Retrospect">
   <a:themeElements>
-    <a:clrScheme name="Retrospect">
+    <a:clrScheme name="Plaza">
       <a:dk1>
         <a:sysClr val="windowText" lastClr="000000"/>
       </a:dk1>
@@ -6982,39 +7203,39 @@
         <a:sysClr val="window" lastClr="FFFFFF"/>
       </a:lt1>
       <a:dk2>
-        <a:srgbClr val="696464"/>
+        <a:srgbClr val="333333"/>
       </a:dk2>
       <a:lt2>
-        <a:srgbClr val="E9E5DC"/>
+        <a:srgbClr val="CCCCCC"/>
       </a:lt2>
       <a:accent1>
-        <a:srgbClr val="D34817"/>
+        <a:srgbClr val="990000"/>
       </a:accent1>
       <a:accent2>
-        <a:srgbClr val="9B2D1F"/>
+        <a:srgbClr val="580101"/>
       </a:accent2>
       <a:accent3>
-        <a:srgbClr val="A28E6A"/>
+        <a:srgbClr val="E94A00"/>
       </a:accent3>
       <a:accent4>
-        <a:srgbClr val="956251"/>
+        <a:srgbClr val="EB8F00"/>
       </a:accent4>
       <a:accent5>
-        <a:srgbClr val="918485"/>
+        <a:srgbClr val="A4A4A4"/>
       </a:accent5>
       <a:accent6>
-        <a:srgbClr val="855D5D"/>
+        <a:srgbClr val="666666"/>
       </a:accent6>
       <a:hlink>
-        <a:srgbClr val="CC9900"/>
+        <a:srgbClr val="D01010"/>
       </a:hlink>
       <a:folHlink>
-        <a:srgbClr val="96A9A9"/>
+        <a:srgbClr val="E6682E"/>
       </a:folHlink>
     </a:clrScheme>
-    <a:fontScheme name="Retrospect">
+    <a:fontScheme name="Office">
       <a:majorFont>
-        <a:latin typeface="Calibri Light" panose="020F0302020204030204"/>
+        <a:latin typeface="Calibri"/>
         <a:ea typeface=""/>
         <a:cs typeface=""/>
         <a:font script="Jpan" typeface="ＭＳ Ｐゴシック"/>
@@ -7049,7 +7270,7 @@
         <a:font script="Geor" typeface="Sylfaen"/>
       </a:majorFont>
       <a:minorFont>
-        <a:latin typeface="Calibri" panose="020F0502020204030204"/>
+        <a:latin typeface="Calibri"/>
         <a:ea typeface=""/>
         <a:cs typeface=""/>
         <a:font script="Jpan" typeface="ＭＳ Ｐゴシック"/>
@@ -7248,7 +7469,7 @@
   <a:extraClrSchemeLst/>
   <a:extLst>
     <a:ext uri="{05A4C25C-085E-4340-85A3-A5531E510DB2}">
-      <thm15:themeFamily xmlns:thm15="http://schemas.microsoft.com/office/thememl/2012/main" name="Retrospect" id="{5F128B03-DCCA-4EEB-AB3B-CF2899314A46}" vid="{02006FA4-1611-4B07-AF7F-85CF6D20EB3E}"/>
+      <thm15:themeFamily xmlns:thm15="http://schemas.microsoft.com/office/thememl/2012/main" xmlns="" name="Retrospect" id="{5F128B03-DCCA-4EEB-AB3B-CF2899314A46}" vid="{02006FA4-1611-4B07-AF7F-85CF6D20EB3E}"/>
     </a:ext>
   </a:extLst>
 </a:theme>

</xml_diff>

<commit_message>
new slides and images
</commit_message>
<xml_diff>
--- a/statnetWeb_slides.pptx
+++ b/statnetWeb_slides.pptx
@@ -8,16 +8,19 @@
     <p:sldId id="256" r:id="rId2"/>
     <p:sldId id="257" r:id="rId3"/>
     <p:sldId id="258" r:id="rId4"/>
-    <p:sldId id="259" r:id="rId5"/>
-    <p:sldId id="260" r:id="rId6"/>
-    <p:sldId id="261" r:id="rId7"/>
-    <p:sldId id="267" r:id="rId8"/>
-    <p:sldId id="262" r:id="rId9"/>
-    <p:sldId id="268" r:id="rId10"/>
-    <p:sldId id="263" r:id="rId11"/>
-    <p:sldId id="264" r:id="rId12"/>
-    <p:sldId id="265" r:id="rId13"/>
-    <p:sldId id="266" r:id="rId14"/>
+    <p:sldId id="270" r:id="rId5"/>
+    <p:sldId id="259" r:id="rId6"/>
+    <p:sldId id="260" r:id="rId7"/>
+    <p:sldId id="261" r:id="rId8"/>
+    <p:sldId id="267" r:id="rId9"/>
+    <p:sldId id="262" r:id="rId10"/>
+    <p:sldId id="269" r:id="rId11"/>
+    <p:sldId id="268" r:id="rId12"/>
+    <p:sldId id="271" r:id="rId13"/>
+    <p:sldId id="263" r:id="rId14"/>
+    <p:sldId id="264" r:id="rId15"/>
+    <p:sldId id="265" r:id="rId16"/>
+    <p:sldId id="266" r:id="rId17"/>
   </p:sldIdLst>
   <p:sldSz cx="12192000" cy="6858000"/>
   <p:notesSz cx="6858000" cy="9144000"/>
@@ -124,12 +127,15 @@
             <p14:sldId id="256"/>
             <p14:sldId id="257"/>
             <p14:sldId id="258"/>
+            <p14:sldId id="270"/>
             <p14:sldId id="259"/>
             <p14:sldId id="260"/>
             <p14:sldId id="261"/>
             <p14:sldId id="267"/>
             <p14:sldId id="262"/>
+            <p14:sldId id="269"/>
             <p14:sldId id="268"/>
+            <p14:sldId id="271"/>
             <p14:sldId id="263"/>
             <p14:sldId id="264"/>
             <p14:sldId id="265"/>
@@ -553,11 +559,11 @@
         </c:dLbls>
         <c:gapWidth val="150"/>
         <c:overlap val="100"/>
-        <c:axId val="-2139935720"/>
-        <c:axId val="-2141564072"/>
+        <c:axId val="2123506664"/>
+        <c:axId val="2123510200"/>
       </c:barChart>
       <c:catAx>
-        <c:axId val="-2139935720"/>
+        <c:axId val="2123506664"/>
         <c:scaling>
           <c:orientation val="minMax"/>
         </c:scaling>
@@ -600,7 +606,7 @@
             <a:endParaRPr lang="en-US"/>
           </a:p>
         </c:txPr>
-        <c:crossAx val="-2141564072"/>
+        <c:crossAx val="2123510200"/>
         <c:crosses val="autoZero"/>
         <c:auto val="1"/>
         <c:lblAlgn val="ctr"/>
@@ -608,7 +614,7 @@
         <c:noMultiLvlLbl val="0"/>
       </c:catAx>
       <c:valAx>
-        <c:axId val="-2141564072"/>
+        <c:axId val="2123510200"/>
         <c:scaling>
           <c:orientation val="minMax"/>
         </c:scaling>
@@ -659,7 +665,7 @@
             <a:endParaRPr lang="en-US"/>
           </a:p>
         </c:txPr>
-        <c:crossAx val="-2139935720"/>
+        <c:crossAx val="2123506664"/>
         <c:crosses val="autoZero"/>
         <c:crossBetween val="between"/>
       </c:valAx>
@@ -5332,7 +5338,11 @@
           <a:p>
             <a:r>
               <a:rPr lang="en-US" dirty="0" smtClean="0"/>
-              <a:t>Statistical Models</a:t>
+              <a:t>Network </a:t>
+            </a:r>
+            <a:r>
+              <a:rPr lang="en-US" dirty="0" err="1" smtClean="0"/>
+              <a:t>Descriptives</a:t>
             </a:r>
             <a:endParaRPr lang="en-US" dirty="0"/>
           </a:p>
@@ -5353,13 +5363,72 @@
           <a:bodyPr/>
           <a:lstStyle/>
           <a:p>
-            <a:endParaRPr lang="en-US"/>
-          </a:p>
-        </p:txBody>
-      </p:sp>
-      <p:sp>
-        <p:nvSpPr>
-          <p:cNvPr id="4" name="Content Placeholder 3"/>
+            <a:r>
+              <a:rPr lang="en-US" dirty="0"/>
+              <a:t>It is a good idea to look at your data before trying to model</a:t>
+            </a:r>
+          </a:p>
+          <a:p>
+            <a:pPr lvl="1"/>
+            <a:r>
+              <a:rPr lang="en-US" dirty="0"/>
+              <a:t>Graphical exploration</a:t>
+            </a:r>
+          </a:p>
+          <a:p>
+            <a:pPr lvl="1"/>
+            <a:r>
+              <a:rPr lang="en-US" dirty="0"/>
+              <a:t>Numerical summaries</a:t>
+            </a:r>
+          </a:p>
+          <a:p>
+            <a:endParaRPr lang="en-US" dirty="0" smtClean="0"/>
+          </a:p>
+          <a:p>
+            <a:r>
+              <a:rPr lang="en-US" dirty="0" smtClean="0"/>
+              <a:t>Network </a:t>
+            </a:r>
+            <a:r>
+              <a:rPr lang="en-US" dirty="0"/>
+              <a:t>plot</a:t>
+            </a:r>
+          </a:p>
+          <a:p>
+            <a:pPr lvl="1"/>
+            <a:r>
+              <a:rPr lang="en-US" dirty="0"/>
+              <a:t>Color code nodes by attributes</a:t>
+            </a:r>
+          </a:p>
+          <a:p>
+            <a:pPr lvl="1"/>
+            <a:r>
+              <a:rPr lang="en-US" dirty="0"/>
+              <a:t>Size by numeric attributes or </a:t>
+            </a:r>
+            <a:r>
+              <a:rPr lang="en-US" dirty="0" err="1"/>
+              <a:t>betweenness</a:t>
+            </a:r>
+            <a:endParaRPr lang="en-US" dirty="0"/>
+          </a:p>
+          <a:p>
+            <a:pPr lvl="2"/>
+            <a:r>
+              <a:rPr lang="en-US" dirty="0"/>
+              <a:t>Note: if larger nodes obscure small ones you can edit the opacity to ensure that all nodes are visible</a:t>
+            </a:r>
+          </a:p>
+          <a:p>
+            <a:endParaRPr lang="en-US" dirty="0"/>
+          </a:p>
+        </p:txBody>
+      </p:sp>
+      <p:sp>
+        <p:nvSpPr>
+          <p:cNvPr id="5" name="Content Placeholder 3"/>
           <p:cNvSpPr>
             <a:spLocks noGrp="1"/>
           </p:cNvSpPr>
@@ -5367,19 +5436,137 @@
             <p:ph sz="half" idx="2"/>
           </p:nvPr>
         </p:nvSpPr>
-        <p:spPr/>
-        <p:txBody>
-          <a:bodyPr/>
-          <a:lstStyle/>
-          <a:p>
-            <a:endParaRPr lang="en-US"/>
-          </a:p>
-        </p:txBody>
-      </p:sp>
+        <p:spPr>
+          <a:xfrm>
+            <a:off x="6217920" y="1349440"/>
+            <a:ext cx="4937760" cy="4519655"/>
+          </a:xfrm>
+        </p:spPr>
+        <p:txBody>
+          <a:bodyPr>
+            <a:normAutofit/>
+          </a:bodyPr>
+          <a:lstStyle/>
+          <a:p>
+            <a:r>
+              <a:rPr lang="en-US" dirty="0" smtClean="0">
+                <a:solidFill>
+                  <a:srgbClr val="0070C0"/>
+                </a:solidFill>
+              </a:rPr>
+              <a:t>Interactive: </a:t>
+            </a:r>
+            <a:r>
+              <a:rPr lang="en-US" dirty="0"/>
+              <a:t>L</a:t>
+            </a:r>
+            <a:r>
+              <a:rPr lang="en-US" dirty="0" smtClean="0"/>
+              <a:t>oad the </a:t>
+            </a:r>
+            <a:r>
+              <a:rPr lang="en-US" dirty="0" err="1" smtClean="0"/>
+              <a:t>faux.mesa.high</a:t>
+            </a:r>
+            <a:r>
+              <a:rPr lang="en-US" dirty="0" smtClean="0"/>
+              <a:t> data and examine the network plot.</a:t>
+            </a:r>
+          </a:p>
+          <a:p>
+            <a:pPr lvl="1"/>
+            <a:endParaRPr lang="en-US" dirty="0" smtClean="0"/>
+          </a:p>
+          <a:p>
+            <a:pPr lvl="1"/>
+            <a:endParaRPr lang="en-US" dirty="0" smtClean="0"/>
+          </a:p>
+          <a:p>
+            <a:pPr lvl="1"/>
+            <a:endParaRPr lang="en-US" dirty="0" smtClean="0"/>
+          </a:p>
+          <a:p>
+            <a:pPr lvl="1"/>
+            <a:endParaRPr lang="en-US" dirty="0"/>
+          </a:p>
+          <a:p>
+            <a:pPr lvl="1"/>
+            <a:endParaRPr lang="en-US" dirty="0"/>
+          </a:p>
+          <a:p>
+            <a:pPr lvl="1"/>
+            <a:r>
+              <a:rPr lang="en-US" dirty="0" smtClean="0"/>
+              <a:t>Play around with color-coding the nodes</a:t>
+            </a:r>
+          </a:p>
+          <a:p>
+            <a:pPr lvl="1"/>
+            <a:r>
+              <a:rPr lang="en-US" dirty="0" smtClean="0"/>
+              <a:t>What do you notice after color-coding the nodes based on grade?</a:t>
+            </a:r>
+          </a:p>
+          <a:p>
+            <a:pPr lvl="1"/>
+            <a:r>
+              <a:rPr lang="en-US" dirty="0" smtClean="0"/>
+              <a:t>Now edit the size of the nodes based on </a:t>
+            </a:r>
+            <a:r>
+              <a:rPr lang="en-US" dirty="0" err="1" smtClean="0"/>
+              <a:t>betweenness</a:t>
+            </a:r>
+            <a:r>
+              <a:rPr lang="en-US" dirty="0" smtClean="0"/>
+              <a:t>.</a:t>
+            </a:r>
+          </a:p>
+          <a:p>
+            <a:r>
+              <a:rPr lang="en-US" dirty="0" smtClean="0"/>
+              <a:t>What have we already learned about the social structure of this school?</a:t>
+            </a:r>
+          </a:p>
+          <a:p>
+            <a:endParaRPr lang="en-US" dirty="0" smtClean="0"/>
+          </a:p>
+        </p:txBody>
+      </p:sp>
+      <p:pic>
+        <p:nvPicPr>
+          <p:cNvPr id="6" name="Picture 5" descr="sw_nwplot.png"/>
+          <p:cNvPicPr>
+            <a:picLocks noChangeAspect="1"/>
+          </p:cNvPicPr>
+          <p:nvPr/>
+        </p:nvPicPr>
+        <p:blipFill>
+          <a:blip r:embed="rId2">
+            <a:extLst>
+              <a:ext uri="{28A0092B-C50C-407E-A947-70E740481C1C}">
+                <a14:useLocalDpi xmlns:a14="http://schemas.microsoft.com/office/drawing/2010/main" val="0"/>
+              </a:ext>
+            </a:extLst>
+          </a:blip>
+          <a:stretch>
+            <a:fillRect/>
+          </a:stretch>
+        </p:blipFill>
+        <p:spPr>
+          <a:xfrm>
+            <a:off x="7064183" y="1993667"/>
+            <a:ext cx="2997978" cy="1525832"/>
+          </a:xfrm>
+          <a:prstGeom prst="rect">
+            <a:avLst/>
+          </a:prstGeom>
+        </p:spPr>
+      </p:pic>
     </p:spTree>
     <p:extLst>
       <p:ext uri="{BB962C8B-B14F-4D97-AF65-F5344CB8AC3E}">
-        <p14:creationId xmlns:p14="http://schemas.microsoft.com/office/powerpoint/2010/main" val="2363491526"/>
+        <p14:creationId xmlns:p14="http://schemas.microsoft.com/office/powerpoint/2010/main" val="1856423059"/>
       </p:ext>
     </p:extLst>
   </p:cSld>
@@ -5423,7 +5610,7 @@
           <a:p>
             <a:r>
               <a:rPr lang="en-US" dirty="0" smtClean="0"/>
-              <a:t>Diagnostics</a:t>
+              <a:t>Network Descriptives</a:t>
             </a:r>
             <a:endParaRPr lang="en-US" dirty="0"/>
           </a:p>
@@ -5444,7 +5631,59 @@
           <a:bodyPr/>
           <a:lstStyle/>
           <a:p>
-            <a:endParaRPr lang="en-US"/>
+            <a:r>
+              <a:rPr lang="en-US" dirty="0"/>
+              <a:t>Degree </a:t>
+            </a:r>
+            <a:r>
+              <a:rPr lang="en-US" dirty="0" smtClean="0"/>
+              <a:t>Distribution</a:t>
+            </a:r>
+          </a:p>
+          <a:p>
+            <a:pPr lvl="1"/>
+            <a:r>
+              <a:rPr lang="en-US" dirty="0" smtClean="0"/>
+              <a:t>Plot of a numerical summary</a:t>
+            </a:r>
+            <a:endParaRPr lang="en-US" dirty="0"/>
+          </a:p>
+          <a:p>
+            <a:pPr lvl="1"/>
+            <a:r>
+              <a:rPr lang="en-US" dirty="0"/>
+              <a:t>How are degrees distributed?</a:t>
+            </a:r>
+          </a:p>
+          <a:p>
+            <a:r>
+              <a:rPr lang="en-US" dirty="0"/>
+              <a:t>Geodesic Distribution</a:t>
+            </a:r>
+          </a:p>
+          <a:p>
+            <a:pPr lvl="1"/>
+            <a:r>
+              <a:rPr lang="en-US" dirty="0"/>
+              <a:t>How “connected” is the network</a:t>
+            </a:r>
+            <a:r>
+              <a:rPr lang="en-US" dirty="0" smtClean="0"/>
+              <a:t>?</a:t>
+            </a:r>
+          </a:p>
+          <a:p>
+            <a:endParaRPr lang="en-US" dirty="0"/>
+          </a:p>
+          <a:p>
+            <a:r>
+              <a:rPr lang="en-US" dirty="0" smtClean="0"/>
+              <a:t>Note about expected values – go back later!</a:t>
+            </a:r>
+            <a:endParaRPr lang="en-US" dirty="0"/>
+          </a:p>
+          <a:p>
+            <a:endParaRPr lang="en-US" dirty="0"/>
           </a:p>
         </p:txBody>
       </p:sp>
@@ -5470,7 +5709,7 @@
     </p:spTree>
     <p:extLst>
       <p:ext uri="{BB962C8B-B14F-4D97-AF65-F5344CB8AC3E}">
-        <p14:creationId xmlns:p14="http://schemas.microsoft.com/office/powerpoint/2010/main" val="2976517766"/>
+        <p14:creationId xmlns:p14="http://schemas.microsoft.com/office/powerpoint/2010/main" val="3708573406"/>
       </p:ext>
     </p:extLst>
   </p:cSld>
@@ -5514,6 +5753,293 @@
           <a:p>
             <a:r>
               <a:rPr lang="en-US" dirty="0" smtClean="0"/>
+              <a:t>Network Descriptives</a:t>
+            </a:r>
+            <a:endParaRPr lang="en-US" dirty="0"/>
+          </a:p>
+        </p:txBody>
+      </p:sp>
+      <p:sp>
+        <p:nvSpPr>
+          <p:cNvPr id="3" name="Content Placeholder 2"/>
+          <p:cNvSpPr>
+            <a:spLocks noGrp="1"/>
+          </p:cNvSpPr>
+          <p:nvPr>
+            <p:ph sz="half" idx="1"/>
+          </p:nvPr>
+        </p:nvSpPr>
+        <p:spPr/>
+        <p:txBody>
+          <a:bodyPr/>
+          <a:lstStyle/>
+          <a:p>
+            <a:r>
+              <a:rPr lang="en-US" dirty="0" smtClean="0"/>
+              <a:t>Numerical summaries</a:t>
+            </a:r>
+          </a:p>
+          <a:p>
+            <a:pPr lvl="1"/>
+            <a:r>
+              <a:rPr lang="en-US" dirty="0" smtClean="0"/>
+              <a:t>Different levels of measurement</a:t>
+            </a:r>
+            <a:endParaRPr lang="en-US" dirty="0"/>
+          </a:p>
+          <a:p>
+            <a:endParaRPr lang="en-US" dirty="0"/>
+          </a:p>
+        </p:txBody>
+      </p:sp>
+      <p:sp>
+        <p:nvSpPr>
+          <p:cNvPr id="4" name="Content Placeholder 3"/>
+          <p:cNvSpPr>
+            <a:spLocks noGrp="1"/>
+          </p:cNvSpPr>
+          <p:nvPr>
+            <p:ph sz="half" idx="2"/>
+          </p:nvPr>
+        </p:nvSpPr>
+        <p:spPr/>
+        <p:txBody>
+          <a:bodyPr/>
+          <a:lstStyle/>
+          <a:p>
+            <a:endParaRPr lang="en-US"/>
+          </a:p>
+        </p:txBody>
+      </p:sp>
+    </p:spTree>
+    <p:extLst>
+      <p:ext uri="{BB962C8B-B14F-4D97-AF65-F5344CB8AC3E}">
+        <p14:creationId xmlns:p14="http://schemas.microsoft.com/office/powerpoint/2010/main" val="2102049441"/>
+      </p:ext>
+    </p:extLst>
+  </p:cSld>
+  <p:clrMapOvr>
+    <a:masterClrMapping/>
+  </p:clrMapOvr>
+</p:sld>
+</file>
+
+<file path=ppt/slides/slide13.xml><?xml version="1.0" encoding="utf-8"?>
+<p:sld xmlns:a="http://schemas.openxmlformats.org/drawingml/2006/main" xmlns:r="http://schemas.openxmlformats.org/officeDocument/2006/relationships" xmlns:p="http://schemas.openxmlformats.org/presentationml/2006/main">
+  <p:cSld>
+    <p:spTree>
+      <p:nvGrpSpPr>
+        <p:cNvPr id="1" name=""/>
+        <p:cNvGrpSpPr/>
+        <p:nvPr/>
+      </p:nvGrpSpPr>
+      <p:grpSpPr>
+        <a:xfrm>
+          <a:off x="0" y="0"/>
+          <a:ext cx="0" cy="0"/>
+          <a:chOff x="0" y="0"/>
+          <a:chExt cx="0" cy="0"/>
+        </a:xfrm>
+      </p:grpSpPr>
+      <p:sp>
+        <p:nvSpPr>
+          <p:cNvPr id="2" name="Title 1"/>
+          <p:cNvSpPr>
+            <a:spLocks noGrp="1"/>
+          </p:cNvSpPr>
+          <p:nvPr>
+            <p:ph type="title"/>
+          </p:nvPr>
+        </p:nvSpPr>
+        <p:spPr/>
+        <p:txBody>
+          <a:bodyPr/>
+          <a:lstStyle/>
+          <a:p>
+            <a:r>
+              <a:rPr lang="en-US" dirty="0" smtClean="0"/>
+              <a:t>Statistical Models</a:t>
+            </a:r>
+            <a:endParaRPr lang="en-US" dirty="0"/>
+          </a:p>
+        </p:txBody>
+      </p:sp>
+      <p:sp>
+        <p:nvSpPr>
+          <p:cNvPr id="3" name="Content Placeholder 2"/>
+          <p:cNvSpPr>
+            <a:spLocks noGrp="1"/>
+          </p:cNvSpPr>
+          <p:nvPr>
+            <p:ph sz="half" idx="1"/>
+          </p:nvPr>
+        </p:nvSpPr>
+        <p:spPr/>
+        <p:txBody>
+          <a:bodyPr/>
+          <a:lstStyle/>
+          <a:p>
+            <a:endParaRPr lang="en-US"/>
+          </a:p>
+        </p:txBody>
+      </p:sp>
+      <p:sp>
+        <p:nvSpPr>
+          <p:cNvPr id="4" name="Content Placeholder 3"/>
+          <p:cNvSpPr>
+            <a:spLocks noGrp="1"/>
+          </p:cNvSpPr>
+          <p:nvPr>
+            <p:ph sz="half" idx="2"/>
+          </p:nvPr>
+        </p:nvSpPr>
+        <p:spPr/>
+        <p:txBody>
+          <a:bodyPr/>
+          <a:lstStyle/>
+          <a:p>
+            <a:endParaRPr lang="en-US"/>
+          </a:p>
+        </p:txBody>
+      </p:sp>
+    </p:spTree>
+    <p:extLst>
+      <p:ext uri="{BB962C8B-B14F-4D97-AF65-F5344CB8AC3E}">
+        <p14:creationId xmlns:p14="http://schemas.microsoft.com/office/powerpoint/2010/main" val="2363491526"/>
+      </p:ext>
+    </p:extLst>
+  </p:cSld>
+  <p:clrMapOvr>
+    <a:masterClrMapping/>
+  </p:clrMapOvr>
+</p:sld>
+</file>
+
+<file path=ppt/slides/slide14.xml><?xml version="1.0" encoding="utf-8"?>
+<p:sld xmlns:a="http://schemas.openxmlformats.org/drawingml/2006/main" xmlns:r="http://schemas.openxmlformats.org/officeDocument/2006/relationships" xmlns:p="http://schemas.openxmlformats.org/presentationml/2006/main">
+  <p:cSld>
+    <p:spTree>
+      <p:nvGrpSpPr>
+        <p:cNvPr id="1" name=""/>
+        <p:cNvGrpSpPr/>
+        <p:nvPr/>
+      </p:nvGrpSpPr>
+      <p:grpSpPr>
+        <a:xfrm>
+          <a:off x="0" y="0"/>
+          <a:ext cx="0" cy="0"/>
+          <a:chOff x="0" y="0"/>
+          <a:chExt cx="0" cy="0"/>
+        </a:xfrm>
+      </p:grpSpPr>
+      <p:sp>
+        <p:nvSpPr>
+          <p:cNvPr id="2" name="Title 1"/>
+          <p:cNvSpPr>
+            <a:spLocks noGrp="1"/>
+          </p:cNvSpPr>
+          <p:nvPr>
+            <p:ph type="title"/>
+          </p:nvPr>
+        </p:nvSpPr>
+        <p:spPr/>
+        <p:txBody>
+          <a:bodyPr/>
+          <a:lstStyle/>
+          <a:p>
+            <a:r>
+              <a:rPr lang="en-US" dirty="0" smtClean="0"/>
+              <a:t>Diagnostics</a:t>
+            </a:r>
+            <a:endParaRPr lang="en-US" dirty="0"/>
+          </a:p>
+        </p:txBody>
+      </p:sp>
+      <p:sp>
+        <p:nvSpPr>
+          <p:cNvPr id="3" name="Content Placeholder 2"/>
+          <p:cNvSpPr>
+            <a:spLocks noGrp="1"/>
+          </p:cNvSpPr>
+          <p:nvPr>
+            <p:ph sz="half" idx="1"/>
+          </p:nvPr>
+        </p:nvSpPr>
+        <p:spPr/>
+        <p:txBody>
+          <a:bodyPr/>
+          <a:lstStyle/>
+          <a:p>
+            <a:endParaRPr lang="en-US"/>
+          </a:p>
+        </p:txBody>
+      </p:sp>
+      <p:sp>
+        <p:nvSpPr>
+          <p:cNvPr id="4" name="Content Placeholder 3"/>
+          <p:cNvSpPr>
+            <a:spLocks noGrp="1"/>
+          </p:cNvSpPr>
+          <p:nvPr>
+            <p:ph sz="half" idx="2"/>
+          </p:nvPr>
+        </p:nvSpPr>
+        <p:spPr/>
+        <p:txBody>
+          <a:bodyPr/>
+          <a:lstStyle/>
+          <a:p>
+            <a:endParaRPr lang="en-US"/>
+          </a:p>
+        </p:txBody>
+      </p:sp>
+    </p:spTree>
+    <p:extLst>
+      <p:ext uri="{BB962C8B-B14F-4D97-AF65-F5344CB8AC3E}">
+        <p14:creationId xmlns:p14="http://schemas.microsoft.com/office/powerpoint/2010/main" val="2976517766"/>
+      </p:ext>
+    </p:extLst>
+  </p:cSld>
+  <p:clrMapOvr>
+    <a:masterClrMapping/>
+  </p:clrMapOvr>
+</p:sld>
+</file>
+
+<file path=ppt/slides/slide15.xml><?xml version="1.0" encoding="utf-8"?>
+<p:sld xmlns:a="http://schemas.openxmlformats.org/drawingml/2006/main" xmlns:r="http://schemas.openxmlformats.org/officeDocument/2006/relationships" xmlns:p="http://schemas.openxmlformats.org/presentationml/2006/main">
+  <p:cSld>
+    <p:spTree>
+      <p:nvGrpSpPr>
+        <p:cNvPr id="1" name=""/>
+        <p:cNvGrpSpPr/>
+        <p:nvPr/>
+      </p:nvGrpSpPr>
+      <p:grpSpPr>
+        <a:xfrm>
+          <a:off x="0" y="0"/>
+          <a:ext cx="0" cy="0"/>
+          <a:chOff x="0" y="0"/>
+          <a:chExt cx="0" cy="0"/>
+        </a:xfrm>
+      </p:grpSpPr>
+      <p:sp>
+        <p:nvSpPr>
+          <p:cNvPr id="2" name="Title 1"/>
+          <p:cNvSpPr>
+            <a:spLocks noGrp="1"/>
+          </p:cNvSpPr>
+          <p:nvPr>
+            <p:ph type="title"/>
+          </p:nvPr>
+        </p:nvSpPr>
+        <p:spPr/>
+        <p:txBody>
+          <a:bodyPr/>
+          <a:lstStyle/>
+          <a:p>
+            <a:r>
+              <a:rPr lang="en-US" dirty="0" smtClean="0"/>
               <a:t>Model-Based Simulation</a:t>
             </a:r>
             <a:endParaRPr lang="en-US" dirty="0"/>
@@ -5571,7 +6097,7 @@
 </p:sld>
 </file>
 
-<file path=ppt/slides/slide13.xml><?xml version="1.0" encoding="utf-8"?>
+<file path=ppt/slides/slide16.xml><?xml version="1.0" encoding="utf-8"?>
 <p:sld xmlns:a="http://schemas.openxmlformats.org/drawingml/2006/main" xmlns:r="http://schemas.openxmlformats.org/officeDocument/2006/relationships" xmlns:p="http://schemas.openxmlformats.org/presentationml/2006/main">
   <p:cSld>
     <p:spTree>
@@ -5863,65 +6389,66 @@
           </a:p>
         </p:txBody>
       </p:sp>
-      <p:sp>
-        <p:nvSpPr>
-          <p:cNvPr id="3" name="Content Placeholder 2"/>
-          <p:cNvSpPr>
-            <a:spLocks noGrp="1"/>
-          </p:cNvSpPr>
-          <p:nvPr>
-            <p:ph sz="half" idx="1"/>
-          </p:nvPr>
-        </p:nvSpPr>
+      <p:pic>
+        <p:nvPicPr>
+          <p:cNvPr id="4" name="Picture 3" descr="commandline.png"/>
+          <p:cNvPicPr>
+            <a:picLocks noChangeAspect="1"/>
+          </p:cNvPicPr>
+          <p:nvPr/>
+        </p:nvPicPr>
+        <p:blipFill>
+          <a:blip r:embed="rId2">
+            <a:extLst>
+              <a:ext uri="{28A0092B-C50C-407E-A947-70E740481C1C}">
+                <a14:useLocalDpi xmlns:a14="http://schemas.microsoft.com/office/drawing/2010/main" val="0"/>
+              </a:ext>
+            </a:extLst>
+          </a:blip>
+          <a:stretch>
+            <a:fillRect/>
+          </a:stretch>
+        </p:blipFill>
         <p:spPr>
           <a:xfrm>
-            <a:off x="1097278" y="1349440"/>
-            <a:ext cx="10001692" cy="4519654"/>
+            <a:off x="5182733" y="1635115"/>
+            <a:ext cx="6565760" cy="4021831"/>
           </a:xfrm>
+          <a:prstGeom prst="rect">
+            <a:avLst/>
+          </a:prstGeom>
         </p:spPr>
-        <p:txBody>
-          <a:bodyPr/>
-          <a:lstStyle/>
-          <a:p>
-            <a:r>
-              <a:rPr lang="en-US" dirty="0"/>
-              <a:t>Network analysis techniques have progressed immensely over the past 60 years and continue to develop quickly</a:t>
-            </a:r>
-            <a:r>
-              <a:rPr lang="en-US" dirty="0" smtClean="0"/>
-              <a:t>.</a:t>
-            </a:r>
-          </a:p>
-          <a:p>
-            <a:pPr lvl="1"/>
-            <a:r>
-              <a:rPr lang="en-US" dirty="0" smtClean="0"/>
-              <a:t>Command line </a:t>
-            </a:r>
-            <a:r>
-              <a:rPr lang="en-US" smtClean="0"/>
-              <a:t>programs: flexible </a:t>
-            </a:r>
-            <a:r>
-              <a:rPr lang="en-US" dirty="0" smtClean="0"/>
-              <a:t>analysis possibilities, requires </a:t>
-            </a:r>
-            <a:r>
-              <a:rPr lang="en-US" smtClean="0"/>
-              <a:t>initial investment </a:t>
-            </a:r>
-            <a:endParaRPr lang="en-US" dirty="0" smtClean="0"/>
-          </a:p>
-          <a:p>
-            <a:pPr lvl="1"/>
-            <a:r>
-              <a:rPr lang="en-US" dirty="0" smtClean="0"/>
-              <a:t>GUI-based programs: available to wider audience, limited analysis possibilities</a:t>
-            </a:r>
-            <a:endParaRPr lang="en-US" dirty="0"/>
-          </a:p>
-        </p:txBody>
-      </p:sp>
+      </p:pic>
+      <p:pic>
+        <p:nvPicPr>
+          <p:cNvPr id="6" name="Picture 5" descr="sw_displayoptions.png"/>
+          <p:cNvPicPr>
+            <a:picLocks noChangeAspect="1"/>
+          </p:cNvPicPr>
+          <p:nvPr/>
+        </p:nvPicPr>
+        <p:blipFill>
+          <a:blip r:embed="rId3">
+            <a:extLst>
+              <a:ext uri="{28A0092B-C50C-407E-A947-70E740481C1C}">
+                <a14:useLocalDpi xmlns:a14="http://schemas.microsoft.com/office/drawing/2010/main" val="0"/>
+              </a:ext>
+            </a:extLst>
+          </a:blip>
+          <a:stretch>
+            <a:fillRect/>
+          </a:stretch>
+        </p:blipFill>
+        <p:spPr>
+          <a:xfrm>
+            <a:off x="1177103" y="1693514"/>
+            <a:ext cx="3217488" cy="3990024"/>
+          </a:xfrm>
+          <a:prstGeom prst="rect">
+            <a:avLst/>
+          </a:prstGeom>
+        </p:spPr>
+      </p:pic>
     </p:spTree>
     <p:extLst>
       <p:ext uri="{BB962C8B-B14F-4D97-AF65-F5344CB8AC3E}">
@@ -5969,134 +6496,117 @@
           <a:p>
             <a:r>
               <a:rPr lang="en-US" dirty="0" smtClean="0"/>
-              <a:t>Course Outlines</a:t>
-            </a:r>
-            <a:endParaRPr lang="en-US" dirty="0"/>
-          </a:p>
-        </p:txBody>
-      </p:sp>
-      <p:sp>
-        <p:nvSpPr>
-          <p:cNvPr id="6" name="Content Placeholder 5"/>
-          <p:cNvSpPr>
-            <a:spLocks noGrp="1"/>
-          </p:cNvSpPr>
-          <p:nvPr>
-            <p:ph sz="half" idx="2"/>
+              <a:t>Why is it useful?</a:t>
+            </a:r>
+            <a:endParaRPr lang="en-US" dirty="0"/>
+          </a:p>
+        </p:txBody>
+      </p:sp>
+      <p:sp>
+        <p:nvSpPr>
+          <p:cNvPr id="3" name="Content Placeholder 2"/>
+          <p:cNvSpPr>
+            <a:spLocks noGrp="1"/>
+          </p:cNvSpPr>
+          <p:nvPr>
+            <p:ph sz="half" idx="1"/>
           </p:nvPr>
         </p:nvSpPr>
         <p:spPr>
           <a:xfrm>
-            <a:off x="1097280" y="1786024"/>
-            <a:ext cx="4937760" cy="4174509"/>
+            <a:off x="1097278" y="1349440"/>
+            <a:ext cx="10001692" cy="4519654"/>
           </a:xfrm>
         </p:spPr>
         <p:txBody>
-          <a:bodyPr>
-            <a:normAutofit/>
-          </a:bodyPr>
-          <a:lstStyle/>
-          <a:p>
-            <a:pPr marL="457200" indent="-457200">
-              <a:buFont typeface="+mj-lt"/>
-              <a:buAutoNum type="arabicPeriod"/>
-            </a:pPr>
-            <a:r>
-              <a:rPr lang="en-US" dirty="0" smtClean="0"/>
-              <a:t>Network analysis basics</a:t>
-            </a:r>
-          </a:p>
-          <a:p>
-            <a:pPr marL="457200" indent="-457200">
-              <a:buFont typeface="+mj-lt"/>
-              <a:buAutoNum type="arabicPeriod"/>
-            </a:pPr>
-            <a:r>
-              <a:rPr lang="en-US" dirty="0" smtClean="0"/>
-              <a:t>Data</a:t>
-            </a:r>
-          </a:p>
-          <a:p>
-            <a:pPr marL="457200" indent="-457200">
-              <a:buFont typeface="+mj-lt"/>
-              <a:buAutoNum type="arabicPeriod"/>
-            </a:pPr>
-            <a:r>
-              <a:rPr lang="en-US" dirty="0" smtClean="0"/>
-              <a:t>Network descriptives</a:t>
-            </a:r>
-          </a:p>
-          <a:p>
-            <a:pPr marL="457200" indent="-457200">
-              <a:buFont typeface="+mj-lt"/>
-              <a:buAutoNum type="arabicPeriod"/>
-            </a:pPr>
-            <a:r>
-              <a:rPr lang="en-US" dirty="0" smtClean="0"/>
-              <a:t>Statistical models</a:t>
-            </a:r>
-          </a:p>
-          <a:p>
-            <a:pPr marL="457200" indent="-457200">
-              <a:buFont typeface="+mj-lt"/>
-              <a:buAutoNum type="arabicPeriod"/>
-            </a:pPr>
-            <a:r>
-              <a:rPr lang="en-US" dirty="0" smtClean="0"/>
-              <a:t>Diagnostics</a:t>
-            </a:r>
-          </a:p>
-          <a:p>
-            <a:pPr marL="457200" indent="-457200">
-              <a:buFont typeface="+mj-lt"/>
-              <a:buAutoNum type="arabicPeriod"/>
-            </a:pPr>
-            <a:r>
-              <a:rPr lang="en-US" dirty="0" smtClean="0"/>
-              <a:t>Model-based simulation</a:t>
-            </a:r>
-          </a:p>
-          <a:p>
-            <a:pPr marL="457200" indent="-457200">
-              <a:buFont typeface="+mj-lt"/>
-              <a:buAutoNum type="arabicPeriod"/>
-            </a:pPr>
-            <a:r>
-              <a:rPr lang="en-US" dirty="0" smtClean="0"/>
-              <a:t>Review and further topics</a:t>
-            </a:r>
-          </a:p>
-        </p:txBody>
-      </p:sp>
-      <p:graphicFrame>
-        <p:nvGraphicFramePr>
-          <p:cNvPr id="18" name="Content Placeholder 17"/>
-          <p:cNvGraphicFramePr>
-            <a:graphicFrameLocks noGrp="1"/>
-          </p:cNvGraphicFramePr>
-          <p:nvPr>
-            <p:ph sz="quarter" idx="4"/>
-            <p:extLst>
-              <p:ext uri="{D42A27DB-BD31-4B8C-83A1-F6EECF244321}">
-                <p14:modId xmlns:p14="http://schemas.microsoft.com/office/powerpoint/2010/main" val="2413052801"/>
-              </p:ext>
-            </p:extLst>
-          </p:nvPr>
-        </p:nvGraphicFramePr>
-        <p:xfrm>
-          <a:off x="4544175" y="1609255"/>
-          <a:ext cx="6822849" cy="4034292"/>
-        </p:xfrm>
-        <a:graphic>
-          <a:graphicData uri="http://schemas.openxmlformats.org/drawingml/2006/chart">
-            <c:chart xmlns:c="http://schemas.openxmlformats.org/drawingml/2006/chart" xmlns:r="http://schemas.openxmlformats.org/officeDocument/2006/relationships" r:id="rId2"/>
-          </a:graphicData>
-        </a:graphic>
-      </p:graphicFrame>
+          <a:bodyPr/>
+          <a:lstStyle/>
+          <a:p>
+            <a:r>
+              <a:rPr lang="en-US" dirty="0"/>
+              <a:t>Network analysis techniques have progressed immensely over the past 60 years and continue to develop quickly</a:t>
+            </a:r>
+            <a:r>
+              <a:rPr lang="en-US" dirty="0" smtClean="0"/>
+              <a:t>.</a:t>
+            </a:r>
+          </a:p>
+          <a:p>
+            <a:pPr lvl="1"/>
+            <a:r>
+              <a:rPr lang="en-US" dirty="0" smtClean="0"/>
+              <a:t>Command line programs: flexible analysis possibilities, requires initial investment </a:t>
+            </a:r>
+          </a:p>
+          <a:p>
+            <a:pPr lvl="1"/>
+            <a:r>
+              <a:rPr lang="en-US" dirty="0" smtClean="0"/>
+              <a:t>GUI-based programs: available to wider audience, limited analysis </a:t>
+            </a:r>
+            <a:r>
+              <a:rPr lang="en-US" dirty="0" smtClean="0"/>
+              <a:t>possibilities</a:t>
+            </a:r>
+          </a:p>
+          <a:p>
+            <a:r>
+              <a:rPr lang="en-US" dirty="0" smtClean="0"/>
+              <a:t>The </a:t>
+            </a:r>
+            <a:r>
+              <a:rPr lang="en-US" dirty="0" err="1" smtClean="0"/>
+              <a:t>statnet</a:t>
+            </a:r>
+            <a:r>
+              <a:rPr lang="en-US" dirty="0" smtClean="0"/>
+              <a:t> suite of R packages gives users powerful network analysis tools, accessed from the flexibility of the R command line.</a:t>
+            </a:r>
+          </a:p>
+          <a:p>
+            <a:r>
+              <a:rPr lang="en-US" dirty="0" smtClean="0"/>
+              <a:t>The Shiny framework from </a:t>
+            </a:r>
+            <a:r>
+              <a:rPr lang="en-US" dirty="0" err="1" smtClean="0"/>
+              <a:t>RStudio</a:t>
+            </a:r>
+            <a:r>
+              <a:rPr lang="en-US" dirty="0" smtClean="0"/>
+              <a:t> allows us to build a graphical user interface for </a:t>
+            </a:r>
+            <a:r>
+              <a:rPr lang="en-US" dirty="0" err="1" smtClean="0"/>
+              <a:t>statnet</a:t>
+            </a:r>
+            <a:r>
+              <a:rPr lang="en-US" dirty="0" smtClean="0"/>
+              <a:t> that runs in a web browser.</a:t>
+            </a:r>
+            <a:endParaRPr lang="en-US" dirty="0"/>
+          </a:p>
+          <a:p>
+            <a:r>
+              <a:rPr lang="en-US" dirty="0" smtClean="0"/>
+              <a:t>Rather than an isolated GUI, </a:t>
+            </a:r>
+            <a:r>
+              <a:rPr lang="en-US" dirty="0" err="1" smtClean="0"/>
+              <a:t>statnetWeb</a:t>
+            </a:r>
+            <a:r>
+              <a:rPr lang="en-US" dirty="0" smtClean="0"/>
+              <a:t> occupies a middle ground ________</a:t>
+            </a:r>
+            <a:endParaRPr lang="en-US" dirty="0"/>
+          </a:p>
+        </p:txBody>
+      </p:sp>
     </p:spTree>
     <p:extLst>
       <p:ext uri="{BB962C8B-B14F-4D97-AF65-F5344CB8AC3E}">
-        <p14:creationId xmlns:p14="http://schemas.microsoft.com/office/powerpoint/2010/main" val="1776018726"/>
+        <p14:creationId xmlns:p14="http://schemas.microsoft.com/office/powerpoint/2010/main" val="1125714840"/>
       </p:ext>
     </p:extLst>
   </p:cSld>
@@ -6140,104 +6650,15 @@
           <a:p>
             <a:r>
               <a:rPr lang="en-US" dirty="0" smtClean="0"/>
-              <a:t>Network Analysis Basics</a:t>
-            </a:r>
-            <a:endParaRPr lang="en-US" dirty="0"/>
-          </a:p>
-        </p:txBody>
-      </p:sp>
-      <p:sp>
-        <p:nvSpPr>
-          <p:cNvPr id="3" name="Content Placeholder 2"/>
-          <p:cNvSpPr>
-            <a:spLocks noGrp="1"/>
-          </p:cNvSpPr>
-          <p:nvPr>
-            <p:ph sz="half" idx="1"/>
-          </p:nvPr>
-        </p:nvSpPr>
-        <p:spPr/>
-        <p:txBody>
-          <a:bodyPr/>
-          <a:lstStyle/>
-          <a:p>
-            <a:r>
-              <a:rPr lang="en-US" dirty="0" smtClean="0"/>
-              <a:t>Motivation</a:t>
-            </a:r>
-          </a:p>
-          <a:p>
-            <a:pPr lvl="1"/>
-            <a:r>
-              <a:rPr lang="en-US" dirty="0" smtClean="0"/>
-              <a:t>What is a network?</a:t>
-            </a:r>
-          </a:p>
-          <a:p>
-            <a:pPr lvl="1"/>
-            <a:r>
-              <a:rPr lang="en-US" dirty="0" smtClean="0"/>
-              <a:t>What can be represented as a network?</a:t>
-            </a:r>
-          </a:p>
-          <a:p>
-            <a:pPr lvl="1"/>
-            <a:r>
-              <a:rPr lang="en-US" dirty="0" smtClean="0"/>
-              <a:t>What kind of questions can we answer?</a:t>
-            </a:r>
-          </a:p>
-          <a:p>
-            <a:r>
-              <a:rPr lang="en-US" dirty="0" smtClean="0"/>
-              <a:t>Sampling Designs</a:t>
-            </a:r>
-          </a:p>
-          <a:p>
-            <a:pPr lvl="1"/>
-            <a:r>
-              <a:rPr lang="en-US" dirty="0" smtClean="0"/>
-              <a:t>Census, adaptive sample, egocentric sample</a:t>
-            </a:r>
-          </a:p>
-          <a:p>
-            <a:pPr lvl="1"/>
-            <a:r>
-              <a:rPr lang="en-US" dirty="0" smtClean="0"/>
-              <a:t>The type of sample impacts the type of analysis</a:t>
-            </a:r>
-          </a:p>
-          <a:p>
-            <a:r>
-              <a:rPr lang="en-US" dirty="0" smtClean="0"/>
-              <a:t>Types of network analysis</a:t>
-            </a:r>
-          </a:p>
-          <a:p>
-            <a:pPr lvl="1"/>
-            <a:r>
-              <a:rPr lang="en-US" dirty="0" smtClean="0"/>
-              <a:t>Descriptive</a:t>
-            </a:r>
-          </a:p>
-          <a:p>
-            <a:pPr lvl="1"/>
-            <a:r>
-              <a:rPr lang="en-US" dirty="0" smtClean="0"/>
-              <a:t>Statistical</a:t>
-            </a:r>
-          </a:p>
-          <a:p>
-            <a:endParaRPr lang="en-US" dirty="0" smtClean="0"/>
-          </a:p>
-          <a:p>
-            <a:endParaRPr lang="en-US" dirty="0"/>
-          </a:p>
-        </p:txBody>
-      </p:sp>
-      <p:sp>
-        <p:nvSpPr>
-          <p:cNvPr id="4" name="Content Placeholder 3"/>
+              <a:t>Course Outlines</a:t>
+            </a:r>
+            <a:endParaRPr lang="en-US" dirty="0"/>
+          </a:p>
+        </p:txBody>
+      </p:sp>
+      <p:sp>
+        <p:nvSpPr>
+          <p:cNvPr id="6" name="Content Placeholder 5"/>
           <p:cNvSpPr>
             <a:spLocks noGrp="1"/>
           </p:cNvSpPr>
@@ -6245,19 +6666,118 @@
             <p:ph sz="half" idx="2"/>
           </p:nvPr>
         </p:nvSpPr>
-        <p:spPr/>
-        <p:txBody>
-          <a:bodyPr/>
-          <a:lstStyle/>
-          <a:p>
-            <a:endParaRPr lang="en-US"/>
-          </a:p>
-        </p:txBody>
-      </p:sp>
+        <p:spPr>
+          <a:xfrm>
+            <a:off x="1097280" y="1786024"/>
+            <a:ext cx="4937760" cy="4174509"/>
+          </a:xfrm>
+        </p:spPr>
+        <p:txBody>
+          <a:bodyPr>
+            <a:normAutofit/>
+          </a:bodyPr>
+          <a:lstStyle/>
+          <a:p>
+            <a:pPr marL="457200" indent="-457200">
+              <a:buFont typeface="+mj-lt"/>
+              <a:buAutoNum type="arabicPeriod"/>
+            </a:pPr>
+            <a:r>
+              <a:rPr lang="en-US" dirty="0" smtClean="0"/>
+              <a:t>Network analysis basics</a:t>
+            </a:r>
+          </a:p>
+          <a:p>
+            <a:pPr marL="457200" indent="-457200">
+              <a:buFont typeface="+mj-lt"/>
+              <a:buAutoNum type="arabicPeriod"/>
+            </a:pPr>
+            <a:r>
+              <a:rPr lang="en-US" dirty="0" smtClean="0"/>
+              <a:t>Data</a:t>
+            </a:r>
+          </a:p>
+          <a:p>
+            <a:pPr marL="457200" indent="-457200">
+              <a:buFont typeface="+mj-lt"/>
+              <a:buAutoNum type="arabicPeriod"/>
+            </a:pPr>
+            <a:r>
+              <a:rPr lang="en-US" dirty="0" smtClean="0"/>
+              <a:t>Network descriptives</a:t>
+            </a:r>
+          </a:p>
+          <a:p>
+            <a:pPr marL="457200" indent="-457200">
+              <a:buFont typeface="+mj-lt"/>
+              <a:buAutoNum type="arabicPeriod"/>
+            </a:pPr>
+            <a:r>
+              <a:rPr lang="en-US" dirty="0" smtClean="0"/>
+              <a:t>Statistical models</a:t>
+            </a:r>
+          </a:p>
+          <a:p>
+            <a:pPr marL="457200" indent="-457200">
+              <a:buFont typeface="+mj-lt"/>
+              <a:buAutoNum type="arabicPeriod"/>
+            </a:pPr>
+            <a:r>
+              <a:rPr lang="en-US" dirty="0" smtClean="0"/>
+              <a:t>Diagnostics</a:t>
+            </a:r>
+          </a:p>
+          <a:p>
+            <a:pPr marL="457200" indent="-457200">
+              <a:buFont typeface="+mj-lt"/>
+              <a:buAutoNum type="arabicPeriod"/>
+            </a:pPr>
+            <a:r>
+              <a:rPr lang="en-US" dirty="0" smtClean="0"/>
+              <a:t>Model-based simulation</a:t>
+            </a:r>
+          </a:p>
+          <a:p>
+            <a:pPr marL="457200" indent="-457200">
+              <a:buFont typeface="+mj-lt"/>
+              <a:buAutoNum type="arabicPeriod"/>
+            </a:pPr>
+            <a:r>
+              <a:rPr lang="en-US" dirty="0" smtClean="0"/>
+              <a:t>Review and further topics</a:t>
+            </a:r>
+          </a:p>
+        </p:txBody>
+      </p:sp>
+      <p:graphicFrame>
+        <p:nvGraphicFramePr>
+          <p:cNvPr id="18" name="Content Placeholder 17"/>
+          <p:cNvGraphicFramePr>
+            <a:graphicFrameLocks noGrp="1"/>
+          </p:cNvGraphicFramePr>
+          <p:nvPr>
+            <p:ph sz="quarter" idx="4"/>
+            <p:extLst>
+              <p:ext uri="{D42A27DB-BD31-4B8C-83A1-F6EECF244321}">
+                <p14:modId xmlns:p14="http://schemas.microsoft.com/office/powerpoint/2010/main" val="2413052801"/>
+              </p:ext>
+            </p:extLst>
+          </p:nvPr>
+        </p:nvGraphicFramePr>
+        <p:xfrm>
+          <a:off x="4544175" y="1609255"/>
+          <a:ext cx="6822849" cy="4034292"/>
+        </p:xfrm>
+        <a:graphic>
+          <a:graphicData uri="http://schemas.openxmlformats.org/drawingml/2006/chart">
+            <c:chart xmlns:c="http://schemas.openxmlformats.org/drawingml/2006/chart" xmlns:r="http://schemas.openxmlformats.org/officeDocument/2006/relationships" r:id="rId2"/>
+          </a:graphicData>
+        </a:graphic>
+      </p:graphicFrame>
     </p:spTree>
     <p:extLst>
       <p:ext uri="{BB962C8B-B14F-4D97-AF65-F5344CB8AC3E}">
-        <p14:creationId xmlns:p14="http://schemas.microsoft.com/office/powerpoint/2010/main" val="3056376447"/>
+        <p14:creationId xmlns:p14="http://schemas.microsoft.com/office/powerpoint/2010/main" val="1776018726"/>
       </p:ext>
     </p:extLst>
   </p:cSld>
@@ -6301,6 +6821,341 @@
           <a:p>
             <a:r>
               <a:rPr lang="en-US" dirty="0" smtClean="0"/>
+              <a:t>Network Analysis Basics</a:t>
+            </a:r>
+            <a:endParaRPr lang="en-US" dirty="0"/>
+          </a:p>
+        </p:txBody>
+      </p:sp>
+      <p:sp>
+        <p:nvSpPr>
+          <p:cNvPr id="3" name="Content Placeholder 2"/>
+          <p:cNvSpPr>
+            <a:spLocks noGrp="1"/>
+          </p:cNvSpPr>
+          <p:nvPr>
+            <p:ph sz="half" idx="1"/>
+          </p:nvPr>
+        </p:nvSpPr>
+        <p:spPr/>
+        <p:txBody>
+          <a:bodyPr>
+            <a:normAutofit fontScale="92500" lnSpcReduction="10000"/>
+          </a:bodyPr>
+          <a:lstStyle/>
+          <a:p>
+            <a:r>
+              <a:rPr lang="en-US" dirty="0" smtClean="0"/>
+              <a:t>Motivation</a:t>
+            </a:r>
+          </a:p>
+          <a:p>
+            <a:pPr lvl="1"/>
+            <a:r>
+              <a:rPr lang="en-US" dirty="0" smtClean="0"/>
+              <a:t>What is a network</a:t>
+            </a:r>
+            <a:r>
+              <a:rPr lang="en-US" dirty="0" smtClean="0"/>
+              <a:t>?</a:t>
+            </a:r>
+          </a:p>
+          <a:p>
+            <a:pPr lvl="2"/>
+            <a:r>
+              <a:rPr lang="en-US" dirty="0" smtClean="0"/>
+              <a:t>Nodes (vertices, actors)</a:t>
+            </a:r>
+          </a:p>
+          <a:p>
+            <a:pPr lvl="3"/>
+            <a:r>
+              <a:rPr lang="en-US" dirty="0" smtClean="0"/>
+              <a:t>Can have attributes associated</a:t>
+            </a:r>
+          </a:p>
+          <a:p>
+            <a:pPr lvl="2"/>
+            <a:r>
+              <a:rPr lang="en-US" dirty="0" smtClean="0"/>
+              <a:t>Ties (edges, links)</a:t>
+            </a:r>
+          </a:p>
+          <a:p>
+            <a:pPr lvl="3"/>
+            <a:r>
+              <a:rPr lang="en-US" dirty="0" smtClean="0"/>
+              <a:t>Can be directed/undirected and valued/binary</a:t>
+            </a:r>
+            <a:endParaRPr lang="en-US" dirty="0" smtClean="0"/>
+          </a:p>
+          <a:p>
+            <a:pPr lvl="1"/>
+            <a:r>
+              <a:rPr lang="en-US" dirty="0" smtClean="0"/>
+              <a:t>What can be represented as a network?</a:t>
+            </a:r>
+          </a:p>
+          <a:p>
+            <a:pPr lvl="1"/>
+            <a:r>
+              <a:rPr lang="en-US" dirty="0" smtClean="0"/>
+              <a:t>What kind of questions can we answer</a:t>
+            </a:r>
+            <a:r>
+              <a:rPr lang="en-US" dirty="0" smtClean="0"/>
+              <a:t>?</a:t>
+            </a:r>
+          </a:p>
+          <a:p>
+            <a:r>
+              <a:rPr lang="en-US" dirty="0" smtClean="0"/>
+              <a:t>Definitions</a:t>
+            </a:r>
+          </a:p>
+          <a:p>
+            <a:pPr lvl="1"/>
+            <a:r>
+              <a:rPr lang="en-US" dirty="0" smtClean="0"/>
+              <a:t>Types of networks</a:t>
+            </a:r>
+          </a:p>
+          <a:p>
+            <a:pPr lvl="1"/>
+            <a:r>
+              <a:rPr lang="en-US" dirty="0" smtClean="0"/>
+              <a:t>Configurations: dyads, triads, k</a:t>
+            </a:r>
+            <a:r>
+              <a:rPr lang="en-US" smtClean="0"/>
+              <a:t>-stars</a:t>
+            </a:r>
+            <a:endParaRPr lang="en-US" dirty="0" smtClean="0"/>
+          </a:p>
+          <a:p>
+            <a:pPr lvl="1"/>
+            <a:endParaRPr lang="en-US" dirty="0" smtClean="0"/>
+          </a:p>
+          <a:p>
+            <a:r>
+              <a:rPr lang="en-US" dirty="0" smtClean="0"/>
+              <a:t>Types </a:t>
+            </a:r>
+            <a:r>
+              <a:rPr lang="en-US" dirty="0" smtClean="0"/>
+              <a:t>of network analysis</a:t>
+            </a:r>
+          </a:p>
+          <a:p>
+            <a:pPr lvl="1"/>
+            <a:r>
+              <a:rPr lang="en-US" dirty="0" smtClean="0"/>
+              <a:t>Descriptive</a:t>
+            </a:r>
+          </a:p>
+          <a:p>
+            <a:pPr lvl="1"/>
+            <a:r>
+              <a:rPr lang="en-US" dirty="0" smtClean="0"/>
+              <a:t>Statistical</a:t>
+            </a:r>
+          </a:p>
+          <a:p>
+            <a:endParaRPr lang="en-US" dirty="0" smtClean="0"/>
+          </a:p>
+          <a:p>
+            <a:endParaRPr lang="en-US" dirty="0"/>
+          </a:p>
+        </p:txBody>
+      </p:sp>
+      <p:sp>
+        <p:nvSpPr>
+          <p:cNvPr id="4" name="Content Placeholder 3"/>
+          <p:cNvSpPr>
+            <a:spLocks noGrp="1"/>
+          </p:cNvSpPr>
+          <p:nvPr>
+            <p:ph sz="half" idx="2"/>
+          </p:nvPr>
+        </p:nvSpPr>
+        <p:spPr/>
+        <p:txBody>
+          <a:bodyPr>
+            <a:normAutofit fontScale="92500" lnSpcReduction="10000"/>
+          </a:bodyPr>
+          <a:lstStyle/>
+          <a:p>
+            <a:r>
+              <a:rPr lang="en-US" dirty="0" smtClean="0"/>
+              <a:t>Examples:</a:t>
+            </a:r>
+          </a:p>
+          <a:p>
+            <a:pPr lvl="1"/>
+            <a:r>
+              <a:rPr lang="en-US" dirty="0" smtClean="0"/>
+              <a:t>Friendship (node </a:t>
+            </a:r>
+            <a:r>
+              <a:rPr lang="en-US" i="1" dirty="0" err="1" smtClean="0">
+                <a:latin typeface="Times New Roman"/>
+                <a:cs typeface="Times New Roman"/>
+              </a:rPr>
+              <a:t>i</a:t>
+            </a:r>
+            <a:r>
+              <a:rPr lang="en-US" dirty="0" smtClean="0"/>
+              <a:t> likes </a:t>
+            </a:r>
+            <a:r>
+              <a:rPr lang="en-US" i="1" dirty="0" smtClean="0">
+                <a:latin typeface="Times New Roman"/>
+                <a:cs typeface="Times New Roman"/>
+              </a:rPr>
+              <a:t>j</a:t>
+            </a:r>
+            <a:r>
+              <a:rPr lang="en-US" dirty="0" smtClean="0"/>
+              <a:t>)</a:t>
+            </a:r>
+          </a:p>
+          <a:p>
+            <a:pPr lvl="1"/>
+            <a:r>
+              <a:rPr lang="en-US" dirty="0" smtClean="0"/>
+              <a:t>Sexual contact (nodes </a:t>
+            </a:r>
+            <a:r>
+              <a:rPr lang="en-US" i="1" dirty="0" err="1" smtClean="0">
+                <a:latin typeface="Times New Roman"/>
+                <a:cs typeface="Times New Roman"/>
+              </a:rPr>
+              <a:t>i</a:t>
+            </a:r>
+            <a:r>
+              <a:rPr lang="en-US" dirty="0" smtClean="0"/>
+              <a:t> and </a:t>
+            </a:r>
+            <a:r>
+              <a:rPr lang="en-US" i="1" dirty="0" smtClean="0">
+                <a:latin typeface="Times New Roman"/>
+                <a:cs typeface="Times New Roman"/>
+              </a:rPr>
+              <a:t>j</a:t>
+            </a:r>
+            <a:r>
+              <a:rPr lang="en-US" dirty="0" smtClean="0"/>
+              <a:t> have a relationship) </a:t>
+            </a:r>
+          </a:p>
+          <a:p>
+            <a:pPr lvl="1"/>
+            <a:r>
+              <a:rPr lang="en-US" dirty="0" smtClean="0"/>
+              <a:t>Affiliation (node </a:t>
+            </a:r>
+            <a:r>
+              <a:rPr lang="en-US" i="1" dirty="0" err="1" smtClean="0">
+                <a:latin typeface="Times New Roman"/>
+                <a:cs typeface="Times New Roman"/>
+              </a:rPr>
+              <a:t>i</a:t>
+            </a:r>
+            <a:r>
+              <a:rPr lang="en-US" dirty="0" smtClean="0"/>
+              <a:t> is a member of club </a:t>
+            </a:r>
+            <a:r>
+              <a:rPr lang="en-US" i="1" dirty="0" smtClean="0">
+                <a:latin typeface="Times New Roman"/>
+                <a:cs typeface="Times New Roman"/>
+              </a:rPr>
+              <a:t>a</a:t>
+            </a:r>
+            <a:r>
+              <a:rPr lang="en-US" dirty="0" smtClean="0"/>
+              <a:t>)</a:t>
+            </a:r>
+          </a:p>
+          <a:p>
+            <a:pPr lvl="1"/>
+            <a:r>
+              <a:rPr lang="en-US" dirty="0" smtClean="0"/>
+              <a:t>Social role (</a:t>
+            </a:r>
+            <a:r>
+              <a:rPr lang="en-US" i="1" dirty="0" err="1" smtClean="0">
+                <a:latin typeface="Times New Roman"/>
+                <a:cs typeface="Times New Roman"/>
+              </a:rPr>
+              <a:t>i</a:t>
+            </a:r>
+            <a:r>
+              <a:rPr lang="en-US" dirty="0" smtClean="0"/>
+              <a:t> gives advice to </a:t>
+            </a:r>
+            <a:r>
+              <a:rPr lang="en-US" i="1" dirty="0" smtClean="0">
+                <a:latin typeface="Times New Roman"/>
+                <a:cs typeface="Times New Roman"/>
+              </a:rPr>
+              <a:t>j</a:t>
+            </a:r>
+            <a:r>
+              <a:rPr lang="en-US" dirty="0" smtClean="0"/>
+              <a:t>)</a:t>
+            </a:r>
+            <a:endParaRPr lang="en-US" dirty="0"/>
+          </a:p>
+        </p:txBody>
+      </p:sp>
+    </p:spTree>
+    <p:extLst>
+      <p:ext uri="{BB962C8B-B14F-4D97-AF65-F5344CB8AC3E}">
+        <p14:creationId xmlns:p14="http://schemas.microsoft.com/office/powerpoint/2010/main" val="3056376447"/>
+      </p:ext>
+    </p:extLst>
+  </p:cSld>
+  <p:clrMapOvr>
+    <a:masterClrMapping/>
+  </p:clrMapOvr>
+</p:sld>
+</file>
+
+<file path=ppt/slides/slide7.xml><?xml version="1.0" encoding="utf-8"?>
+<p:sld xmlns:a="http://schemas.openxmlformats.org/drawingml/2006/main" xmlns:r="http://schemas.openxmlformats.org/officeDocument/2006/relationships" xmlns:p="http://schemas.openxmlformats.org/presentationml/2006/main">
+  <p:cSld>
+    <p:spTree>
+      <p:nvGrpSpPr>
+        <p:cNvPr id="1" name=""/>
+        <p:cNvGrpSpPr/>
+        <p:nvPr/>
+      </p:nvGrpSpPr>
+      <p:grpSpPr>
+        <a:xfrm>
+          <a:off x="0" y="0"/>
+          <a:ext cx="0" cy="0"/>
+          <a:chOff x="0" y="0"/>
+          <a:chExt cx="0" cy="0"/>
+        </a:xfrm>
+      </p:grpSpPr>
+      <p:sp>
+        <p:nvSpPr>
+          <p:cNvPr id="2" name="Title 1"/>
+          <p:cNvSpPr>
+            <a:spLocks noGrp="1"/>
+          </p:cNvSpPr>
+          <p:nvPr>
+            <p:ph type="title"/>
+          </p:nvPr>
+        </p:nvSpPr>
+        <p:spPr/>
+        <p:txBody>
+          <a:bodyPr/>
+          <a:lstStyle/>
+          <a:p>
+            <a:r>
+              <a:rPr lang="en-US" dirty="0" smtClean="0"/>
               <a:t>Data</a:t>
             </a:r>
             <a:endParaRPr lang="en-US" dirty="0"/>
@@ -6321,6 +7176,19 @@
         <p:txBody>
           <a:bodyPr/>
           <a:lstStyle/>
+          <a:p>
+            <a:r>
+              <a:rPr lang="en-US" dirty="0" smtClean="0"/>
+              <a:t>Data collection</a:t>
+            </a:r>
+          </a:p>
+          <a:p>
+            <a:pPr lvl="1"/>
+            <a:r>
+              <a:rPr lang="en-US" dirty="0" smtClean="0"/>
+              <a:t>Sampling designs</a:t>
+            </a:r>
+          </a:p>
           <a:p>
             <a:r>
               <a:rPr lang="en-US" dirty="0" smtClean="0"/>
@@ -6342,18 +7210,32 @@
           <a:p>
             <a:r>
               <a:rPr lang="en-US" dirty="0" smtClean="0"/>
-              <a:t>Network data as a graph</a:t>
+              <a:t>Data presentation</a:t>
             </a:r>
           </a:p>
           <a:p>
             <a:pPr lvl="1"/>
             <a:r>
               <a:rPr lang="en-US" dirty="0" smtClean="0"/>
-              <a:t>Graph notation </a:t>
+              <a:t>Numeric (matrices)</a:t>
             </a:r>
           </a:p>
           <a:p>
             <a:pPr lvl="1"/>
+            <a:r>
+              <a:rPr lang="en-US" dirty="0" smtClean="0"/>
+              <a:t>Pictorial (graphs)</a:t>
+            </a:r>
+          </a:p>
+          <a:p>
+            <a:pPr lvl="2"/>
+            <a:r>
+              <a:rPr lang="en-US" dirty="0" smtClean="0"/>
+              <a:t>Graph notation</a:t>
+            </a:r>
+          </a:p>
+          <a:p>
+            <a:pPr lvl="2"/>
             <a:r>
               <a:rPr lang="en-US" dirty="0" smtClean="0"/>
               <a:t>Graph terminology</a:t>
@@ -6425,22 +7307,28 @@
       </p:pic>
       <p:pic>
         <p:nvPicPr>
-          <p:cNvPr id="10" name="Picture 9"/>
+          <p:cNvPr id="4" name="Picture 3" descr="snet_plot.png"/>
           <p:cNvPicPr>
             <a:picLocks noChangeAspect="1"/>
           </p:cNvPicPr>
           <p:nvPr/>
         </p:nvPicPr>
         <p:blipFill>
-          <a:blip r:embed="rId4"/>
+          <a:blip r:embed="rId4">
+            <a:extLst>
+              <a:ext uri="{28A0092B-C50C-407E-A947-70E740481C1C}">
+                <a14:useLocalDpi xmlns:a14="http://schemas.microsoft.com/office/drawing/2010/main" val="0"/>
+              </a:ext>
+            </a:extLst>
+          </a:blip>
           <a:stretch>
             <a:fillRect/>
           </a:stretch>
         </p:blipFill>
         <p:spPr>
           <a:xfrm>
-            <a:off x="6639066" y="3903530"/>
-            <a:ext cx="2593238" cy="2410560"/>
+            <a:off x="6260284" y="3872216"/>
+            <a:ext cx="2581275" cy="2400300"/>
           </a:xfrm>
           <a:prstGeom prst="rect">
             <a:avLst/>
@@ -6460,7 +7348,7 @@
 </p:sld>
 </file>
 
-<file path=ppt/slides/slide7.xml><?xml version="1.0" encoding="utf-8"?>
+<file path=ppt/slides/slide8.xml><?xml version="1.0" encoding="utf-8"?>
 <p:sld xmlns:a="http://schemas.openxmlformats.org/drawingml/2006/main" xmlns:r="http://schemas.openxmlformats.org/officeDocument/2006/relationships" xmlns:p="http://schemas.openxmlformats.org/presentationml/2006/main">
   <p:cSld>
     <p:spTree>
@@ -6550,7 +7438,87 @@
           <a:p>
             <a:r>
               <a:rPr lang="en-US" dirty="0" smtClean="0"/>
-              <a:t>Uploading to statnetWeb</a:t>
+              <a:t>Uploading to </a:t>
+            </a:r>
+            <a:r>
+              <a:rPr lang="en-US" dirty="0" err="1" smtClean="0"/>
+              <a:t>statnetWeb</a:t>
+            </a:r>
+            <a:endParaRPr lang="en-US" dirty="0" smtClean="0"/>
+          </a:p>
+          <a:p>
+            <a:pPr lvl="1"/>
+            <a:r>
+              <a:rPr lang="en-US" dirty="0" smtClean="0"/>
+              <a:t>Matrices (.</a:t>
+            </a:r>
+            <a:r>
+              <a:rPr lang="en-US" dirty="0" err="1" smtClean="0"/>
+              <a:t>csv</a:t>
+            </a:r>
+            <a:r>
+              <a:rPr lang="en-US" dirty="0" smtClean="0"/>
+              <a:t> or R-object)</a:t>
+            </a:r>
+          </a:p>
+          <a:p>
+            <a:pPr lvl="2"/>
+            <a:r>
+              <a:rPr lang="en-US" dirty="0" smtClean="0"/>
+              <a:t>Adjacency matrices should have node labels in the first row and column of .</a:t>
+            </a:r>
+            <a:r>
+              <a:rPr lang="en-US" dirty="0" err="1" smtClean="0"/>
+              <a:t>csv</a:t>
+            </a:r>
+            <a:r>
+              <a:rPr lang="en-US" dirty="0" smtClean="0"/>
+              <a:t> files</a:t>
+            </a:r>
+          </a:p>
+          <a:p>
+            <a:pPr lvl="2"/>
+            <a:r>
+              <a:rPr lang="en-US" dirty="0" smtClean="0"/>
+              <a:t>Incidence matrices should have edge labels in the first row and node labels in the first column of .</a:t>
+            </a:r>
+            <a:r>
+              <a:rPr lang="en-US" dirty="0" err="1" smtClean="0"/>
+              <a:t>csv</a:t>
+            </a:r>
+            <a:r>
+              <a:rPr lang="en-US" dirty="0" smtClean="0"/>
+              <a:t> files</a:t>
+            </a:r>
+          </a:p>
+          <a:p>
+            <a:pPr lvl="2"/>
+            <a:r>
+              <a:rPr lang="en-US" dirty="0" smtClean="0"/>
+              <a:t>Edge lists should </a:t>
+            </a:r>
+            <a:r>
+              <a:rPr lang="en-US" i="1" dirty="0" smtClean="0"/>
+              <a:t>not</a:t>
+            </a:r>
+            <a:r>
+              <a:rPr lang="en-US" dirty="0" smtClean="0"/>
+              <a:t> have row or column labels in .</a:t>
+            </a:r>
+            <a:r>
+              <a:rPr lang="en-US" dirty="0" err="1" smtClean="0"/>
+              <a:t>csv</a:t>
+            </a:r>
+            <a:r>
+              <a:rPr lang="en-US" dirty="0" smtClean="0"/>
+              <a:t> files</a:t>
+            </a:r>
+          </a:p>
+          <a:p>
+            <a:pPr lvl="1"/>
+            <a:r>
+              <a:rPr lang="en-US" dirty="0" smtClean="0"/>
+              <a:t>Built-in datasets</a:t>
             </a:r>
           </a:p>
           <a:p>
@@ -6570,9 +7538,17 @@
               <a:rPr lang="en-US" dirty="0" err="1" smtClean="0"/>
               <a:t>Pajek</a:t>
             </a:r>
-            <a:r>
-              <a:rPr lang="en-US" dirty="0" smtClean="0"/>
-              <a:t> network (</a:t>
+            <a:endParaRPr lang="en-US" dirty="0" smtClean="0"/>
+          </a:p>
+          <a:p>
+            <a:pPr lvl="2"/>
+            <a:r>
+              <a:rPr lang="en-US" dirty="0"/>
+              <a:t>N</a:t>
+            </a:r>
+            <a:r>
+              <a:rPr lang="en-US" dirty="0" smtClean="0"/>
+              <a:t>etwork (</a:t>
             </a:r>
             <a:r>
               <a:rPr lang="en-US" dirty="0" err="1" smtClean="0"/>
@@ -6584,14 +7560,14 @@
             </a:r>
           </a:p>
           <a:p>
-            <a:pPr lvl="1"/>
-            <a:r>
-              <a:rPr lang="en-US" dirty="0" err="1" smtClean="0"/>
-              <a:t>Pajek</a:t>
-            </a:r>
-            <a:r>
-              <a:rPr lang="en-US" dirty="0" smtClean="0"/>
-              <a:t> project (.</a:t>
+            <a:pPr lvl="2"/>
+            <a:r>
+              <a:rPr lang="en-US" dirty="0"/>
+              <a:t>P</a:t>
+            </a:r>
+            <a:r>
+              <a:rPr lang="en-US" dirty="0" smtClean="0"/>
+              <a:t>roject (.</a:t>
             </a:r>
             <a:r>
               <a:rPr lang="en-US" dirty="0" err="1" smtClean="0"/>
@@ -6600,42 +7576,6 @@
             <a:r>
               <a:rPr lang="en-US" dirty="0" smtClean="0"/>
               <a:t>)</a:t>
-            </a:r>
-          </a:p>
-          <a:p>
-            <a:pPr lvl="1"/>
-            <a:r>
-              <a:rPr lang="en-US" dirty="0" smtClean="0"/>
-              <a:t>Matrices (.csv or R-object)</a:t>
-            </a:r>
-          </a:p>
-          <a:p>
-            <a:pPr lvl="2"/>
-            <a:r>
-              <a:rPr lang="en-US" dirty="0" smtClean="0"/>
-              <a:t> Adjacency matrices should have node labels in the first row and column of .csv files</a:t>
-            </a:r>
-          </a:p>
-          <a:p>
-            <a:pPr lvl="2"/>
-            <a:r>
-              <a:rPr lang="en-US" dirty="0" smtClean="0"/>
-              <a:t>Incidence matrices should have edge labels in the first row and node labels in the first column of .csv files</a:t>
-            </a:r>
-          </a:p>
-          <a:p>
-            <a:pPr lvl="2"/>
-            <a:r>
-              <a:rPr lang="en-US" dirty="0" smtClean="0"/>
-              <a:t>Edge lists should </a:t>
-            </a:r>
-            <a:r>
-              <a:rPr lang="en-US" i="1" dirty="0" smtClean="0"/>
-              <a:t>not</a:t>
-            </a:r>
-            <a:r>
-              <a:rPr lang="en-US" dirty="0" smtClean="0"/>
-              <a:t> have row or column labels in .csv files</a:t>
             </a:r>
           </a:p>
           <a:p>
@@ -6675,7 +7615,7 @@
                   </a:schemeClr>
                 </a:solidFill>
               </a:rPr>
-              <a:t>For most of the workshop we will be using the pre-loaded sample networks to standardize our results </a:t>
+              <a:t>For most of the workshop we will be using the built-in networks to standardize our results </a:t>
             </a:r>
             <a:endParaRPr lang="en-US" dirty="0">
               <a:solidFill>
@@ -6731,350 +7671,6 @@
 </p:sld>
 </file>
 
-<file path=ppt/slides/slide8.xml><?xml version="1.0" encoding="utf-8"?>
-<p:sld xmlns:a="http://schemas.openxmlformats.org/drawingml/2006/main" xmlns:r="http://schemas.openxmlformats.org/officeDocument/2006/relationships" xmlns:p="http://schemas.openxmlformats.org/presentationml/2006/main">
-  <p:cSld>
-    <p:spTree>
-      <p:nvGrpSpPr>
-        <p:cNvPr id="1" name=""/>
-        <p:cNvGrpSpPr/>
-        <p:nvPr/>
-      </p:nvGrpSpPr>
-      <p:grpSpPr>
-        <a:xfrm>
-          <a:off x="0" y="0"/>
-          <a:ext cx="0" cy="0"/>
-          <a:chOff x="0" y="0"/>
-          <a:chExt cx="0" cy="0"/>
-        </a:xfrm>
-      </p:grpSpPr>
-      <p:sp>
-        <p:nvSpPr>
-          <p:cNvPr id="2" name="Title 1"/>
-          <p:cNvSpPr>
-            <a:spLocks noGrp="1"/>
-          </p:cNvSpPr>
-          <p:nvPr>
-            <p:ph type="title"/>
-          </p:nvPr>
-        </p:nvSpPr>
-        <p:spPr>
-          <a:xfrm>
-            <a:off x="1097280" y="286604"/>
-            <a:ext cx="10058400" cy="890850"/>
-          </a:xfrm>
-        </p:spPr>
-        <p:txBody>
-          <a:bodyPr/>
-          <a:lstStyle/>
-          <a:p>
-            <a:r>
-              <a:rPr lang="en-US" dirty="0" smtClean="0"/>
-              <a:t>Network Descriptives</a:t>
-            </a:r>
-            <a:endParaRPr lang="en-US" dirty="0"/>
-          </a:p>
-        </p:txBody>
-      </p:sp>
-      <p:sp>
-        <p:nvSpPr>
-          <p:cNvPr id="3" name="Content Placeholder 2"/>
-          <p:cNvSpPr>
-            <a:spLocks noGrp="1"/>
-          </p:cNvSpPr>
-          <p:nvPr>
-            <p:ph sz="half" idx="1"/>
-          </p:nvPr>
-        </p:nvSpPr>
-        <p:spPr/>
-        <p:txBody>
-          <a:bodyPr>
-            <a:normAutofit/>
-          </a:bodyPr>
-          <a:lstStyle/>
-          <a:p>
-            <a:r>
-              <a:rPr lang="en-US" dirty="0" smtClean="0"/>
-              <a:t>With some initial insight </a:t>
-            </a:r>
-            <a:r>
-              <a:rPr lang="en-US" dirty="0"/>
-              <a:t>into </a:t>
-            </a:r>
-            <a:r>
-              <a:rPr lang="en-US" dirty="0" smtClean="0"/>
-              <a:t>structure of the observed network, </a:t>
-            </a:r>
-            <a:r>
-              <a:rPr lang="en-US" smtClean="0"/>
-              <a:t>we get</a:t>
-            </a:r>
-            <a:endParaRPr lang="en-US" dirty="0"/>
-          </a:p>
-          <a:p>
-            <a:pPr lvl="1"/>
-            <a:r>
-              <a:rPr lang="en-US" dirty="0" smtClean="0"/>
-              <a:t>Better model formulations</a:t>
-            </a:r>
-          </a:p>
-          <a:p>
-            <a:pPr lvl="1"/>
-            <a:r>
-              <a:rPr lang="en-US" dirty="0" smtClean="0"/>
-              <a:t>Better interpretation of results</a:t>
-            </a:r>
-          </a:p>
-          <a:p>
-            <a:r>
-              <a:rPr lang="en-US" dirty="0" smtClean="0"/>
-              <a:t>Network plot</a:t>
-            </a:r>
-          </a:p>
-          <a:p>
-            <a:pPr lvl="1"/>
-            <a:r>
-              <a:rPr lang="en-US" dirty="0" smtClean="0"/>
-              <a:t>Color code nodes by attributes</a:t>
-            </a:r>
-          </a:p>
-          <a:p>
-            <a:pPr lvl="1"/>
-            <a:r>
-              <a:rPr lang="en-US" dirty="0" smtClean="0"/>
-              <a:t>Size by numeric attributes or </a:t>
-            </a:r>
-            <a:r>
-              <a:rPr lang="en-US" dirty="0" err="1" smtClean="0"/>
-              <a:t>betweenness</a:t>
-            </a:r>
-            <a:endParaRPr lang="en-US" dirty="0" smtClean="0"/>
-          </a:p>
-          <a:p>
-            <a:pPr lvl="2"/>
-            <a:r>
-              <a:rPr lang="en-US" dirty="0" smtClean="0"/>
-              <a:t>Note: if larger nodes obscure small ones you can edit the opacity to ensure that all nodes are visible</a:t>
-            </a:r>
-          </a:p>
-        </p:txBody>
-      </p:sp>
-      <p:sp>
-        <p:nvSpPr>
-          <p:cNvPr id="4" name="Content Placeholder 3"/>
-          <p:cNvSpPr>
-            <a:spLocks noGrp="1"/>
-          </p:cNvSpPr>
-          <p:nvPr>
-            <p:ph sz="half" idx="2"/>
-          </p:nvPr>
-        </p:nvSpPr>
-        <p:spPr/>
-        <p:txBody>
-          <a:bodyPr>
-            <a:normAutofit/>
-          </a:bodyPr>
-          <a:lstStyle/>
-          <a:p>
-            <a:r>
-              <a:rPr lang="en-US" dirty="0" smtClean="0">
-                <a:solidFill>
-                  <a:srgbClr val="0070C0"/>
-                </a:solidFill>
-              </a:rPr>
-              <a:t>Interactive: </a:t>
-            </a:r>
-            <a:r>
-              <a:rPr lang="en-US" dirty="0"/>
-              <a:t>L</a:t>
-            </a:r>
-            <a:r>
-              <a:rPr lang="en-US" dirty="0" smtClean="0"/>
-              <a:t>oad the </a:t>
-            </a:r>
-            <a:r>
-              <a:rPr lang="en-US" dirty="0" err="1" smtClean="0"/>
-              <a:t>faux.mesa.high</a:t>
-            </a:r>
-            <a:r>
-              <a:rPr lang="en-US" dirty="0" smtClean="0"/>
-              <a:t> data and examine the network plot.</a:t>
-            </a:r>
-          </a:p>
-          <a:p>
-            <a:pPr lvl="1"/>
-            <a:endParaRPr lang="en-US" dirty="0" smtClean="0"/>
-          </a:p>
-          <a:p>
-            <a:pPr lvl="1"/>
-            <a:endParaRPr lang="en-US" dirty="0" smtClean="0"/>
-          </a:p>
-          <a:p>
-            <a:pPr lvl="1"/>
-            <a:endParaRPr lang="en-US" dirty="0" smtClean="0"/>
-          </a:p>
-          <a:p>
-            <a:pPr lvl="1"/>
-            <a:endParaRPr lang="en-US" dirty="0"/>
-          </a:p>
-          <a:p>
-            <a:pPr lvl="1"/>
-            <a:endParaRPr lang="en-US" dirty="0"/>
-          </a:p>
-          <a:p>
-            <a:pPr lvl="1"/>
-            <a:r>
-              <a:rPr lang="en-US" dirty="0" smtClean="0"/>
-              <a:t>Play </a:t>
-            </a:r>
-            <a:r>
-              <a:rPr lang="en-US" dirty="0" smtClean="0"/>
-              <a:t>around with color-coding the nodes</a:t>
-            </a:r>
-          </a:p>
-          <a:p>
-            <a:pPr lvl="1"/>
-            <a:r>
-              <a:rPr lang="en-US" dirty="0" smtClean="0"/>
-              <a:t>What do you notice after color-coding the nodes based on grade?</a:t>
-            </a:r>
-          </a:p>
-          <a:p>
-            <a:pPr lvl="1"/>
-            <a:r>
-              <a:rPr lang="en-US" dirty="0" smtClean="0"/>
-              <a:t>Now edit the size of the nodes based on </a:t>
-            </a:r>
-            <a:r>
-              <a:rPr lang="en-US" dirty="0" err="1" smtClean="0"/>
-              <a:t>betweenness</a:t>
-            </a:r>
-            <a:r>
-              <a:rPr lang="en-US" dirty="0" smtClean="0"/>
-              <a:t>.</a:t>
-            </a:r>
-            <a:endParaRPr lang="en-US" dirty="0" smtClean="0"/>
-          </a:p>
-          <a:p>
-            <a:r>
-              <a:rPr lang="en-US" dirty="0" smtClean="0"/>
-              <a:t>What have we already learned about the social structure of this school?</a:t>
-            </a:r>
-          </a:p>
-          <a:p>
-            <a:endParaRPr lang="en-US" dirty="0" smtClean="0"/>
-          </a:p>
-        </p:txBody>
-      </p:sp>
-      <p:pic>
-        <p:nvPicPr>
-          <p:cNvPr id="5" name="Picture 4" descr="sw_nwplot.png"/>
-          <p:cNvPicPr>
-            <a:picLocks noChangeAspect="1"/>
-          </p:cNvPicPr>
-          <p:nvPr/>
-        </p:nvPicPr>
-        <p:blipFill>
-          <a:blip r:embed="rId2">
-            <a:extLst>
-              <a:ext uri="{28A0092B-C50C-407E-A947-70E740481C1C}">
-                <a14:useLocalDpi xmlns:a14="http://schemas.microsoft.com/office/drawing/2010/main" val="0"/>
-              </a:ext>
-            </a:extLst>
-          </a:blip>
-          <a:stretch>
-            <a:fillRect/>
-          </a:stretch>
-        </p:blipFill>
-        <p:spPr>
-          <a:xfrm>
-            <a:off x="7064183" y="1993667"/>
-            <a:ext cx="2997978" cy="1525832"/>
-          </a:xfrm>
-          <a:prstGeom prst="rect">
-            <a:avLst/>
-          </a:prstGeom>
-        </p:spPr>
-      </p:pic>
-      <p:cxnSp>
-        <p:nvCxnSpPr>
-          <p:cNvPr id="7" name="Straight Arrow Connector 6"/>
-          <p:cNvCxnSpPr/>
-          <p:nvPr/>
-        </p:nvCxnSpPr>
-        <p:spPr>
-          <a:xfrm flipH="1">
-            <a:off x="9868691" y="2884097"/>
-            <a:ext cx="648211" cy="79379"/>
-          </a:xfrm>
-          <a:prstGeom prst="straightConnector1">
-            <a:avLst/>
-          </a:prstGeom>
-          <a:ln>
-            <a:tailEnd type="arrow"/>
-          </a:ln>
-        </p:spPr>
-        <p:style>
-          <a:lnRef idx="2">
-            <a:schemeClr val="accent1"/>
-          </a:lnRef>
-          <a:fillRef idx="0">
-            <a:schemeClr val="accent1"/>
-          </a:fillRef>
-          <a:effectRef idx="1">
-            <a:schemeClr val="accent1"/>
-          </a:effectRef>
-          <a:fontRef idx="minor">
-            <a:schemeClr val="tx1"/>
-          </a:fontRef>
-        </p:style>
-      </p:cxnSp>
-      <p:cxnSp>
-        <p:nvCxnSpPr>
-          <p:cNvPr id="9" name="Straight Arrow Connector 8"/>
-          <p:cNvCxnSpPr/>
-          <p:nvPr/>
-        </p:nvCxnSpPr>
-        <p:spPr>
-          <a:xfrm flipH="1" flipV="1">
-            <a:off x="9868691" y="3188383"/>
-            <a:ext cx="542381" cy="52919"/>
-          </a:xfrm>
-          <a:prstGeom prst="straightConnector1">
-            <a:avLst/>
-          </a:prstGeom>
-          <a:ln>
-            <a:tailEnd type="arrow"/>
-          </a:ln>
-        </p:spPr>
-        <p:style>
-          <a:lnRef idx="2">
-            <a:schemeClr val="accent1"/>
-          </a:lnRef>
-          <a:fillRef idx="0">
-            <a:schemeClr val="accent1"/>
-          </a:fillRef>
-          <a:effectRef idx="1">
-            <a:schemeClr val="accent1"/>
-          </a:effectRef>
-          <a:fontRef idx="minor">
-            <a:schemeClr val="tx1"/>
-          </a:fontRef>
-        </p:style>
-      </p:cxnSp>
-    </p:spTree>
-    <p:extLst>
-      <p:ext uri="{BB962C8B-B14F-4D97-AF65-F5344CB8AC3E}">
-        <p14:creationId xmlns:p14="http://schemas.microsoft.com/office/powerpoint/2010/main" val="4243777039"/>
-      </p:ext>
-    </p:extLst>
-  </p:cSld>
-  <p:clrMapOvr>
-    <a:masterClrMapping/>
-  </p:clrMapOvr>
-</p:sld>
-</file>
-
 <file path=ppt/slides/slide9.xml><?xml version="1.0" encoding="utf-8"?>
 <p:sld xmlns:a="http://schemas.openxmlformats.org/drawingml/2006/main" xmlns:r="http://schemas.openxmlformats.org/officeDocument/2006/relationships" xmlns:p="http://schemas.openxmlformats.org/presentationml/2006/main">
   <p:cSld>
@@ -7102,87 +7698,90 @@
             <p:ph type="title"/>
           </p:nvPr>
         </p:nvSpPr>
+        <p:spPr>
+          <a:xfrm>
+            <a:off x="1097280" y="286604"/>
+            <a:ext cx="10058400" cy="890850"/>
+          </a:xfrm>
+        </p:spPr>
+        <p:txBody>
+          <a:bodyPr/>
+          <a:lstStyle/>
+          <a:p>
+            <a:r>
+              <a:rPr lang="en-US" dirty="0" smtClean="0"/>
+              <a:t>Data</a:t>
+            </a:r>
+            <a:endParaRPr lang="en-US" dirty="0"/>
+          </a:p>
+        </p:txBody>
+      </p:sp>
+      <p:sp>
+        <p:nvSpPr>
+          <p:cNvPr id="3" name="Content Placeholder 2"/>
+          <p:cNvSpPr>
+            <a:spLocks noGrp="1"/>
+          </p:cNvSpPr>
+          <p:nvPr>
+            <p:ph sz="half" idx="1"/>
+          </p:nvPr>
+        </p:nvSpPr>
         <p:spPr/>
         <p:txBody>
+          <a:bodyPr>
+            <a:normAutofit/>
+          </a:bodyPr>
+          <a:lstStyle/>
+          <a:p>
+            <a:r>
+              <a:rPr lang="en-US" dirty="0" smtClean="0"/>
+              <a:t>Editing data</a:t>
+            </a:r>
+          </a:p>
+        </p:txBody>
+      </p:sp>
+      <p:sp>
+        <p:nvSpPr>
+          <p:cNvPr id="10" name="Content Placeholder 9"/>
+          <p:cNvSpPr>
+            <a:spLocks noGrp="1"/>
+          </p:cNvSpPr>
+          <p:nvPr>
+            <p:ph sz="half" idx="2"/>
+          </p:nvPr>
+        </p:nvSpPr>
+        <p:spPr/>
+        <p:txBody>
           <a:bodyPr/>
           <a:lstStyle/>
           <a:p>
             <a:r>
-              <a:rPr lang="en-US" dirty="0" smtClean="0"/>
-              <a:t>Network Descriptives</a:t>
-            </a:r>
-            <a:endParaRPr lang="en-US" dirty="0"/>
-          </a:p>
-        </p:txBody>
-      </p:sp>
-      <p:sp>
-        <p:nvSpPr>
-          <p:cNvPr id="3" name="Content Placeholder 2"/>
-          <p:cNvSpPr>
-            <a:spLocks noGrp="1"/>
-          </p:cNvSpPr>
-          <p:nvPr>
-            <p:ph sz="half" idx="1"/>
-          </p:nvPr>
-        </p:nvSpPr>
-        <p:spPr/>
-        <p:txBody>
-          <a:bodyPr/>
-          <a:lstStyle/>
-          <a:p>
-            <a:r>
-              <a:rPr lang="en-US" dirty="0"/>
-              <a:t>Degree Distribution</a:t>
+              <a:rPr lang="en-US" dirty="0" err="1" smtClean="0"/>
+              <a:t>Nw</a:t>
+            </a:r>
+            <a:r>
+              <a:rPr lang="en-US" dirty="0" smtClean="0"/>
+              <a:t> summary</a:t>
             </a:r>
           </a:p>
           <a:p>
             <a:pPr lvl="1"/>
             <a:r>
-              <a:rPr lang="en-US" dirty="0"/>
-              <a:t>How are degrees distributed?</a:t>
-            </a:r>
-          </a:p>
-          <a:p>
-            <a:r>
-              <a:rPr lang="en-US" dirty="0"/>
-              <a:t>Geodesic Distribution</a:t>
-            </a:r>
-          </a:p>
-          <a:p>
-            <a:pPr lvl="1"/>
-            <a:r>
-              <a:rPr lang="en-US" dirty="0"/>
-              <a:t>How “connected” is the network?</a:t>
-            </a:r>
-          </a:p>
-          <a:p>
-            <a:endParaRPr lang="en-US" dirty="0"/>
-          </a:p>
-        </p:txBody>
-      </p:sp>
-      <p:sp>
-        <p:nvSpPr>
-          <p:cNvPr id="4" name="Content Placeholder 3"/>
-          <p:cNvSpPr>
-            <a:spLocks noGrp="1"/>
-          </p:cNvSpPr>
-          <p:nvPr>
-            <p:ph sz="half" idx="2"/>
-          </p:nvPr>
-        </p:nvSpPr>
-        <p:spPr/>
-        <p:txBody>
-          <a:bodyPr/>
-          <a:lstStyle/>
-          <a:p>
-            <a:endParaRPr lang="en-US"/>
+              <a:rPr lang="en-US" dirty="0" smtClean="0"/>
+              <a:t>Can go back to this on almost every page of </a:t>
+            </a:r>
+            <a:r>
+              <a:rPr lang="en-US" dirty="0" err="1" smtClean="0"/>
+              <a:t>sW</a:t>
+            </a:r>
+            <a:endParaRPr lang="en-US" dirty="0"/>
           </a:p>
         </p:txBody>
       </p:sp>
     </p:spTree>
     <p:extLst>
       <p:ext uri="{BB962C8B-B14F-4D97-AF65-F5344CB8AC3E}">
-        <p14:creationId xmlns:p14="http://schemas.microsoft.com/office/powerpoint/2010/main" val="3708573406"/>
+        <p14:creationId xmlns:p14="http://schemas.microsoft.com/office/powerpoint/2010/main" val="4243777039"/>
       </p:ext>
     </p:extLst>
   </p:cSld>
@@ -7469,7 +8068,7 @@
   <a:extraClrSchemeLst/>
   <a:extLst>
     <a:ext uri="{05A4C25C-085E-4340-85A3-A5531E510DB2}">
-      <thm15:themeFamily xmlns:thm15="http://schemas.microsoft.com/office/thememl/2012/main" xmlns="" name="Retrospect" id="{5F128B03-DCCA-4EEB-AB3B-CF2899314A46}" vid="{02006FA4-1611-4B07-AF7F-85CF6D20EB3E}"/>
+      <thm15:themeFamily xmlns="" xmlns:thm15="http://schemas.microsoft.com/office/thememl/2012/main" name="Retrospect" id="{5F128B03-DCCA-4EEB-AB3B-CF2899314A46}" vid="{02006FA4-1611-4B07-AF7F-85CF6D20EB3E}"/>
     </a:ext>
   </a:extLst>
 </a:theme>

</xml_diff>

<commit_message>
version of slides for NMG
</commit_message>
<xml_diff>
--- a/statnetWeb_slides.pptx
+++ b/statnetWeb_slides.pptx
@@ -185,7 +185,7 @@
       </p14:sectionLst>
     </p:ext>
     <p:ext uri="{EFAFB233-063F-42B5-8137-9DF3F51BA10A}">
-      <p15:sldGuideLst xmlns:p15="http://schemas.microsoft.com/office/powerpoint/2012/main">
+      <p15:sldGuideLst xmlns:p15="http://schemas.microsoft.com/office/powerpoint/2012/main" xmlns="">
         <p15:guide id="1" orient="horz" pos="2160">
           <p15:clr>
             <a:srgbClr val="A4A3A4"/>
@@ -268,10 +268,10 @@
                 <c:formatCode>General</c:formatCode>
                 <c:ptCount val="2"/>
                 <c:pt idx="0">
-                  <c:v>2</c:v>
+                  <c:v>2.0</c:v>
                 </c:pt>
                 <c:pt idx="1">
-                  <c:v>2</c:v>
+                  <c:v>2.0</c:v>
                 </c:pt>
               </c:numCache>
             </c:numRef>
@@ -322,10 +322,10 @@
                 <c:formatCode>General</c:formatCode>
                 <c:ptCount val="2"/>
                 <c:pt idx="0">
-                  <c:v>1</c:v>
+                  <c:v>1.0</c:v>
                 </c:pt>
                 <c:pt idx="1">
-                  <c:v>1</c:v>
+                  <c:v>1.0</c:v>
                 </c:pt>
               </c:numCache>
             </c:numRef>
@@ -376,10 +376,10 @@
                 <c:formatCode>General</c:formatCode>
                 <c:ptCount val="2"/>
                 <c:pt idx="0">
-                  <c:v>1</c:v>
+                  <c:v>1.0</c:v>
                 </c:pt>
                 <c:pt idx="1">
-                  <c:v>2</c:v>
+                  <c:v>2.0</c:v>
                 </c:pt>
               </c:numCache>
             </c:numRef>
@@ -430,10 +430,10 @@
                 <c:formatCode>General</c:formatCode>
                 <c:ptCount val="2"/>
                 <c:pt idx="0">
-                  <c:v>2</c:v>
+                  <c:v>2.0</c:v>
                 </c:pt>
                 <c:pt idx="1">
-                  <c:v>3</c:v>
+                  <c:v>3.0</c:v>
                 </c:pt>
               </c:numCache>
             </c:numRef>
@@ -484,10 +484,10 @@
                 <c:formatCode>General</c:formatCode>
                 <c:ptCount val="2"/>
                 <c:pt idx="0">
-                  <c:v>1</c:v>
+                  <c:v>1.0</c:v>
                 </c:pt>
                 <c:pt idx="1">
-                  <c:v>1</c:v>
+                  <c:v>1.0</c:v>
                 </c:pt>
               </c:numCache>
             </c:numRef>
@@ -538,10 +538,10 @@
                 <c:formatCode>General</c:formatCode>
                 <c:ptCount val="2"/>
                 <c:pt idx="0">
-                  <c:v>2</c:v>
+                  <c:v>2.0</c:v>
                 </c:pt>
                 <c:pt idx="1">
-                  <c:v>2</c:v>
+                  <c:v>2.0</c:v>
                 </c:pt>
               </c:numCache>
             </c:numRef>
@@ -594,10 +594,10 @@
                 <c:formatCode>General</c:formatCode>
                 <c:ptCount val="2"/>
                 <c:pt idx="0">
-                  <c:v>1</c:v>
+                  <c:v>1.0</c:v>
                 </c:pt>
                 <c:pt idx="1">
-                  <c:v>3</c:v>
+                  <c:v>3.0</c:v>
                 </c:pt>
               </c:numCache>
             </c:numRef>
@@ -613,11 +613,11 @@
         </c:dLbls>
         <c:gapWidth val="150"/>
         <c:overlap val="100"/>
-        <c:axId val="345023904"/>
-        <c:axId val="345018808"/>
+        <c:axId val="259009192"/>
+        <c:axId val="103396568"/>
       </c:barChart>
       <c:catAx>
-        <c:axId val="345023904"/>
+        <c:axId val="259009192"/>
         <c:scaling>
           <c:orientation val="minMax"/>
         </c:scaling>
@@ -660,7 +660,7 @@
             <a:endParaRPr lang="en-US"/>
           </a:p>
         </c:txPr>
-        <c:crossAx val="345018808"/>
+        <c:crossAx val="103396568"/>
         <c:crosses val="autoZero"/>
         <c:auto val="1"/>
         <c:lblAlgn val="ctr"/>
@@ -668,7 +668,7 @@
         <c:noMultiLvlLbl val="0"/>
       </c:catAx>
       <c:valAx>
-        <c:axId val="345018808"/>
+        <c:axId val="103396568"/>
         <c:scaling>
           <c:orientation val="minMax"/>
         </c:scaling>
@@ -719,7 +719,7 @@
             <a:endParaRPr lang="en-US"/>
           </a:p>
         </c:txPr>
-        <c:crossAx val="345023904"/>
+        <c:crossAx val="259009192"/>
         <c:crosses val="autoZero"/>
         <c:crossBetween val="between"/>
       </c:valAx>
@@ -737,9 +737,9 @@
         <c:manualLayout>
           <c:xMode val="edge"/>
           <c:yMode val="edge"/>
-          <c:x val="7.77539582325842E-2"/>
-          <c:y val="0.80568005918586005"/>
-          <c:w val="0.87382790760832396"/>
+          <c:x val="0.0777539582325842"/>
+          <c:y val="0.80568005918586"/>
+          <c:w val="0.873827907608324"/>
           <c:h val="0.176625486423338"/>
         </c:manualLayout>
       </c:layout>
@@ -793,7 +793,7 @@
       <a:endParaRPr lang="en-US"/>
     </a:p>
   </c:txPr>
-  <c:externalData r:id="rId3">
+  <c:externalData r:id="rId1">
     <c:autoUpdate val="0"/>
   </c:externalData>
 </c:chartSpace>
@@ -1586,7 +1586,7 @@
           <a:p>
             <a:fld id="{5A069CB8-F204-4D06-B913-C5A26A89888A}" type="datetimeFigureOut">
               <a:rPr lang="en-US" dirty="0"/>
-              <a:t>4/7/2015</a:t>
+              <a:t>4/7/15</a:t>
             </a:fld>
             <a:endParaRPr lang="en-US" dirty="0"/>
           </a:p>
@@ -1789,7 +1789,7 @@
           <a:p>
             <a:fld id="{50B6E300-0A13-4A81-945A-7333C271A069}" type="datetimeFigureOut">
               <a:rPr lang="en-US" dirty="0"/>
-              <a:t>4/7/2015</a:t>
+              <a:t>4/7/15</a:t>
             </a:fld>
             <a:endParaRPr lang="en-US" dirty="0"/>
           </a:p>
@@ -2040,7 +2040,7 @@
           <a:p>
             <a:fld id="{34671962-1EA4-46E7-BCB0-F36CE46D1A59}" type="datetimeFigureOut">
               <a:rPr lang="en-US" dirty="0"/>
-              <a:t>4/7/2015</a:t>
+              <a:t>4/7/15</a:t>
             </a:fld>
             <a:endParaRPr lang="en-US" dirty="0"/>
           </a:p>
@@ -2205,7 +2205,7 @@
           <a:p>
             <a:fld id="{D30BB376-B19C-488D-ABEB-03C7E6E9E3E0}" type="datetimeFigureOut">
               <a:rPr lang="en-US" dirty="0"/>
-              <a:t>4/7/2015</a:t>
+              <a:t>4/7/15</a:t>
             </a:fld>
             <a:endParaRPr lang="en-US" dirty="0"/>
           </a:p>
@@ -2543,7 +2543,7 @@
           <a:p>
             <a:fld id="{486F077B-A50F-4D64-8574-E2D6A98A5553}" type="datetimeFigureOut">
               <a:rPr lang="en-US" dirty="0"/>
-              <a:t>4/7/2015</a:t>
+              <a:t>4/7/15</a:t>
             </a:fld>
             <a:endParaRPr lang="en-US" dirty="0"/>
           </a:p>
@@ -2813,7 +2813,7 @@
           <a:p>
             <a:fld id="{7D9E2A62-1983-43A1-A163-D8AA46534C80}" type="datetimeFigureOut">
               <a:rPr lang="en-US" dirty="0"/>
-              <a:t>4/7/2015</a:t>
+              <a:t>4/7/15</a:t>
             </a:fld>
             <a:endParaRPr lang="en-US" dirty="0"/>
           </a:p>
@@ -3187,7 +3187,7 @@
           <a:p>
             <a:fld id="{898F3E3B-34E3-4345-B2A1-994B83598A9C}" type="datetimeFigureOut">
               <a:rPr lang="en-US" dirty="0"/>
-              <a:t>4/7/2015</a:t>
+              <a:t>4/7/15</a:t>
             </a:fld>
             <a:endParaRPr lang="en-US" dirty="0"/>
           </a:p>
@@ -3300,7 +3300,7 @@
           <a:p>
             <a:fld id="{FD816C96-82A1-4D77-8ADA-627AC6FE3D65}" type="datetimeFigureOut">
               <a:rPr lang="en-US" dirty="0"/>
-              <a:t>4/7/2015</a:t>
+              <a:t>4/7/15</a:t>
             </a:fld>
             <a:endParaRPr lang="en-US" dirty="0"/>
           </a:p>
@@ -3466,7 +3466,7 @@
           <a:p>
             <a:fld id="{1D102C1E-28F2-47E9-802D-339E64E2F920}" type="datetimeFigureOut">
               <a:rPr lang="en-US" dirty="0"/>
-              <a:t>4/7/2015</a:t>
+              <a:t>4/7/15</a:t>
             </a:fld>
             <a:endParaRPr lang="en-US" dirty="0"/>
           </a:p>
@@ -3816,7 +3816,7 @@
           <a:p>
             <a:fld id="{24271A48-F18A-45B3-BC05-1E27DA3F88AF}" type="datetimeFigureOut">
               <a:rPr lang="en-US" dirty="0"/>
-              <a:t>4/7/2015</a:t>
+              <a:t>4/7/15</a:t>
             </a:fld>
             <a:endParaRPr lang="en-US" dirty="0"/>
           </a:p>
@@ -4189,7 +4189,7 @@
           <a:p>
             <a:fld id="{65B747F8-9654-4282-85D2-65F41AAE7A75}" type="datetimeFigureOut">
               <a:rPr lang="en-US" dirty="0"/>
-              <a:t>4/7/2015</a:t>
+              <a:t>4/7/15</a:t>
             </a:fld>
             <a:endParaRPr lang="en-US" dirty="0"/>
           </a:p>
@@ -4471,7 +4471,7 @@
           <a:p>
             <a:fld id="{5DC5B261-8843-42D1-AAFC-05E20E2D9B97}" type="datetimeFigureOut">
               <a:rPr lang="en-US" dirty="0"/>
-              <a:t>4/7/2015</a:t>
+              <a:t>4/7/15</a:t>
             </a:fld>
             <a:endParaRPr lang="en-US" dirty="0"/>
           </a:p>
@@ -5367,7 +5367,7 @@
   <p:timing>
     <p:tnLst>
       <p:par>
-        <p:cTn id="1" dur="indefinite" restart="never" nodeType="tmRoot"/>
+        <p:cTn xmlns:p14="http://schemas.microsoft.com/office/powerpoint/2010/main" id="1" dur="indefinite" restart="never" nodeType="tmRoot"/>
       </p:par>
     </p:tnLst>
   </p:timing>
@@ -5608,7 +5608,7 @@
   <p:timing>
     <p:tnLst>
       <p:par>
-        <p:cTn id="1" dur="indefinite" restart="never" nodeType="tmRoot"/>
+        <p:cTn xmlns:p14="http://schemas.microsoft.com/office/powerpoint/2010/main" id="1" dur="indefinite" restart="never" nodeType="tmRoot"/>
       </p:par>
     </p:tnLst>
   </p:timing>
@@ -5938,9 +5938,157 @@
   <p:timing>
     <p:tnLst>
       <p:par>
-        <p:cTn id="1" dur="indefinite" restart="never" nodeType="tmRoot"/>
+        <p:cTn xmlns:p14="http://schemas.microsoft.com/office/powerpoint/2010/main" id="1" dur="indefinite" restart="never" nodeType="tmRoot">
+          <p:childTnLst>
+            <p:seq concurrent="1" nextAc="seek">
+              <p:cTn id="2" dur="indefinite" nodeType="mainSeq">
+                <p:childTnLst>
+                  <p:par>
+                    <p:cTn id="3" fill="hold">
+                      <p:stCondLst>
+                        <p:cond delay="indefinite"/>
+                      </p:stCondLst>
+                      <p:childTnLst>
+                        <p:par>
+                          <p:cTn id="4" fill="hold">
+                            <p:stCondLst>
+                              <p:cond delay="0"/>
+                            </p:stCondLst>
+                            <p:childTnLst>
+                              <p:par>
+                                <p:cTn id="5" presetID="1" presetClass="entr" presetSubtype="0" fill="hold" grpId="0" nodeType="clickEffect">
+                                  <p:stCondLst>
+                                    <p:cond delay="0"/>
+                                  </p:stCondLst>
+                                  <p:childTnLst>
+                                    <p:set>
+                                      <p:cBhvr>
+                                        <p:cTn id="6" dur="1" fill="hold">
+                                          <p:stCondLst>
+                                            <p:cond delay="0"/>
+                                          </p:stCondLst>
+                                        </p:cTn>
+                                        <p:tgtEl>
+                                          <p:spTgt spid="4">
+                                            <p:txEl>
+                                              <p:pRg st="0" end="0"/>
+                                            </p:txEl>
+                                          </p:spTgt>
+                                        </p:tgtEl>
+                                        <p:attrNameLst>
+                                          <p:attrName>style.visibility</p:attrName>
+                                        </p:attrNameLst>
+                                      </p:cBhvr>
+                                      <p:to>
+                                        <p:strVal val="visible"/>
+                                      </p:to>
+                                    </p:set>
+                                  </p:childTnLst>
+                                </p:cTn>
+                              </p:par>
+                              <p:par>
+                                <p:cTn id="7" presetID="1" presetClass="entr" presetSubtype="0" fill="hold" nodeType="withEffect">
+                                  <p:stCondLst>
+                                    <p:cond delay="0"/>
+                                  </p:stCondLst>
+                                  <p:childTnLst>
+                                    <p:set>
+                                      <p:cBhvr>
+                                        <p:cTn id="8" dur="1" fill="hold">
+                                          <p:stCondLst>
+                                            <p:cond delay="0"/>
+                                          </p:stCondLst>
+                                        </p:cTn>
+                                        <p:tgtEl>
+                                          <p:spTgt spid="7"/>
+                                        </p:tgtEl>
+                                        <p:attrNameLst>
+                                          <p:attrName>style.visibility</p:attrName>
+                                        </p:attrNameLst>
+                                      </p:cBhvr>
+                                      <p:to>
+                                        <p:strVal val="visible"/>
+                                      </p:to>
+                                    </p:set>
+                                  </p:childTnLst>
+                                </p:cTn>
+                              </p:par>
+                            </p:childTnLst>
+                          </p:cTn>
+                        </p:par>
+                      </p:childTnLst>
+                    </p:cTn>
+                  </p:par>
+                  <p:par>
+                    <p:cTn id="9" fill="hold">
+                      <p:stCondLst>
+                        <p:cond delay="indefinite"/>
+                      </p:stCondLst>
+                      <p:childTnLst>
+                        <p:par>
+                          <p:cTn id="10" fill="hold">
+                            <p:stCondLst>
+                              <p:cond delay="0"/>
+                            </p:stCondLst>
+                            <p:childTnLst>
+                              <p:par>
+                                <p:cTn id="11" presetID="1" presetClass="entr" presetSubtype="0" fill="hold" grpId="0" nodeType="clickEffect">
+                                  <p:stCondLst>
+                                    <p:cond delay="0"/>
+                                  </p:stCondLst>
+                                  <p:childTnLst>
+                                    <p:set>
+                                      <p:cBhvr>
+                                        <p:cTn id="12" dur="1" fill="hold">
+                                          <p:stCondLst>
+                                            <p:cond delay="0"/>
+                                          </p:stCondLst>
+                                        </p:cTn>
+                                        <p:tgtEl>
+                                          <p:spTgt spid="6"/>
+                                        </p:tgtEl>
+                                        <p:attrNameLst>
+                                          <p:attrName>style.visibility</p:attrName>
+                                        </p:attrNameLst>
+                                      </p:cBhvr>
+                                      <p:to>
+                                        <p:strVal val="visible"/>
+                                      </p:to>
+                                    </p:set>
+                                  </p:childTnLst>
+                                </p:cTn>
+                              </p:par>
+                            </p:childTnLst>
+                          </p:cTn>
+                        </p:par>
+                      </p:childTnLst>
+                    </p:cTn>
+                  </p:par>
+                </p:childTnLst>
+              </p:cTn>
+              <p:prevCondLst>
+                <p:cond evt="onPrev" delay="0">
+                  <p:tgtEl>
+                    <p:sldTgt/>
+                  </p:tgtEl>
+                </p:cond>
+              </p:prevCondLst>
+              <p:nextCondLst>
+                <p:cond evt="onNext" delay="0">
+                  <p:tgtEl>
+                    <p:sldTgt/>
+                  </p:tgtEl>
+                </p:cond>
+              </p:nextCondLst>
+            </p:seq>
+          </p:childTnLst>
+        </p:cTn>
       </p:par>
     </p:tnLst>
+    <p:bldLst>
+      <p:bldP spid="4" grpId="0" build="p"/>
+      <p:bldP spid="6" grpId="0"/>
+    </p:bldLst>
   </p:timing>
 </p:sld>
 </file>
@@ -6009,8 +6157,13 @@
           <a:p>
             <a:r>
               <a:rPr lang="en-US" dirty="0" smtClean="0"/>
-              <a:t>Editing data</a:t>
-            </a:r>
+              <a:t>Editing </a:t>
+            </a:r>
+            <a:r>
+              <a:rPr lang="en-US" dirty="0" smtClean="0"/>
+              <a:t>data</a:t>
+            </a:r>
+            <a:endParaRPr lang="en-US" dirty="0" smtClean="0"/>
           </a:p>
           <a:p>
             <a:pPr lvl="1"/>
@@ -6134,7 +6287,7 @@
   <p:timing>
     <p:tnLst>
       <p:par>
-        <p:cTn id="1" dur="indefinite" restart="never" nodeType="tmRoot"/>
+        <p:cTn xmlns:p14="http://schemas.microsoft.com/office/powerpoint/2010/main" id="1" dur="indefinite" restart="never" nodeType="tmRoot"/>
       </p:par>
     </p:tnLst>
   </p:timing>
@@ -6499,9 +6652,636 @@
   <p:timing>
     <p:tnLst>
       <p:par>
-        <p:cTn id="1" dur="indefinite" restart="never" nodeType="tmRoot"/>
+        <p:cTn xmlns:p14="http://schemas.microsoft.com/office/powerpoint/2010/main" id="1" dur="indefinite" restart="never" nodeType="tmRoot">
+          <p:childTnLst>
+            <p:seq concurrent="1" nextAc="seek">
+              <p:cTn id="2" dur="indefinite" nodeType="mainSeq">
+                <p:childTnLst>
+                  <p:par>
+                    <p:cTn id="3" fill="hold">
+                      <p:stCondLst>
+                        <p:cond delay="indefinite"/>
+                        <p:cond evt="onBegin" delay="0">
+                          <p:tn val="2"/>
+                        </p:cond>
+                      </p:stCondLst>
+                      <p:childTnLst>
+                        <p:par>
+                          <p:cTn id="4" fill="hold">
+                            <p:stCondLst>
+                              <p:cond delay="0"/>
+                            </p:stCondLst>
+                            <p:childTnLst>
+                              <p:par>
+                                <p:cTn id="5" presetID="1" presetClass="entr" presetSubtype="0" fill="hold" grpId="0" nodeType="withEffect">
+                                  <p:stCondLst>
+                                    <p:cond delay="0"/>
+                                  </p:stCondLst>
+                                  <p:childTnLst>
+                                    <p:set>
+                                      <p:cBhvr>
+                                        <p:cTn id="6" dur="1" fill="hold">
+                                          <p:stCondLst>
+                                            <p:cond delay="0"/>
+                                          </p:stCondLst>
+                                        </p:cTn>
+                                        <p:tgtEl>
+                                          <p:spTgt spid="3">
+                                            <p:txEl>
+                                              <p:pRg st="0" end="0"/>
+                                            </p:txEl>
+                                          </p:spTgt>
+                                        </p:tgtEl>
+                                        <p:attrNameLst>
+                                          <p:attrName>style.visibility</p:attrName>
+                                        </p:attrNameLst>
+                                      </p:cBhvr>
+                                      <p:to>
+                                        <p:strVal val="visible"/>
+                                      </p:to>
+                                    </p:set>
+                                  </p:childTnLst>
+                                </p:cTn>
+                              </p:par>
+                              <p:par>
+                                <p:cTn id="7" presetID="1" presetClass="entr" presetSubtype="0" fill="hold" grpId="0" nodeType="withEffect">
+                                  <p:stCondLst>
+                                    <p:cond delay="0"/>
+                                  </p:stCondLst>
+                                  <p:childTnLst>
+                                    <p:set>
+                                      <p:cBhvr>
+                                        <p:cTn id="8" dur="1" fill="hold">
+                                          <p:stCondLst>
+                                            <p:cond delay="0"/>
+                                          </p:stCondLst>
+                                        </p:cTn>
+                                        <p:tgtEl>
+                                          <p:spTgt spid="3">
+                                            <p:txEl>
+                                              <p:pRg st="1" end="1"/>
+                                            </p:txEl>
+                                          </p:spTgt>
+                                        </p:tgtEl>
+                                        <p:attrNameLst>
+                                          <p:attrName>style.visibility</p:attrName>
+                                        </p:attrNameLst>
+                                      </p:cBhvr>
+                                      <p:to>
+                                        <p:strVal val="visible"/>
+                                      </p:to>
+                                    </p:set>
+                                  </p:childTnLst>
+                                </p:cTn>
+                              </p:par>
+                              <p:par>
+                                <p:cTn id="9" presetID="1" presetClass="entr" presetSubtype="0" fill="hold" grpId="0" nodeType="withEffect">
+                                  <p:stCondLst>
+                                    <p:cond delay="0"/>
+                                  </p:stCondLst>
+                                  <p:childTnLst>
+                                    <p:set>
+                                      <p:cBhvr>
+                                        <p:cTn id="10" dur="1" fill="hold">
+                                          <p:stCondLst>
+                                            <p:cond delay="0"/>
+                                          </p:stCondLst>
+                                        </p:cTn>
+                                        <p:tgtEl>
+                                          <p:spTgt spid="3">
+                                            <p:txEl>
+                                              <p:pRg st="2" end="2"/>
+                                            </p:txEl>
+                                          </p:spTgt>
+                                        </p:tgtEl>
+                                        <p:attrNameLst>
+                                          <p:attrName>style.visibility</p:attrName>
+                                        </p:attrNameLst>
+                                      </p:cBhvr>
+                                      <p:to>
+                                        <p:strVal val="visible"/>
+                                      </p:to>
+                                    </p:set>
+                                  </p:childTnLst>
+                                </p:cTn>
+                              </p:par>
+                            </p:childTnLst>
+                          </p:cTn>
+                        </p:par>
+                      </p:childTnLst>
+                    </p:cTn>
+                  </p:par>
+                  <p:par>
+                    <p:cTn id="11" fill="hold">
+                      <p:stCondLst>
+                        <p:cond delay="indefinite"/>
+                      </p:stCondLst>
+                      <p:childTnLst>
+                        <p:par>
+                          <p:cTn id="12" fill="hold">
+                            <p:stCondLst>
+                              <p:cond delay="0"/>
+                            </p:stCondLst>
+                            <p:childTnLst>
+                              <p:par>
+                                <p:cTn id="13" presetID="1" presetClass="entr" presetSubtype="0" fill="hold" grpId="0" nodeType="clickEffect">
+                                  <p:stCondLst>
+                                    <p:cond delay="0"/>
+                                  </p:stCondLst>
+                                  <p:childTnLst>
+                                    <p:set>
+                                      <p:cBhvr>
+                                        <p:cTn id="14" dur="1" fill="hold">
+                                          <p:stCondLst>
+                                            <p:cond delay="0"/>
+                                          </p:stCondLst>
+                                        </p:cTn>
+                                        <p:tgtEl>
+                                          <p:spTgt spid="3">
+                                            <p:txEl>
+                                              <p:pRg st="4" end="4"/>
+                                            </p:txEl>
+                                          </p:spTgt>
+                                        </p:tgtEl>
+                                        <p:attrNameLst>
+                                          <p:attrName>style.visibility</p:attrName>
+                                        </p:attrNameLst>
+                                      </p:cBhvr>
+                                      <p:to>
+                                        <p:strVal val="visible"/>
+                                      </p:to>
+                                    </p:set>
+                                  </p:childTnLst>
+                                </p:cTn>
+                              </p:par>
+                              <p:par>
+                                <p:cTn id="15" presetID="1" presetClass="entr" presetSubtype="0" fill="hold" grpId="0" nodeType="withEffect">
+                                  <p:stCondLst>
+                                    <p:cond delay="0"/>
+                                  </p:stCondLst>
+                                  <p:childTnLst>
+                                    <p:set>
+                                      <p:cBhvr>
+                                        <p:cTn id="16" dur="1" fill="hold">
+                                          <p:stCondLst>
+                                            <p:cond delay="0"/>
+                                          </p:stCondLst>
+                                        </p:cTn>
+                                        <p:tgtEl>
+                                          <p:spTgt spid="3">
+                                            <p:txEl>
+                                              <p:pRg st="5" end="5"/>
+                                            </p:txEl>
+                                          </p:spTgt>
+                                        </p:tgtEl>
+                                        <p:attrNameLst>
+                                          <p:attrName>style.visibility</p:attrName>
+                                        </p:attrNameLst>
+                                      </p:cBhvr>
+                                      <p:to>
+                                        <p:strVal val="visible"/>
+                                      </p:to>
+                                    </p:set>
+                                  </p:childTnLst>
+                                </p:cTn>
+                              </p:par>
+                              <p:par>
+                                <p:cTn id="17" presetID="1" presetClass="entr" presetSubtype="0" fill="hold" grpId="0" nodeType="withEffect">
+                                  <p:stCondLst>
+                                    <p:cond delay="0"/>
+                                  </p:stCondLst>
+                                  <p:childTnLst>
+                                    <p:set>
+                                      <p:cBhvr>
+                                        <p:cTn id="18" dur="1" fill="hold">
+                                          <p:stCondLst>
+                                            <p:cond delay="0"/>
+                                          </p:stCondLst>
+                                        </p:cTn>
+                                        <p:tgtEl>
+                                          <p:spTgt spid="3">
+                                            <p:txEl>
+                                              <p:pRg st="6" end="6"/>
+                                            </p:txEl>
+                                          </p:spTgt>
+                                        </p:tgtEl>
+                                        <p:attrNameLst>
+                                          <p:attrName>style.visibility</p:attrName>
+                                        </p:attrNameLst>
+                                      </p:cBhvr>
+                                      <p:to>
+                                        <p:strVal val="visible"/>
+                                      </p:to>
+                                    </p:set>
+                                  </p:childTnLst>
+                                </p:cTn>
+                              </p:par>
+                              <p:par>
+                                <p:cTn id="19" presetID="1" presetClass="entr" presetSubtype="0" fill="hold" grpId="0" nodeType="withEffect">
+                                  <p:stCondLst>
+                                    <p:cond delay="0"/>
+                                  </p:stCondLst>
+                                  <p:childTnLst>
+                                    <p:set>
+                                      <p:cBhvr>
+                                        <p:cTn id="20" dur="1" fill="hold">
+                                          <p:stCondLst>
+                                            <p:cond delay="0"/>
+                                          </p:stCondLst>
+                                        </p:cTn>
+                                        <p:tgtEl>
+                                          <p:spTgt spid="3">
+                                            <p:txEl>
+                                              <p:pRg st="7" end="7"/>
+                                            </p:txEl>
+                                          </p:spTgt>
+                                        </p:tgtEl>
+                                        <p:attrNameLst>
+                                          <p:attrName>style.visibility</p:attrName>
+                                        </p:attrNameLst>
+                                      </p:cBhvr>
+                                      <p:to>
+                                        <p:strVal val="visible"/>
+                                      </p:to>
+                                    </p:set>
+                                  </p:childTnLst>
+                                </p:cTn>
+                              </p:par>
+                            </p:childTnLst>
+                          </p:cTn>
+                        </p:par>
+                      </p:childTnLst>
+                    </p:cTn>
+                  </p:par>
+                  <p:par>
+                    <p:cTn id="21" fill="hold">
+                      <p:stCondLst>
+                        <p:cond delay="indefinite"/>
+                      </p:stCondLst>
+                      <p:childTnLst>
+                        <p:par>
+                          <p:cTn id="22" fill="hold">
+                            <p:stCondLst>
+                              <p:cond delay="0"/>
+                            </p:stCondLst>
+                            <p:childTnLst>
+                              <p:par>
+                                <p:cTn id="23" presetID="1" presetClass="entr" presetSubtype="0" fill="hold" grpId="0" nodeType="clickEffect">
+                                  <p:stCondLst>
+                                    <p:cond delay="0"/>
+                                  </p:stCondLst>
+                                  <p:childTnLst>
+                                    <p:set>
+                                      <p:cBhvr>
+                                        <p:cTn id="24" dur="1" fill="hold">
+                                          <p:stCondLst>
+                                            <p:cond delay="0"/>
+                                          </p:stCondLst>
+                                        </p:cTn>
+                                        <p:tgtEl>
+                                          <p:spTgt spid="5">
+                                            <p:txEl>
+                                              <p:pRg st="0" end="0"/>
+                                            </p:txEl>
+                                          </p:spTgt>
+                                        </p:tgtEl>
+                                        <p:attrNameLst>
+                                          <p:attrName>style.visibility</p:attrName>
+                                        </p:attrNameLst>
+                                      </p:cBhvr>
+                                      <p:to>
+                                        <p:strVal val="visible"/>
+                                      </p:to>
+                                    </p:set>
+                                  </p:childTnLst>
+                                </p:cTn>
+                              </p:par>
+                              <p:par>
+                                <p:cTn id="25" presetID="1" presetClass="entr" presetSubtype="0" fill="hold" nodeType="withEffect">
+                                  <p:stCondLst>
+                                    <p:cond delay="0"/>
+                                  </p:stCondLst>
+                                  <p:childTnLst>
+                                    <p:set>
+                                      <p:cBhvr>
+                                        <p:cTn id="26" dur="1" fill="hold">
+                                          <p:stCondLst>
+                                            <p:cond delay="0"/>
+                                          </p:stCondLst>
+                                        </p:cTn>
+                                        <p:tgtEl>
+                                          <p:spTgt spid="6"/>
+                                        </p:tgtEl>
+                                        <p:attrNameLst>
+                                          <p:attrName>style.visibility</p:attrName>
+                                        </p:attrNameLst>
+                                      </p:cBhvr>
+                                      <p:to>
+                                        <p:strVal val="visible"/>
+                                      </p:to>
+                                    </p:set>
+                                  </p:childTnLst>
+                                </p:cTn>
+                              </p:par>
+                            </p:childTnLst>
+                          </p:cTn>
+                        </p:par>
+                      </p:childTnLst>
+                    </p:cTn>
+                  </p:par>
+                  <p:par>
+                    <p:cTn id="27" fill="hold">
+                      <p:stCondLst>
+                        <p:cond delay="indefinite"/>
+                      </p:stCondLst>
+                      <p:childTnLst>
+                        <p:par>
+                          <p:cTn id="28" fill="hold">
+                            <p:stCondLst>
+                              <p:cond delay="0"/>
+                            </p:stCondLst>
+                            <p:childTnLst>
+                              <p:par>
+                                <p:cTn id="29" presetID="1" presetClass="entr" presetSubtype="0" fill="hold" grpId="0" nodeType="clickEffect">
+                                  <p:stCondLst>
+                                    <p:cond delay="0"/>
+                                  </p:stCondLst>
+                                  <p:childTnLst>
+                                    <p:set>
+                                      <p:cBhvr>
+                                        <p:cTn id="30" dur="1" fill="hold">
+                                          <p:stCondLst>
+                                            <p:cond delay="0"/>
+                                          </p:stCondLst>
+                                        </p:cTn>
+                                        <p:tgtEl>
+                                          <p:spTgt spid="5">
+                                            <p:txEl>
+                                              <p:pRg st="6" end="6"/>
+                                            </p:txEl>
+                                          </p:spTgt>
+                                        </p:tgtEl>
+                                        <p:attrNameLst>
+                                          <p:attrName>style.visibility</p:attrName>
+                                        </p:attrNameLst>
+                                      </p:cBhvr>
+                                      <p:to>
+                                        <p:strVal val="visible"/>
+                                      </p:to>
+                                    </p:set>
+                                  </p:childTnLst>
+                                </p:cTn>
+                              </p:par>
+                            </p:childTnLst>
+                          </p:cTn>
+                        </p:par>
+                      </p:childTnLst>
+                    </p:cTn>
+                  </p:par>
+                  <p:par>
+                    <p:cTn id="31" fill="hold">
+                      <p:stCondLst>
+                        <p:cond delay="indefinite"/>
+                      </p:stCondLst>
+                      <p:childTnLst>
+                        <p:par>
+                          <p:cTn id="32" fill="hold">
+                            <p:stCondLst>
+                              <p:cond delay="0"/>
+                            </p:stCondLst>
+                            <p:childTnLst>
+                              <p:par>
+                                <p:cTn id="33" presetID="1" presetClass="entr" presetSubtype="0" fill="hold" nodeType="clickEffect">
+                                  <p:stCondLst>
+                                    <p:cond delay="0"/>
+                                  </p:stCondLst>
+                                  <p:childTnLst>
+                                    <p:set>
+                                      <p:cBhvr>
+                                        <p:cTn id="34" dur="1" fill="hold">
+                                          <p:stCondLst>
+                                            <p:cond delay="0"/>
+                                          </p:stCondLst>
+                                        </p:cTn>
+                                        <p:tgtEl>
+                                          <p:spTgt spid="7"/>
+                                        </p:tgtEl>
+                                        <p:attrNameLst>
+                                          <p:attrName>style.visibility</p:attrName>
+                                        </p:attrNameLst>
+                                      </p:cBhvr>
+                                      <p:to>
+                                        <p:strVal val="visible"/>
+                                      </p:to>
+                                    </p:set>
+                                  </p:childTnLst>
+                                </p:cTn>
+                              </p:par>
+                            </p:childTnLst>
+                          </p:cTn>
+                        </p:par>
+                      </p:childTnLst>
+                    </p:cTn>
+                  </p:par>
+                  <p:par>
+                    <p:cTn id="35" fill="hold">
+                      <p:stCondLst>
+                        <p:cond delay="indefinite"/>
+                      </p:stCondLst>
+                      <p:childTnLst>
+                        <p:par>
+                          <p:cTn id="36" fill="hold">
+                            <p:stCondLst>
+                              <p:cond delay="0"/>
+                            </p:stCondLst>
+                            <p:childTnLst>
+                              <p:par>
+                                <p:cTn id="37" presetID="1" presetClass="entr" presetSubtype="0" fill="hold" grpId="0" nodeType="clickEffect">
+                                  <p:stCondLst>
+                                    <p:cond delay="0"/>
+                                  </p:stCondLst>
+                                  <p:childTnLst>
+                                    <p:set>
+                                      <p:cBhvr>
+                                        <p:cTn id="38" dur="1" fill="hold">
+                                          <p:stCondLst>
+                                            <p:cond delay="0"/>
+                                          </p:stCondLst>
+                                        </p:cTn>
+                                        <p:tgtEl>
+                                          <p:spTgt spid="5">
+                                            <p:txEl>
+                                              <p:pRg st="7" end="7"/>
+                                            </p:txEl>
+                                          </p:spTgt>
+                                        </p:tgtEl>
+                                        <p:attrNameLst>
+                                          <p:attrName>style.visibility</p:attrName>
+                                        </p:attrNameLst>
+                                      </p:cBhvr>
+                                      <p:to>
+                                        <p:strVal val="visible"/>
+                                      </p:to>
+                                    </p:set>
+                                  </p:childTnLst>
+                                </p:cTn>
+                              </p:par>
+                              <p:par>
+                                <p:cTn id="39" presetID="1" presetClass="entr" presetSubtype="0" fill="hold" nodeType="withEffect">
+                                  <p:stCondLst>
+                                    <p:cond delay="0"/>
+                                  </p:stCondLst>
+                                  <p:childTnLst>
+                                    <p:set>
+                                      <p:cBhvr>
+                                        <p:cTn id="40" dur="1" fill="hold">
+                                          <p:stCondLst>
+                                            <p:cond delay="0"/>
+                                          </p:stCondLst>
+                                        </p:cTn>
+                                        <p:tgtEl>
+                                          <p:spTgt spid="9"/>
+                                        </p:tgtEl>
+                                        <p:attrNameLst>
+                                          <p:attrName>style.visibility</p:attrName>
+                                        </p:attrNameLst>
+                                      </p:cBhvr>
+                                      <p:to>
+                                        <p:strVal val="visible"/>
+                                      </p:to>
+                                    </p:set>
+                                  </p:childTnLst>
+                                </p:cTn>
+                              </p:par>
+                            </p:childTnLst>
+                          </p:cTn>
+                        </p:par>
+                      </p:childTnLst>
+                    </p:cTn>
+                  </p:par>
+                  <p:par>
+                    <p:cTn id="41" fill="hold">
+                      <p:stCondLst>
+                        <p:cond delay="indefinite"/>
+                      </p:stCondLst>
+                      <p:childTnLst>
+                        <p:par>
+                          <p:cTn id="42" fill="hold">
+                            <p:stCondLst>
+                              <p:cond delay="0"/>
+                            </p:stCondLst>
+                            <p:childTnLst>
+                              <p:par>
+                                <p:cTn id="43" presetID="1" presetClass="entr" presetSubtype="0" fill="hold" grpId="0" nodeType="clickEffect">
+                                  <p:stCondLst>
+                                    <p:cond delay="0"/>
+                                  </p:stCondLst>
+                                  <p:childTnLst>
+                                    <p:set>
+                                      <p:cBhvr>
+                                        <p:cTn id="44" dur="1" fill="hold">
+                                          <p:stCondLst>
+                                            <p:cond delay="0"/>
+                                          </p:stCondLst>
+                                        </p:cTn>
+                                        <p:tgtEl>
+                                          <p:spTgt spid="5">
+                                            <p:txEl>
+                                              <p:pRg st="8" end="8"/>
+                                            </p:txEl>
+                                          </p:spTgt>
+                                        </p:tgtEl>
+                                        <p:attrNameLst>
+                                          <p:attrName>style.visibility</p:attrName>
+                                        </p:attrNameLst>
+                                      </p:cBhvr>
+                                      <p:to>
+                                        <p:strVal val="visible"/>
+                                      </p:to>
+                                    </p:set>
+                                  </p:childTnLst>
+                                </p:cTn>
+                              </p:par>
+                            </p:childTnLst>
+                          </p:cTn>
+                        </p:par>
+                      </p:childTnLst>
+                    </p:cTn>
+                  </p:par>
+                  <p:par>
+                    <p:cTn id="45" fill="hold">
+                      <p:stCondLst>
+                        <p:cond delay="indefinite"/>
+                      </p:stCondLst>
+                      <p:childTnLst>
+                        <p:par>
+                          <p:cTn id="46" fill="hold">
+                            <p:stCondLst>
+                              <p:cond delay="0"/>
+                            </p:stCondLst>
+                            <p:childTnLst>
+                              <p:par>
+                                <p:cTn id="47" presetID="1" presetClass="entr" presetSubtype="0" fill="hold" grpId="0" nodeType="clickEffect">
+                                  <p:stCondLst>
+                                    <p:cond delay="0"/>
+                                  </p:stCondLst>
+                                  <p:childTnLst>
+                                    <p:set>
+                                      <p:cBhvr>
+                                        <p:cTn id="48" dur="1" fill="hold">
+                                          <p:stCondLst>
+                                            <p:cond delay="0"/>
+                                          </p:stCondLst>
+                                        </p:cTn>
+                                        <p:tgtEl>
+                                          <p:spTgt spid="5">
+                                            <p:txEl>
+                                              <p:pRg st="9" end="9"/>
+                                            </p:txEl>
+                                          </p:spTgt>
+                                        </p:tgtEl>
+                                        <p:attrNameLst>
+                                          <p:attrName>style.visibility</p:attrName>
+                                        </p:attrNameLst>
+                                      </p:cBhvr>
+                                      <p:to>
+                                        <p:strVal val="visible"/>
+                                      </p:to>
+                                    </p:set>
+                                  </p:childTnLst>
+                                </p:cTn>
+                              </p:par>
+                            </p:childTnLst>
+                          </p:cTn>
+                        </p:par>
+                      </p:childTnLst>
+                    </p:cTn>
+                  </p:par>
+                </p:childTnLst>
+              </p:cTn>
+              <p:prevCondLst>
+                <p:cond evt="onPrev" delay="0">
+                  <p:tgtEl>
+                    <p:sldTgt/>
+                  </p:tgtEl>
+                </p:cond>
+              </p:prevCondLst>
+              <p:nextCondLst>
+                <p:cond evt="onNext" delay="0">
+                  <p:tgtEl>
+                    <p:sldTgt/>
+                  </p:tgtEl>
+                </p:cond>
+              </p:nextCondLst>
+            </p:seq>
+          </p:childTnLst>
+        </p:cTn>
       </p:par>
     </p:tnLst>
+    <p:bldLst>
+      <p:bldP spid="3" grpId="0" build="p"/>
+      <p:bldP spid="5" grpId="0" build="p"/>
+    </p:bldLst>
   </p:timing>
 </p:sld>
 </file>
@@ -6722,9 +7502,302 @@
   <p:timing>
     <p:tnLst>
       <p:par>
-        <p:cTn id="1" dur="indefinite" restart="never" nodeType="tmRoot"/>
+        <p:cTn xmlns:p14="http://schemas.microsoft.com/office/powerpoint/2010/main" id="1" dur="indefinite" restart="never" nodeType="tmRoot">
+          <p:childTnLst>
+            <p:seq concurrent="1" nextAc="seek">
+              <p:cTn id="2" dur="indefinite" nodeType="mainSeq">
+                <p:childTnLst>
+                  <p:par>
+                    <p:cTn id="3" fill="hold">
+                      <p:stCondLst>
+                        <p:cond delay="indefinite"/>
+                        <p:cond evt="onBegin" delay="0">
+                          <p:tn val="2"/>
+                        </p:cond>
+                      </p:stCondLst>
+                      <p:childTnLst>
+                        <p:par>
+                          <p:cTn id="4" fill="hold">
+                            <p:stCondLst>
+                              <p:cond delay="0"/>
+                            </p:stCondLst>
+                            <p:childTnLst>
+                              <p:par>
+                                <p:cTn id="5" presetID="1" presetClass="entr" presetSubtype="0" fill="hold" grpId="0" nodeType="withEffect">
+                                  <p:stCondLst>
+                                    <p:cond delay="0"/>
+                                  </p:stCondLst>
+                                  <p:childTnLst>
+                                    <p:set>
+                                      <p:cBhvr>
+                                        <p:cTn id="6" dur="1" fill="hold">
+                                          <p:stCondLst>
+                                            <p:cond delay="0"/>
+                                          </p:stCondLst>
+                                        </p:cTn>
+                                        <p:tgtEl>
+                                          <p:spTgt spid="3">
+                                            <p:txEl>
+                                              <p:pRg st="1" end="1"/>
+                                            </p:txEl>
+                                          </p:spTgt>
+                                        </p:tgtEl>
+                                        <p:attrNameLst>
+                                          <p:attrName>style.visibility</p:attrName>
+                                        </p:attrNameLst>
+                                      </p:cBhvr>
+                                      <p:to>
+                                        <p:strVal val="visible"/>
+                                      </p:to>
+                                    </p:set>
+                                  </p:childTnLst>
+                                </p:cTn>
+                              </p:par>
+                              <p:par>
+                                <p:cTn id="7" presetID="1" presetClass="entr" presetSubtype="0" fill="hold" grpId="0" nodeType="withEffect">
+                                  <p:stCondLst>
+                                    <p:cond delay="0"/>
+                                  </p:stCondLst>
+                                  <p:childTnLst>
+                                    <p:set>
+                                      <p:cBhvr>
+                                        <p:cTn id="8" dur="1" fill="hold">
+                                          <p:stCondLst>
+                                            <p:cond delay="0"/>
+                                          </p:stCondLst>
+                                        </p:cTn>
+                                        <p:tgtEl>
+                                          <p:spTgt spid="3">
+                                            <p:txEl>
+                                              <p:pRg st="2" end="2"/>
+                                            </p:txEl>
+                                          </p:spTgt>
+                                        </p:tgtEl>
+                                        <p:attrNameLst>
+                                          <p:attrName>style.visibility</p:attrName>
+                                        </p:attrNameLst>
+                                      </p:cBhvr>
+                                      <p:to>
+                                        <p:strVal val="visible"/>
+                                      </p:to>
+                                    </p:set>
+                                  </p:childTnLst>
+                                </p:cTn>
+                              </p:par>
+                              <p:par>
+                                <p:cTn id="9" presetID="1" presetClass="entr" presetSubtype="0" fill="hold" grpId="0" nodeType="withEffect">
+                                  <p:stCondLst>
+                                    <p:cond delay="0"/>
+                                  </p:stCondLst>
+                                  <p:childTnLst>
+                                    <p:set>
+                                      <p:cBhvr>
+                                        <p:cTn id="10" dur="1" fill="hold">
+                                          <p:stCondLst>
+                                            <p:cond delay="0"/>
+                                          </p:stCondLst>
+                                        </p:cTn>
+                                        <p:tgtEl>
+                                          <p:spTgt spid="3">
+                                            <p:txEl>
+                                              <p:pRg st="4" end="4"/>
+                                            </p:txEl>
+                                          </p:spTgt>
+                                        </p:tgtEl>
+                                        <p:attrNameLst>
+                                          <p:attrName>style.visibility</p:attrName>
+                                        </p:attrNameLst>
+                                      </p:cBhvr>
+                                      <p:to>
+                                        <p:strVal val="visible"/>
+                                      </p:to>
+                                    </p:set>
+                                  </p:childTnLst>
+                                </p:cTn>
+                              </p:par>
+                            </p:childTnLst>
+                          </p:cTn>
+                        </p:par>
+                      </p:childTnLst>
+                    </p:cTn>
+                  </p:par>
+                  <p:par>
+                    <p:cTn id="11" fill="hold">
+                      <p:stCondLst>
+                        <p:cond delay="indefinite"/>
+                      </p:stCondLst>
+                      <p:childTnLst>
+                        <p:par>
+                          <p:cTn id="12" fill="hold">
+                            <p:stCondLst>
+                              <p:cond delay="0"/>
+                            </p:stCondLst>
+                            <p:childTnLst>
+                              <p:par>
+                                <p:cTn id="13" presetID="1" presetClass="entr" presetSubtype="0" fill="hold" grpId="0" nodeType="clickEffect">
+                                  <p:stCondLst>
+                                    <p:cond delay="0"/>
+                                  </p:stCondLst>
+                                  <p:childTnLst>
+                                    <p:set>
+                                      <p:cBhvr>
+                                        <p:cTn id="14" dur="1" fill="hold">
+                                          <p:stCondLst>
+                                            <p:cond delay="0"/>
+                                          </p:stCondLst>
+                                        </p:cTn>
+                                        <p:tgtEl>
+                                          <p:spTgt spid="3">
+                                            <p:txEl>
+                                              <p:pRg st="5" end="5"/>
+                                            </p:txEl>
+                                          </p:spTgt>
+                                        </p:tgtEl>
+                                        <p:attrNameLst>
+                                          <p:attrName>style.visibility</p:attrName>
+                                        </p:attrNameLst>
+                                      </p:cBhvr>
+                                      <p:to>
+                                        <p:strVal val="visible"/>
+                                      </p:to>
+                                    </p:set>
+                                  </p:childTnLst>
+                                </p:cTn>
+                              </p:par>
+                              <p:par>
+                                <p:cTn id="15" presetID="1" presetClass="entr" presetSubtype="0" fill="hold" nodeType="withEffect">
+                                  <p:stCondLst>
+                                    <p:cond delay="0"/>
+                                  </p:stCondLst>
+                                  <p:childTnLst>
+                                    <p:set>
+                                      <p:cBhvr>
+                                        <p:cTn id="16" dur="1" fill="hold">
+                                          <p:stCondLst>
+                                            <p:cond delay="0"/>
+                                          </p:stCondLst>
+                                        </p:cTn>
+                                        <p:tgtEl>
+                                          <p:spTgt spid="9"/>
+                                        </p:tgtEl>
+                                        <p:attrNameLst>
+                                          <p:attrName>style.visibility</p:attrName>
+                                        </p:attrNameLst>
+                                      </p:cBhvr>
+                                      <p:to>
+                                        <p:strVal val="visible"/>
+                                      </p:to>
+                                    </p:set>
+                                  </p:childTnLst>
+                                </p:cTn>
+                              </p:par>
+                            </p:childTnLst>
+                          </p:cTn>
+                        </p:par>
+                      </p:childTnLst>
+                    </p:cTn>
+                  </p:par>
+                  <p:par>
+                    <p:cTn id="17" fill="hold">
+                      <p:stCondLst>
+                        <p:cond delay="indefinite"/>
+                      </p:stCondLst>
+                      <p:childTnLst>
+                        <p:par>
+                          <p:cTn id="18" fill="hold">
+                            <p:stCondLst>
+                              <p:cond delay="0"/>
+                            </p:stCondLst>
+                            <p:childTnLst>
+                              <p:par>
+                                <p:cTn id="19" presetID="1" presetClass="entr" presetSubtype="0" fill="hold" grpId="0" nodeType="clickEffect">
+                                  <p:stCondLst>
+                                    <p:cond delay="0"/>
+                                  </p:stCondLst>
+                                  <p:childTnLst>
+                                    <p:set>
+                                      <p:cBhvr>
+                                        <p:cTn id="20" dur="1" fill="hold">
+                                          <p:stCondLst>
+                                            <p:cond delay="0"/>
+                                          </p:stCondLst>
+                                        </p:cTn>
+                                        <p:tgtEl>
+                                          <p:spTgt spid="3">
+                                            <p:txEl>
+                                              <p:pRg st="6" end="6"/>
+                                            </p:txEl>
+                                          </p:spTgt>
+                                        </p:tgtEl>
+                                        <p:attrNameLst>
+                                          <p:attrName>style.visibility</p:attrName>
+                                        </p:attrNameLst>
+                                      </p:cBhvr>
+                                      <p:to>
+                                        <p:strVal val="visible"/>
+                                      </p:to>
+                                    </p:set>
+                                  </p:childTnLst>
+                                </p:cTn>
+                              </p:par>
+                              <p:par>
+                                <p:cTn id="21" presetID="1" presetClass="entr" presetSubtype="0" fill="hold" grpId="0" nodeType="withEffect">
+                                  <p:stCondLst>
+                                    <p:cond delay="0"/>
+                                  </p:stCondLst>
+                                  <p:childTnLst>
+                                    <p:set>
+                                      <p:cBhvr>
+                                        <p:cTn id="22" dur="1" fill="hold">
+                                          <p:stCondLst>
+                                            <p:cond delay="0"/>
+                                          </p:stCondLst>
+                                        </p:cTn>
+                                        <p:tgtEl>
+                                          <p:spTgt spid="10"/>
+                                        </p:tgtEl>
+                                        <p:attrNameLst>
+                                          <p:attrName>style.visibility</p:attrName>
+                                        </p:attrNameLst>
+                                      </p:cBhvr>
+                                      <p:to>
+                                        <p:strVal val="visible"/>
+                                      </p:to>
+                                    </p:set>
+                                  </p:childTnLst>
+                                </p:cTn>
+                              </p:par>
+                            </p:childTnLst>
+                          </p:cTn>
+                        </p:par>
+                      </p:childTnLst>
+                    </p:cTn>
+                  </p:par>
+                </p:childTnLst>
+              </p:cTn>
+              <p:prevCondLst>
+                <p:cond evt="onPrev" delay="0">
+                  <p:tgtEl>
+                    <p:sldTgt/>
+                  </p:tgtEl>
+                </p:cond>
+              </p:prevCondLst>
+              <p:nextCondLst>
+                <p:cond evt="onNext" delay="0">
+                  <p:tgtEl>
+                    <p:sldTgt/>
+                  </p:tgtEl>
+                </p:cond>
+              </p:nextCondLst>
+            </p:seq>
+          </p:childTnLst>
+        </p:cTn>
       </p:par>
     </p:tnLst>
+    <p:bldLst>
+      <p:bldP spid="3" grpId="0" build="p"/>
+      <p:bldP spid="10" grpId="0" animBg="1"/>
+    </p:bldLst>
   </p:timing>
 </p:sld>
 </file>
@@ -6970,6 +8043,13 @@
   <p:clrMapOvr>
     <a:masterClrMapping/>
   </p:clrMapOvr>
+  <p:timing>
+    <p:tnLst>
+      <p:par>
+        <p:cTn xmlns:p14="http://schemas.microsoft.com/office/powerpoint/2010/main" id="1" dur="indefinite" restart="never" nodeType="tmRoot"/>
+      </p:par>
+    </p:tnLst>
+  </p:timing>
 </p:sld>
 </file>
 
@@ -7128,6 +8208,13 @@
   <p:clrMapOvr>
     <a:masterClrMapping/>
   </p:clrMapOvr>
+  <p:timing>
+    <p:tnLst>
+      <p:par>
+        <p:cTn xmlns:p14="http://schemas.microsoft.com/office/powerpoint/2010/main" id="1" dur="indefinite" restart="never" nodeType="tmRoot"/>
+      </p:par>
+    </p:tnLst>
+  </p:timing>
 </p:sld>
 </file>
 
@@ -7369,7 +8456,7 @@
           <a:graphicData uri="http://schemas.openxmlformats.org/presentationml/2006/ole">
             <mc:AlternateContent xmlns:mc="http://schemas.openxmlformats.org/markup-compatibility/2006">
               <mc:Choice xmlns:v="urn:schemas-microsoft-com:vml" Requires="v">
-                <p:oleObj spid="_x0000_s9227" name="Equation" r:id="rId3" imgW="1511280" imgH="419040" progId="Equation.3">
+                <p:oleObj spid="_x0000_s9230" name="Equation" r:id="rId3" imgW="1511280" imgH="419040" progId="Equation.3">
                   <p:embed/>
                 </p:oleObj>
               </mc:Choice>
@@ -7414,6 +8501,13 @@
   <p:clrMapOvr>
     <a:masterClrMapping/>
   </p:clrMapOvr>
+  <p:timing>
+    <p:tnLst>
+      <p:par>
+        <p:cTn xmlns:p14="http://schemas.microsoft.com/office/powerpoint/2010/main" id="1" dur="indefinite" restart="never" nodeType="tmRoot"/>
+      </p:par>
+    </p:tnLst>
+  </p:timing>
 </p:sld>
 </file>
 
@@ -7721,7 +8815,7 @@
           <a:graphicData uri="http://schemas.openxmlformats.org/presentationml/2006/ole">
             <mc:AlternateContent xmlns:mc="http://schemas.openxmlformats.org/markup-compatibility/2006">
               <mc:Choice xmlns:v="urn:schemas-microsoft-com:vml" Requires="v">
-                <p:oleObj spid="_x0000_s1044" name="Equation" r:id="rId3" imgW="1511280" imgH="419040" progId="Equation.3">
+                <p:oleObj spid="_x0000_s1048" name="Equation" r:id="rId3" imgW="1511280" imgH="419040" progId="Equation.3">
                   <p:embed/>
                 </p:oleObj>
               </mc:Choice>
@@ -7911,6 +9005,556 @@
   <p:clrMapOvr>
     <a:masterClrMapping/>
   </p:clrMapOvr>
+  <p:timing>
+    <p:tnLst>
+      <p:par>
+        <p:cTn xmlns:p14="http://schemas.microsoft.com/office/powerpoint/2010/main" id="1" dur="indefinite" restart="never" nodeType="tmRoot">
+          <p:childTnLst>
+            <p:seq concurrent="1" nextAc="seek">
+              <p:cTn id="2" dur="indefinite" nodeType="mainSeq">
+                <p:childTnLst>
+                  <p:par>
+                    <p:cTn id="3" fill="hold">
+                      <p:stCondLst>
+                        <p:cond delay="indefinite"/>
+                      </p:stCondLst>
+                      <p:childTnLst>
+                        <p:par>
+                          <p:cTn id="4" fill="hold">
+                            <p:stCondLst>
+                              <p:cond delay="0"/>
+                            </p:stCondLst>
+                            <p:childTnLst>
+                              <p:par>
+                                <p:cTn id="5" presetID="1" presetClass="entr" presetSubtype="0" fill="hold" grpId="0" nodeType="clickEffect">
+                                  <p:stCondLst>
+                                    <p:cond delay="0"/>
+                                  </p:stCondLst>
+                                  <p:childTnLst>
+                                    <p:set>
+                                      <p:cBhvr>
+                                        <p:cTn id="6" dur="1" fill="hold">
+                                          <p:stCondLst>
+                                            <p:cond delay="0"/>
+                                          </p:stCondLst>
+                                        </p:cTn>
+                                        <p:tgtEl>
+                                          <p:spTgt spid="3">
+                                            <p:txEl>
+                                              <p:pRg st="3" end="3"/>
+                                            </p:txEl>
+                                          </p:spTgt>
+                                        </p:tgtEl>
+                                        <p:attrNameLst>
+                                          <p:attrName>style.visibility</p:attrName>
+                                        </p:attrNameLst>
+                                      </p:cBhvr>
+                                      <p:to>
+                                        <p:strVal val="visible"/>
+                                      </p:to>
+                                    </p:set>
+                                  </p:childTnLst>
+                                </p:cTn>
+                              </p:par>
+                              <p:par>
+                                <p:cTn id="7" presetID="1" presetClass="entr" presetSubtype="0" fill="hold" grpId="0" nodeType="withEffect">
+                                  <p:stCondLst>
+                                    <p:cond delay="0"/>
+                                  </p:stCondLst>
+                                  <p:childTnLst>
+                                    <p:set>
+                                      <p:cBhvr>
+                                        <p:cTn id="8" dur="1" fill="hold">
+                                          <p:stCondLst>
+                                            <p:cond delay="0"/>
+                                          </p:stCondLst>
+                                        </p:cTn>
+                                        <p:tgtEl>
+                                          <p:spTgt spid="3">
+                                            <p:txEl>
+                                              <p:pRg st="4" end="4"/>
+                                            </p:txEl>
+                                          </p:spTgt>
+                                        </p:tgtEl>
+                                        <p:attrNameLst>
+                                          <p:attrName>style.visibility</p:attrName>
+                                        </p:attrNameLst>
+                                      </p:cBhvr>
+                                      <p:to>
+                                        <p:strVal val="visible"/>
+                                      </p:to>
+                                    </p:set>
+                                  </p:childTnLst>
+                                </p:cTn>
+                              </p:par>
+                              <p:par>
+                                <p:cTn id="9" presetID="1" presetClass="entr" presetSubtype="0" fill="hold" nodeType="withEffect">
+                                  <p:stCondLst>
+                                    <p:cond delay="0"/>
+                                  </p:stCondLst>
+                                  <p:childTnLst>
+                                    <p:set>
+                                      <p:cBhvr>
+                                        <p:cTn id="10" dur="1" fill="hold">
+                                          <p:stCondLst>
+                                            <p:cond delay="0"/>
+                                          </p:stCondLst>
+                                        </p:cTn>
+                                        <p:tgtEl>
+                                          <p:spTgt spid="3">
+                                            <p:txEl>
+                                              <p:pRg st="7" end="7"/>
+                                            </p:txEl>
+                                          </p:spTgt>
+                                        </p:tgtEl>
+                                        <p:attrNameLst>
+                                          <p:attrName>style.visibility</p:attrName>
+                                        </p:attrNameLst>
+                                      </p:cBhvr>
+                                      <p:to>
+                                        <p:strVal val="visible"/>
+                                      </p:to>
+                                    </p:set>
+                                  </p:childTnLst>
+                                </p:cTn>
+                              </p:par>
+                              <p:par>
+                                <p:cTn id="11" presetID="1" presetClass="entr" presetSubtype="0" fill="hold" nodeType="withEffect">
+                                  <p:stCondLst>
+                                    <p:cond delay="0"/>
+                                  </p:stCondLst>
+                                  <p:childTnLst>
+                                    <p:set>
+                                      <p:cBhvr>
+                                        <p:cTn id="12" dur="1" fill="hold">
+                                          <p:stCondLst>
+                                            <p:cond delay="0"/>
+                                          </p:stCondLst>
+                                        </p:cTn>
+                                        <p:tgtEl>
+                                          <p:spTgt spid="3">
+                                            <p:txEl>
+                                              <p:pRg st="9" end="9"/>
+                                            </p:txEl>
+                                          </p:spTgt>
+                                        </p:tgtEl>
+                                        <p:attrNameLst>
+                                          <p:attrName>style.visibility</p:attrName>
+                                        </p:attrNameLst>
+                                      </p:cBhvr>
+                                      <p:to>
+                                        <p:strVal val="visible"/>
+                                      </p:to>
+                                    </p:set>
+                                  </p:childTnLst>
+                                </p:cTn>
+                              </p:par>
+                            </p:childTnLst>
+                          </p:cTn>
+                        </p:par>
+                      </p:childTnLst>
+                    </p:cTn>
+                  </p:par>
+                  <p:par>
+                    <p:cTn id="13" fill="hold">
+                      <p:stCondLst>
+                        <p:cond delay="indefinite"/>
+                      </p:stCondLst>
+                      <p:childTnLst>
+                        <p:par>
+                          <p:cTn id="14" fill="hold">
+                            <p:stCondLst>
+                              <p:cond delay="0"/>
+                            </p:stCondLst>
+                            <p:childTnLst>
+                              <p:par>
+                                <p:cTn id="15" presetID="1" presetClass="entr" presetSubtype="0" fill="hold" grpId="0" nodeType="clickEffect">
+                                  <p:stCondLst>
+                                    <p:cond delay="0"/>
+                                  </p:stCondLst>
+                                  <p:childTnLst>
+                                    <p:set>
+                                      <p:cBhvr>
+                                        <p:cTn id="16" dur="1" fill="hold">
+                                          <p:stCondLst>
+                                            <p:cond delay="0"/>
+                                          </p:stCondLst>
+                                        </p:cTn>
+                                        <p:tgtEl>
+                                          <p:spTgt spid="3">
+                                            <p:txEl>
+                                              <p:pRg st="5" end="5"/>
+                                            </p:txEl>
+                                          </p:spTgt>
+                                        </p:tgtEl>
+                                        <p:attrNameLst>
+                                          <p:attrName>style.visibility</p:attrName>
+                                        </p:attrNameLst>
+                                      </p:cBhvr>
+                                      <p:to>
+                                        <p:strVal val="visible"/>
+                                      </p:to>
+                                    </p:set>
+                                  </p:childTnLst>
+                                </p:cTn>
+                              </p:par>
+                              <p:par>
+                                <p:cTn id="17" presetID="1" presetClass="entr" presetSubtype="0" fill="hold" grpId="0" nodeType="withEffect">
+                                  <p:stCondLst>
+                                    <p:cond delay="0"/>
+                                  </p:stCondLst>
+                                  <p:childTnLst>
+                                    <p:set>
+                                      <p:cBhvr>
+                                        <p:cTn id="18" dur="1" fill="hold">
+                                          <p:stCondLst>
+                                            <p:cond delay="0"/>
+                                          </p:stCondLst>
+                                        </p:cTn>
+                                        <p:tgtEl>
+                                          <p:spTgt spid="3">
+                                            <p:txEl>
+                                              <p:pRg st="6" end="6"/>
+                                            </p:txEl>
+                                          </p:spTgt>
+                                        </p:tgtEl>
+                                        <p:attrNameLst>
+                                          <p:attrName>style.visibility</p:attrName>
+                                        </p:attrNameLst>
+                                      </p:cBhvr>
+                                      <p:to>
+                                        <p:strVal val="visible"/>
+                                      </p:to>
+                                    </p:set>
+                                  </p:childTnLst>
+                                </p:cTn>
+                              </p:par>
+                            </p:childTnLst>
+                          </p:cTn>
+                        </p:par>
+                      </p:childTnLst>
+                    </p:cTn>
+                  </p:par>
+                  <p:par>
+                    <p:cTn id="19" fill="hold">
+                      <p:stCondLst>
+                        <p:cond delay="indefinite"/>
+                      </p:stCondLst>
+                      <p:childTnLst>
+                        <p:par>
+                          <p:cTn id="20" fill="hold">
+                            <p:stCondLst>
+                              <p:cond delay="0"/>
+                            </p:stCondLst>
+                            <p:childTnLst>
+                              <p:par>
+                                <p:cTn id="21" presetID="1" presetClass="entr" presetSubtype="0" fill="hold" nodeType="clickEffect">
+                                  <p:stCondLst>
+                                    <p:cond delay="0"/>
+                                  </p:stCondLst>
+                                  <p:childTnLst>
+                                    <p:set>
+                                      <p:cBhvr>
+                                        <p:cTn id="22" dur="1" fill="hold">
+                                          <p:stCondLst>
+                                            <p:cond delay="0"/>
+                                          </p:stCondLst>
+                                        </p:cTn>
+                                        <p:tgtEl>
+                                          <p:spTgt spid="15"/>
+                                        </p:tgtEl>
+                                        <p:attrNameLst>
+                                          <p:attrName>style.visibility</p:attrName>
+                                        </p:attrNameLst>
+                                      </p:cBhvr>
+                                      <p:to>
+                                        <p:strVal val="visible"/>
+                                      </p:to>
+                                    </p:set>
+                                  </p:childTnLst>
+                                </p:cTn>
+                              </p:par>
+                            </p:childTnLst>
+                          </p:cTn>
+                        </p:par>
+                      </p:childTnLst>
+                    </p:cTn>
+                  </p:par>
+                  <p:par>
+                    <p:cTn id="23" fill="hold">
+                      <p:stCondLst>
+                        <p:cond delay="indefinite"/>
+                      </p:stCondLst>
+                      <p:childTnLst>
+                        <p:par>
+                          <p:cTn id="24" fill="hold">
+                            <p:stCondLst>
+                              <p:cond delay="0"/>
+                            </p:stCondLst>
+                            <p:childTnLst>
+                              <p:par>
+                                <p:cTn id="25" presetID="1" presetClass="entr" presetSubtype="0" fill="hold" nodeType="clickEffect">
+                                  <p:stCondLst>
+                                    <p:cond delay="0"/>
+                                  </p:stCondLst>
+                                  <p:childTnLst>
+                                    <p:set>
+                                      <p:cBhvr>
+                                        <p:cTn id="26" dur="1" fill="hold">
+                                          <p:stCondLst>
+                                            <p:cond delay="0"/>
+                                          </p:stCondLst>
+                                        </p:cTn>
+                                        <p:tgtEl>
+                                          <p:spTgt spid="11"/>
+                                        </p:tgtEl>
+                                        <p:attrNameLst>
+                                          <p:attrName>style.visibility</p:attrName>
+                                        </p:attrNameLst>
+                                      </p:cBhvr>
+                                      <p:to>
+                                        <p:strVal val="visible"/>
+                                      </p:to>
+                                    </p:set>
+                                  </p:childTnLst>
+                                </p:cTn>
+                              </p:par>
+                            </p:childTnLst>
+                          </p:cTn>
+                        </p:par>
+                      </p:childTnLst>
+                    </p:cTn>
+                  </p:par>
+                  <p:par>
+                    <p:cTn id="27" fill="hold">
+                      <p:stCondLst>
+                        <p:cond delay="indefinite"/>
+                      </p:stCondLst>
+                      <p:childTnLst>
+                        <p:par>
+                          <p:cTn id="28" fill="hold">
+                            <p:stCondLst>
+                              <p:cond delay="0"/>
+                            </p:stCondLst>
+                            <p:childTnLst>
+                              <p:par>
+                                <p:cTn id="29" presetID="1" presetClass="entr" presetSubtype="0" fill="hold" grpId="0" nodeType="clickEffect">
+                                  <p:stCondLst>
+                                    <p:cond delay="0"/>
+                                  </p:stCondLst>
+                                  <p:childTnLst>
+                                    <p:set>
+                                      <p:cBhvr>
+                                        <p:cTn id="30" dur="1" fill="hold">
+                                          <p:stCondLst>
+                                            <p:cond delay="0"/>
+                                          </p:stCondLst>
+                                        </p:cTn>
+                                        <p:tgtEl>
+                                          <p:spTgt spid="3">
+                                            <p:txEl>
+                                              <p:pRg st="8" end="8"/>
+                                            </p:txEl>
+                                          </p:spTgt>
+                                        </p:tgtEl>
+                                        <p:attrNameLst>
+                                          <p:attrName>style.visibility</p:attrName>
+                                        </p:attrNameLst>
+                                      </p:cBhvr>
+                                      <p:to>
+                                        <p:strVal val="visible"/>
+                                      </p:to>
+                                    </p:set>
+                                  </p:childTnLst>
+                                </p:cTn>
+                              </p:par>
+                            </p:childTnLst>
+                          </p:cTn>
+                        </p:par>
+                      </p:childTnLst>
+                    </p:cTn>
+                  </p:par>
+                  <p:par>
+                    <p:cTn id="31" fill="hold">
+                      <p:stCondLst>
+                        <p:cond delay="indefinite"/>
+                      </p:stCondLst>
+                      <p:childTnLst>
+                        <p:par>
+                          <p:cTn id="32" fill="hold">
+                            <p:stCondLst>
+                              <p:cond delay="0"/>
+                            </p:stCondLst>
+                            <p:childTnLst>
+                              <p:par>
+                                <p:cTn id="33" presetID="1" presetClass="entr" presetSubtype="0" fill="hold" nodeType="clickEffect">
+                                  <p:stCondLst>
+                                    <p:cond delay="0"/>
+                                  </p:stCondLst>
+                                  <p:childTnLst>
+                                    <p:set>
+                                      <p:cBhvr>
+                                        <p:cTn id="34" dur="1" fill="hold">
+                                          <p:stCondLst>
+                                            <p:cond delay="0"/>
+                                          </p:stCondLst>
+                                        </p:cTn>
+                                        <p:tgtEl>
+                                          <p:spTgt spid="9"/>
+                                        </p:tgtEl>
+                                        <p:attrNameLst>
+                                          <p:attrName>style.visibility</p:attrName>
+                                        </p:attrNameLst>
+                                      </p:cBhvr>
+                                      <p:to>
+                                        <p:strVal val="visible"/>
+                                      </p:to>
+                                    </p:set>
+                                  </p:childTnLst>
+                                </p:cTn>
+                              </p:par>
+                            </p:childTnLst>
+                          </p:cTn>
+                        </p:par>
+                      </p:childTnLst>
+                    </p:cTn>
+                  </p:par>
+                  <p:par>
+                    <p:cTn id="35" fill="hold">
+                      <p:stCondLst>
+                        <p:cond delay="indefinite"/>
+                      </p:stCondLst>
+                      <p:childTnLst>
+                        <p:par>
+                          <p:cTn id="36" fill="hold">
+                            <p:stCondLst>
+                              <p:cond delay="0"/>
+                            </p:stCondLst>
+                            <p:childTnLst>
+                              <p:par>
+                                <p:cTn id="37" presetID="1" presetClass="entr" presetSubtype="0" fill="hold" grpId="0" nodeType="clickEffect">
+                                  <p:stCondLst>
+                                    <p:cond delay="0"/>
+                                  </p:stCondLst>
+                                  <p:childTnLst>
+                                    <p:set>
+                                      <p:cBhvr>
+                                        <p:cTn id="38" dur="1" fill="hold">
+                                          <p:stCondLst>
+                                            <p:cond delay="0"/>
+                                          </p:stCondLst>
+                                        </p:cTn>
+                                        <p:tgtEl>
+                                          <p:spTgt spid="3">
+                                            <p:txEl>
+                                              <p:pRg st="10" end="10"/>
+                                            </p:txEl>
+                                          </p:spTgt>
+                                        </p:tgtEl>
+                                        <p:attrNameLst>
+                                          <p:attrName>style.visibility</p:attrName>
+                                        </p:attrNameLst>
+                                      </p:cBhvr>
+                                      <p:to>
+                                        <p:strVal val="visible"/>
+                                      </p:to>
+                                    </p:set>
+                                  </p:childTnLst>
+                                </p:cTn>
+                              </p:par>
+                              <p:par>
+                                <p:cTn id="39" presetID="1" presetClass="entr" presetSubtype="0" fill="hold" nodeType="withEffect">
+                                  <p:stCondLst>
+                                    <p:cond delay="0"/>
+                                  </p:stCondLst>
+                                  <p:childTnLst>
+                                    <p:set>
+                                      <p:cBhvr>
+                                        <p:cTn id="40" dur="1" fill="hold">
+                                          <p:stCondLst>
+                                            <p:cond delay="0"/>
+                                          </p:stCondLst>
+                                        </p:cTn>
+                                        <p:tgtEl>
+                                          <p:spTgt spid="3">
+                                            <p:txEl>
+                                              <p:pRg st="10" end="10"/>
+                                            </p:txEl>
+                                          </p:spTgt>
+                                        </p:tgtEl>
+                                        <p:attrNameLst>
+                                          <p:attrName>style.visibility</p:attrName>
+                                        </p:attrNameLst>
+                                      </p:cBhvr>
+                                      <p:to>
+                                        <p:strVal val="visible"/>
+                                      </p:to>
+                                    </p:set>
+                                  </p:childTnLst>
+                                </p:cTn>
+                              </p:par>
+                              <p:par>
+                                <p:cTn id="41" presetID="1" presetClass="entr" presetSubtype="0" fill="hold" nodeType="withEffect">
+                                  <p:stCondLst>
+                                    <p:cond delay="0"/>
+                                  </p:stCondLst>
+                                  <p:childTnLst>
+                                    <p:set>
+                                      <p:cBhvr>
+                                        <p:cTn id="42" dur="1" fill="hold">
+                                          <p:stCondLst>
+                                            <p:cond delay="0"/>
+                                          </p:stCondLst>
+                                        </p:cTn>
+                                        <p:tgtEl>
+                                          <p:spTgt spid="3">
+                                            <p:txEl>
+                                              <p:pRg st="8" end="8"/>
+                                            </p:txEl>
+                                          </p:spTgt>
+                                        </p:tgtEl>
+                                        <p:attrNameLst>
+                                          <p:attrName>style.visibility</p:attrName>
+                                        </p:attrNameLst>
+                                      </p:cBhvr>
+                                      <p:to>
+                                        <p:strVal val="visible"/>
+                                      </p:to>
+                                    </p:set>
+                                  </p:childTnLst>
+                                </p:cTn>
+                              </p:par>
+                            </p:childTnLst>
+                          </p:cTn>
+                        </p:par>
+                      </p:childTnLst>
+                    </p:cTn>
+                  </p:par>
+                </p:childTnLst>
+              </p:cTn>
+              <p:prevCondLst>
+                <p:cond evt="onPrev" delay="0">
+                  <p:tgtEl>
+                    <p:sldTgt/>
+                  </p:tgtEl>
+                </p:cond>
+              </p:prevCondLst>
+              <p:nextCondLst>
+                <p:cond evt="onNext" delay="0">
+                  <p:tgtEl>
+                    <p:sldTgt/>
+                  </p:tgtEl>
+                </p:cond>
+              </p:nextCondLst>
+            </p:seq>
+          </p:childTnLst>
+        </p:cTn>
+      </p:par>
+    </p:tnLst>
+    <p:bldLst>
+      <p:bldP spid="3" grpId="0" build="p"/>
+    </p:bldLst>
+  </p:timing>
 </p:sld>
 </file>
 
@@ -8050,7 +9694,7 @@
                   <a:t>MLE </a:t>
                 </a:r>
                 <a14:m>
-                  <m:oMath xmlns:m="http://schemas.openxmlformats.org/officeDocument/2006/math">
+                  <m:oMath xmlns:m="http://schemas.openxmlformats.org/officeDocument/2006/math" xmlns="">
                     <m:acc>
                       <m:accPr>
                         <m:chr m:val="̂"/>
@@ -8079,7 +9723,7 @@
                   <a:t> is the density </a:t>
                 </a:r>
                 <a14:m>
-                  <m:oMath xmlns:m="http://schemas.openxmlformats.org/officeDocument/2006/math">
+                  <m:oMath xmlns:m="http://schemas.openxmlformats.org/officeDocument/2006/math" xmlns="">
                     <m:acc>
                       <m:accPr>
                         <m:chr m:val="̅"/>
@@ -8269,6 +9913,13 @@
   <p:clrMapOvr>
     <a:masterClrMapping/>
   </p:clrMapOvr>
+  <p:timing>
+    <p:tnLst>
+      <p:par>
+        <p:cTn xmlns:p14="http://schemas.microsoft.com/office/powerpoint/2010/main" id="1" dur="indefinite" restart="never" nodeType="tmRoot"/>
+      </p:par>
+    </p:tnLst>
+  </p:timing>
 </p:sld>
 </file>
 
@@ -8454,7 +10105,7 @@
   <p:timing>
     <p:tnLst>
       <p:par>
-        <p:cTn id="1" dur="indefinite" restart="never" nodeType="tmRoot"/>
+        <p:cTn xmlns:p14="http://schemas.microsoft.com/office/powerpoint/2010/main" id="1" dur="indefinite" restart="never" nodeType="tmRoot"/>
       </p:par>
     </p:tnLst>
   </p:timing>
@@ -8726,7 +10377,7 @@
           <a:graphicData uri="http://schemas.openxmlformats.org/presentationml/2006/ole">
             <mc:AlternateContent xmlns:mc="http://schemas.openxmlformats.org/markup-compatibility/2006">
               <mc:Choice xmlns:v="urn:schemas-microsoft-com:vml" Requires="v">
-                <p:oleObj spid="_x0000_s3149" name="Equation" r:id="rId3" imgW="558720" imgH="431640" progId="Equation.DSMT4">
+                <p:oleObj spid="_x0000_s3158" name="Equation" r:id="rId3" imgW="558720" imgH="431640" progId="Equation.DSMT4">
                   <p:embed/>
                 </p:oleObj>
               </mc:Choice>
@@ -8783,7 +10434,7 @@
           <a:graphicData uri="http://schemas.openxmlformats.org/presentationml/2006/ole">
             <mc:AlternateContent xmlns:mc="http://schemas.openxmlformats.org/markup-compatibility/2006">
               <mc:Choice xmlns:v="urn:schemas-microsoft-com:vml" Requires="v">
-                <p:oleObj spid="_x0000_s3150" name="Equation" r:id="rId5" imgW="1193760" imgH="419040" progId="Equation.DSMT4">
+                <p:oleObj spid="_x0000_s3159" name="Equation" r:id="rId5" imgW="1193760" imgH="419040" progId="Equation.DSMT4">
                   <p:embed/>
                 </p:oleObj>
               </mc:Choice>
@@ -8840,7 +10491,7 @@
           <a:graphicData uri="http://schemas.openxmlformats.org/presentationml/2006/ole">
             <mc:AlternateContent xmlns:mc="http://schemas.openxmlformats.org/markup-compatibility/2006">
               <mc:Choice xmlns:v="urn:schemas-microsoft-com:vml" Requires="v">
-                <p:oleObj spid="_x0000_s3151" name="Equation" r:id="rId7" imgW="2425680" imgH="419040" progId="Equation.DSMT4">
+                <p:oleObj spid="_x0000_s3160" name="Equation" r:id="rId7" imgW="2425680" imgH="419040" progId="Equation.DSMT4">
                   <p:embed/>
                 </p:oleObj>
               </mc:Choice>
@@ -8897,7 +10548,7 @@
           <a:graphicData uri="http://schemas.openxmlformats.org/presentationml/2006/ole">
             <mc:AlternateContent xmlns:mc="http://schemas.openxmlformats.org/markup-compatibility/2006">
               <mc:Choice xmlns:v="urn:schemas-microsoft-com:vml" Requires="v">
-                <p:oleObj spid="_x0000_s3152" name="Equation" r:id="rId9" imgW="672840" imgH="431640" progId="Equation.DSMT4">
+                <p:oleObj spid="_x0000_s3161" name="Equation" r:id="rId9" imgW="672840" imgH="431640" progId="Equation.DSMT4">
                   <p:embed/>
                 </p:oleObj>
               </mc:Choice>
@@ -8975,7 +10626,7 @@
   <p:timing>
     <p:tnLst>
       <p:par>
-        <p:cTn id="1" dur="indefinite" restart="never" nodeType="tmRoot"/>
+        <p:cTn xmlns:p14="http://schemas.microsoft.com/office/powerpoint/2010/main" id="1" dur="indefinite" restart="never" nodeType="tmRoot"/>
       </p:par>
     </p:tnLst>
   </p:timing>
@@ -9230,7 +10881,7 @@
           <a:graphicData uri="http://schemas.openxmlformats.org/presentationml/2006/ole">
             <mc:AlternateContent xmlns:mc="http://schemas.openxmlformats.org/markup-compatibility/2006">
               <mc:Choice xmlns:v="urn:schemas-microsoft-com:vml" Requires="v">
-                <p:oleObj spid="_x0000_s7179" name="Equation" r:id="rId3" imgW="1701720" imgH="507960" progId="Equation.DSMT4">
+                <p:oleObj spid="_x0000_s7182" name="Equation" r:id="rId3" imgW="1701720" imgH="507960" progId="Equation.DSMT4">
                   <p:embed/>
                 </p:oleObj>
               </mc:Choice>
@@ -9278,7 +10929,7 @@
   <p:timing>
     <p:tnLst>
       <p:par>
-        <p:cTn id="1" dur="indefinite" restart="never" nodeType="tmRoot"/>
+        <p:cTn xmlns:p14="http://schemas.microsoft.com/office/powerpoint/2010/main" id="1" dur="indefinite" restart="never" nodeType="tmRoot"/>
       </p:par>
     </p:tnLst>
   </p:timing>
@@ -9488,7 +11139,7 @@
           <a:graphicData uri="http://schemas.openxmlformats.org/presentationml/2006/ole">
             <mc:AlternateContent xmlns:mc="http://schemas.openxmlformats.org/markup-compatibility/2006">
               <mc:Choice xmlns:v="urn:schemas-microsoft-com:vml" Requires="v">
-                <p:oleObj spid="_x0000_s5153" name="Equation" r:id="rId3" imgW="1892300" imgH="469900" progId="Equation.3">
+                <p:oleObj spid="_x0000_s5156" name="Equation" r:id="rId3" imgW="1892300" imgH="469900" progId="Equation.3">
                   <p:embed/>
                 </p:oleObj>
               </mc:Choice>
@@ -9591,6 +11242,13 @@
   <p:clrMapOvr>
     <a:masterClrMapping/>
   </p:clrMapOvr>
+  <p:timing>
+    <p:tnLst>
+      <p:par>
+        <p:cTn xmlns:p14="http://schemas.microsoft.com/office/powerpoint/2010/main" id="1" dur="indefinite" restart="never" nodeType="tmRoot"/>
+      </p:par>
+    </p:tnLst>
+  </p:timing>
 </p:sld>
 </file>
 
@@ -9804,6 +11462,13 @@
   <p:clrMapOvr>
     <a:masterClrMapping/>
   </p:clrMapOvr>
+  <p:timing>
+    <p:tnLst>
+      <p:par>
+        <p:cTn xmlns:p14="http://schemas.microsoft.com/office/powerpoint/2010/main" id="1" dur="indefinite" restart="never" nodeType="tmRoot"/>
+      </p:par>
+    </p:tnLst>
+  </p:timing>
 </p:sld>
 </file>
 
@@ -10221,7 +11886,7 @@
           <a:graphicData uri="http://schemas.openxmlformats.org/presentationml/2006/ole">
             <mc:AlternateContent xmlns:mc="http://schemas.openxmlformats.org/markup-compatibility/2006">
               <mc:Choice xmlns:v="urn:schemas-microsoft-com:vml" Requires="v">
-                <p:oleObj spid="_x0000_s6156" name="Equation" r:id="rId3" imgW="3174840" imgH="469800" progId="Equation.3">
+                <p:oleObj spid="_x0000_s6159" name="Equation" r:id="rId3" imgW="3174840" imgH="469800" progId="Equation.3">
                   <p:embed/>
                 </p:oleObj>
               </mc:Choice>
@@ -10525,6 +12190,13 @@
   <p:clrMapOvr>
     <a:masterClrMapping/>
   </p:clrMapOvr>
+  <p:timing>
+    <p:tnLst>
+      <p:par>
+        <p:cTn xmlns:p14="http://schemas.microsoft.com/office/powerpoint/2010/main" id="1" dur="indefinite" restart="never" nodeType="tmRoot"/>
+      </p:par>
+    </p:tnLst>
+  </p:timing>
 </p:sld>
 </file>
 
@@ -10855,7 +12527,7 @@
           <a:graphicData uri="http://schemas.openxmlformats.org/presentationml/2006/ole">
             <mc:AlternateContent xmlns:mc="http://schemas.openxmlformats.org/markup-compatibility/2006">
               <mc:Choice xmlns:v="urn:schemas-microsoft-com:vml" Requires="v">
-                <p:oleObj spid="_x0000_s4144" name="Equation" r:id="rId3" imgW="3174840" imgH="469800" progId="Equation.3">
+                <p:oleObj spid="_x0000_s4153" name="Equation" r:id="rId3" imgW="3174840" imgH="469800" progId="Equation.3">
                   <p:embed/>
                 </p:oleObj>
               </mc:Choice>
@@ -11256,7 +12928,7 @@
           <a:graphicData uri="http://schemas.openxmlformats.org/presentationml/2006/ole">
             <mc:AlternateContent xmlns:mc="http://schemas.openxmlformats.org/markup-compatibility/2006">
               <mc:Choice xmlns:v="urn:schemas-microsoft-com:vml" Requires="v">
-                <p:oleObj spid="_x0000_s4145" name="Equation" r:id="rId5" imgW="1447560" imgH="507960" progId="Equation.DSMT4">
+                <p:oleObj spid="_x0000_s4154" name="Equation" r:id="rId5" imgW="1447560" imgH="507960" progId="Equation.DSMT4">
                   <p:embed/>
                 </p:oleObj>
               </mc:Choice>
@@ -11313,7 +12985,7 @@
           <a:graphicData uri="http://schemas.openxmlformats.org/presentationml/2006/ole">
             <mc:AlternateContent xmlns:mc="http://schemas.openxmlformats.org/markup-compatibility/2006">
               <mc:Choice xmlns:v="urn:schemas-microsoft-com:vml" Requires="v">
-                <p:oleObj spid="_x0000_s4146" name="Equation" r:id="rId7" imgW="2882880" imgH="838080" progId="Equation.DSMT4">
+                <p:oleObj spid="_x0000_s4155" name="Equation" r:id="rId7" imgW="2882880" imgH="838080" progId="Equation.DSMT4">
                   <p:embed/>
                 </p:oleObj>
               </mc:Choice>
@@ -11370,7 +13042,7 @@
           <a:graphicData uri="http://schemas.openxmlformats.org/presentationml/2006/ole">
             <mc:AlternateContent xmlns:mc="http://schemas.openxmlformats.org/markup-compatibility/2006">
               <mc:Choice xmlns:v="urn:schemas-microsoft-com:vml" Requires="v">
-                <p:oleObj spid="_x0000_s4147" name="Equation" r:id="rId9" imgW="1778000" imgH="469900" progId="Equation.3">
+                <p:oleObj spid="_x0000_s4156" name="Equation" r:id="rId9" imgW="1778000" imgH="469900" progId="Equation.3">
                   <p:embed/>
                 </p:oleObj>
               </mc:Choice>
@@ -11415,6 +13087,13 @@
   <p:clrMapOvr>
     <a:masterClrMapping/>
   </p:clrMapOvr>
+  <p:timing>
+    <p:tnLst>
+      <p:par>
+        <p:cTn xmlns:p14="http://schemas.microsoft.com/office/powerpoint/2010/main" id="1" dur="indefinite" restart="never" nodeType="tmRoot"/>
+      </p:par>
+    </p:tnLst>
+  </p:timing>
 </p:sld>
 </file>
 
@@ -11594,6 +13273,13 @@
   <p:clrMapOvr>
     <a:masterClrMapping/>
   </p:clrMapOvr>
+  <p:timing>
+    <p:tnLst>
+      <p:par>
+        <p:cTn xmlns:p14="http://schemas.microsoft.com/office/powerpoint/2010/main" id="1" dur="indefinite" restart="never" nodeType="tmRoot"/>
+      </p:par>
+    </p:tnLst>
+  </p:timing>
 </p:sld>
 </file>
 
@@ -11782,46 +13468,23 @@
             <a:pPr lvl="1"/>
             <a:r>
               <a:rPr lang="en-US" dirty="0" smtClean="0"/>
-              <a:t>Perform some exploratory analysis and discuss with your neighbors.</a:t>
-            </a:r>
+              <a:t>Perform some exploratory analysis and discuss with your neighbors</a:t>
+            </a:r>
+            <a:r>
+              <a:rPr lang="en-US" dirty="0" smtClean="0"/>
+              <a:t>.</a:t>
+            </a:r>
+            <a:endParaRPr lang="en-US" dirty="0"/>
           </a:p>
           <a:p>
             <a:pPr lvl="1"/>
             <a:r>
-              <a:rPr lang="en-US" dirty="0" smtClean="0">
-                <a:solidFill>
-                  <a:srgbClr val="FF0000"/>
-                </a:solidFill>
-              </a:rPr>
-              <a:t>Image of </a:t>
-            </a:r>
-            <a:r>
-              <a:rPr lang="en-US" dirty="0" err="1" smtClean="0">
-                <a:solidFill>
-                  <a:srgbClr val="FF0000"/>
-                </a:solidFill>
-              </a:rPr>
-              <a:t>nw</a:t>
-            </a:r>
-            <a:endParaRPr lang="en-US" dirty="0" smtClean="0">
-              <a:solidFill>
-                <a:srgbClr val="FF0000"/>
-              </a:solidFill>
-            </a:endParaRPr>
-          </a:p>
-          <a:p>
-            <a:pPr lvl="1"/>
-            <a:r>
-              <a:rPr lang="en-US" dirty="0" smtClean="0"/>
-              <a:t>Fit this </a:t>
-            </a:r>
-            <a:r>
-              <a:rPr lang="en-US" dirty="0" smtClean="0"/>
-              <a:t>individual effects model </a:t>
-            </a:r>
-            <a:r>
-              <a:rPr lang="en-US" dirty="0" smtClean="0"/>
-              <a:t>with </a:t>
+              <a:rPr lang="en-US" dirty="0" smtClean="0"/>
+              <a:t>Fit </a:t>
+            </a:r>
+            <a:r>
+              <a:rPr lang="en-US" dirty="0" smtClean="0"/>
+              <a:t>this individual effects model with </a:t>
             </a:r>
           </a:p>
           <a:p>
@@ -11853,6 +13516,36 @@
           </a:p>
         </p:txBody>
       </p:sp>
+      <p:pic>
+        <p:nvPicPr>
+          <p:cNvPr id="5" name="Picture 4" descr="samp_plot.png"/>
+          <p:cNvPicPr>
+            <a:picLocks noChangeAspect="1"/>
+          </p:cNvPicPr>
+          <p:nvPr/>
+        </p:nvPicPr>
+        <p:blipFill>
+          <a:blip r:embed="rId2">
+            <a:extLst>
+              <a:ext uri="{28A0092B-C50C-407E-A947-70E740481C1C}">
+                <a14:useLocalDpi xmlns:a14="http://schemas.microsoft.com/office/drawing/2010/main" val="0"/>
+              </a:ext>
+            </a:extLst>
+          </a:blip>
+          <a:stretch>
+            <a:fillRect/>
+          </a:stretch>
+        </p:blipFill>
+        <p:spPr>
+          <a:xfrm>
+            <a:off x="7195559" y="3322193"/>
+            <a:ext cx="2963833" cy="2643603"/>
+          </a:xfrm>
+          <a:prstGeom prst="rect">
+            <a:avLst/>
+          </a:prstGeom>
+        </p:spPr>
+      </p:pic>
     </p:spTree>
     <p:extLst>
       <p:ext uri="{BB962C8B-B14F-4D97-AF65-F5344CB8AC3E}">
@@ -11863,6 +13556,13 @@
   <p:clrMapOvr>
     <a:masterClrMapping/>
   </p:clrMapOvr>
+  <p:timing>
+    <p:tnLst>
+      <p:par>
+        <p:cTn xmlns:p14="http://schemas.microsoft.com/office/powerpoint/2010/main" id="1" dur="indefinite" restart="never" nodeType="tmRoot"/>
+      </p:par>
+    </p:tnLst>
+  </p:timing>
 </p:sld>
 </file>
 
@@ -11918,7 +13618,12 @@
             <p:ph sz="half" idx="1"/>
           </p:nvPr>
         </p:nvSpPr>
-        <p:spPr/>
+        <p:spPr>
+          <a:xfrm>
+            <a:off x="1097278" y="1349440"/>
+            <a:ext cx="4937760" cy="4519654"/>
+          </a:xfrm>
+        </p:spPr>
         <p:txBody>
           <a:bodyPr/>
           <a:lstStyle/>
@@ -12047,44 +13752,37 @@
           </a:p>
           <a:p>
             <a:r>
-              <a:rPr lang="en-US" dirty="0" smtClean="0">
+              <a:rPr lang="en-US" sz="1400" dirty="0" err="1" smtClean="0">
                 <a:solidFill>
-                  <a:schemeClr val="accent2">
-                    <a:lumMod val="50000"/>
-                    <a:lumOff val="50000"/>
-                  </a:schemeClr>
+                  <a:srgbClr val="404040"/>
                 </a:solidFill>
-              </a:rPr>
-              <a:t>Image of </a:t>
-            </a:r>
-            <a:r>
-              <a:rPr lang="en-US" dirty="0" err="1" smtClean="0">
+                <a:latin typeface="Courier"/>
+                <a:cs typeface="Courier"/>
+              </a:rPr>
+              <a:t>samplike</a:t>
+            </a:r>
+            <a:r>
+              <a:rPr lang="en-US" sz="1400" dirty="0" smtClean="0">
                 <a:solidFill>
-                  <a:schemeClr val="accent2">
-                    <a:lumMod val="50000"/>
-                    <a:lumOff val="50000"/>
-                  </a:schemeClr>
+                  <a:srgbClr val="404040"/>
                 </a:solidFill>
-              </a:rPr>
-              <a:t>coefs</a:t>
-            </a:r>
-            <a:endParaRPr lang="en-US" dirty="0" smtClean="0">
+                <a:latin typeface="Courier"/>
+                <a:cs typeface="Courier"/>
+              </a:rPr>
+              <a:t> ~ edges + sender + receiver + mutual</a:t>
+            </a:r>
+            <a:endParaRPr lang="en-US" sz="1400" dirty="0" smtClean="0">
               <a:solidFill>
-                <a:schemeClr val="accent2">
-                  <a:lumMod val="50000"/>
-                  <a:lumOff val="50000"/>
-                </a:schemeClr>
+                <a:srgbClr val="404040"/>
               </a:solidFill>
+              <a:latin typeface="Courier"/>
+              <a:cs typeface="Courier"/>
             </a:endParaRPr>
           </a:p>
           <a:p>
             <a:r>
               <a:rPr lang="en-US" dirty="0" smtClean="0"/>
-              <a:t>As you can see, </a:t>
-            </a:r>
-            <a:r>
-              <a:rPr lang="en-US" dirty="0" smtClean="0"/>
-              <a:t>the individual effects and p</a:t>
+              <a:t>As you can see, the individual effects and p</a:t>
             </a:r>
             <a:r>
               <a:rPr lang="en-US" baseline="-25000" dirty="0" smtClean="0"/>
@@ -12092,19 +13790,7 @@
             </a:r>
             <a:r>
               <a:rPr lang="en-US" dirty="0" smtClean="0"/>
-              <a:t> models include </a:t>
-            </a:r>
-            <a:r>
-              <a:rPr lang="en-US" dirty="0" smtClean="0"/>
-              <a:t>many parameters, which </a:t>
-            </a:r>
-            <a:r>
-              <a:rPr lang="en-US" dirty="0" smtClean="0"/>
-              <a:t>are </a:t>
-            </a:r>
-            <a:r>
-              <a:rPr lang="en-US" dirty="0" smtClean="0"/>
-              <a:t>specific to the network in question. </a:t>
+              <a:t> models include many parameters, which are specific to the network in question. </a:t>
             </a:r>
           </a:p>
           <a:p>
@@ -12116,6 +13802,35 @@
           </a:p>
         </p:txBody>
       </p:sp>
+      <p:pic>
+        <p:nvPicPr>
+          <p:cNvPr id="5" name="Picture 4" descr="samp_p1coefs.png"/>
+          <p:cNvPicPr>
+            <a:picLocks noChangeAspect="1"/>
+          </p:cNvPicPr>
+          <p:nvPr/>
+        </p:nvPicPr>
+        <p:blipFill rotWithShape="1">
+          <a:blip r:embed="rId2">
+            <a:extLst>
+              <a:ext uri="{28A0092B-C50C-407E-A947-70E740481C1C}">
+                <a14:useLocalDpi xmlns:a14="http://schemas.microsoft.com/office/drawing/2010/main" val="0"/>
+              </a:ext>
+            </a:extLst>
+          </a:blip>
+          <a:srcRect b="51544"/>
+          <a:stretch/>
+        </p:blipFill>
+        <p:spPr>
+          <a:xfrm>
+            <a:off x="6988309" y="3970997"/>
+            <a:ext cx="3000590" cy="2233688"/>
+          </a:xfrm>
+          <a:prstGeom prst="rect">
+            <a:avLst/>
+          </a:prstGeom>
+        </p:spPr>
+      </p:pic>
     </p:spTree>
     <p:extLst>
       <p:ext uri="{BB962C8B-B14F-4D97-AF65-F5344CB8AC3E}">
@@ -12126,6 +13841,13 @@
   <p:clrMapOvr>
     <a:masterClrMapping/>
   </p:clrMapOvr>
+  <p:timing>
+    <p:tnLst>
+      <p:par>
+        <p:cTn xmlns:p14="http://schemas.microsoft.com/office/powerpoint/2010/main" id="1" dur="indefinite" restart="never" nodeType="tmRoot"/>
+      </p:par>
+    </p:tnLst>
+  </p:timing>
 </p:sld>
 </file>
 
@@ -12628,9 +14350,224 @@
   <p:timing>
     <p:tnLst>
       <p:par>
-        <p:cTn id="1" dur="indefinite" restart="never" nodeType="tmRoot"/>
+        <p:cTn xmlns:p14="http://schemas.microsoft.com/office/powerpoint/2010/main" id="1" dur="indefinite" restart="never" nodeType="tmRoot">
+          <p:childTnLst>
+            <p:seq concurrent="1" nextAc="seek">
+              <p:cTn id="2" dur="indefinite" nodeType="mainSeq">
+                <p:childTnLst>
+                  <p:par>
+                    <p:cTn id="3" fill="hold">
+                      <p:stCondLst>
+                        <p:cond delay="indefinite"/>
+                      </p:stCondLst>
+                      <p:childTnLst>
+                        <p:par>
+                          <p:cTn id="4" fill="hold">
+                            <p:stCondLst>
+                              <p:cond delay="0"/>
+                            </p:stCondLst>
+                            <p:childTnLst>
+                              <p:par>
+                                <p:cTn id="5" presetID="1" presetClass="entr" presetSubtype="0" fill="hold" grpId="0" nodeType="clickEffect">
+                                  <p:stCondLst>
+                                    <p:cond delay="0"/>
+                                  </p:stCondLst>
+                                  <p:childTnLst>
+                                    <p:set>
+                                      <p:cBhvr>
+                                        <p:cTn id="6" dur="1" fill="hold">
+                                          <p:stCondLst>
+                                            <p:cond delay="0"/>
+                                          </p:stCondLst>
+                                        </p:cTn>
+                                        <p:tgtEl>
+                                          <p:spTgt spid="3">
+                                            <p:txEl>
+                                              <p:pRg st="0" end="0"/>
+                                            </p:txEl>
+                                          </p:spTgt>
+                                        </p:tgtEl>
+                                        <p:attrNameLst>
+                                          <p:attrName>style.visibility</p:attrName>
+                                        </p:attrNameLst>
+                                      </p:cBhvr>
+                                      <p:to>
+                                        <p:strVal val="visible"/>
+                                      </p:to>
+                                    </p:set>
+                                  </p:childTnLst>
+                                </p:cTn>
+                              </p:par>
+                            </p:childTnLst>
+                          </p:cTn>
+                        </p:par>
+                      </p:childTnLst>
+                    </p:cTn>
+                  </p:par>
+                  <p:par>
+                    <p:cTn id="7" fill="hold">
+                      <p:stCondLst>
+                        <p:cond delay="indefinite"/>
+                      </p:stCondLst>
+                      <p:childTnLst>
+                        <p:par>
+                          <p:cTn id="8" fill="hold">
+                            <p:stCondLst>
+                              <p:cond delay="0"/>
+                            </p:stCondLst>
+                            <p:childTnLst>
+                              <p:par>
+                                <p:cTn id="9" presetID="1" presetClass="entr" presetSubtype="0" fill="hold" nodeType="clickEffect">
+                                  <p:stCondLst>
+                                    <p:cond delay="0"/>
+                                  </p:stCondLst>
+                                  <p:childTnLst>
+                                    <p:set>
+                                      <p:cBhvr>
+                                        <p:cTn id="10" dur="1" fill="hold">
+                                          <p:stCondLst>
+                                            <p:cond delay="0"/>
+                                          </p:stCondLst>
+                                        </p:cTn>
+                                        <p:tgtEl>
+                                          <p:spTgt spid="7"/>
+                                        </p:tgtEl>
+                                        <p:attrNameLst>
+                                          <p:attrName>style.visibility</p:attrName>
+                                        </p:attrNameLst>
+                                      </p:cBhvr>
+                                      <p:to>
+                                        <p:strVal val="visible"/>
+                                      </p:to>
+                                    </p:set>
+                                  </p:childTnLst>
+                                </p:cTn>
+                              </p:par>
+                            </p:childTnLst>
+                          </p:cTn>
+                        </p:par>
+                      </p:childTnLst>
+                    </p:cTn>
+                  </p:par>
+                  <p:par>
+                    <p:cTn id="11" fill="hold">
+                      <p:stCondLst>
+                        <p:cond delay="indefinite"/>
+                      </p:stCondLst>
+                      <p:childTnLst>
+                        <p:par>
+                          <p:cTn id="12" fill="hold">
+                            <p:stCondLst>
+                              <p:cond delay="0"/>
+                            </p:stCondLst>
+                            <p:childTnLst>
+                              <p:par>
+                                <p:cTn id="13" presetID="1" presetClass="entr" presetSubtype="0" fill="hold" grpId="0" nodeType="clickEffect">
+                                  <p:stCondLst>
+                                    <p:cond delay="0"/>
+                                  </p:stCondLst>
+                                  <p:childTnLst>
+                                    <p:set>
+                                      <p:cBhvr>
+                                        <p:cTn id="14" dur="1" fill="hold">
+                                          <p:stCondLst>
+                                            <p:cond delay="0"/>
+                                          </p:stCondLst>
+                                        </p:cTn>
+                                        <p:tgtEl>
+                                          <p:spTgt spid="4">
+                                            <p:txEl>
+                                              <p:pRg st="0" end="0"/>
+                                            </p:txEl>
+                                          </p:spTgt>
+                                        </p:tgtEl>
+                                        <p:attrNameLst>
+                                          <p:attrName>style.visibility</p:attrName>
+                                        </p:attrNameLst>
+                                      </p:cBhvr>
+                                      <p:to>
+                                        <p:strVal val="visible"/>
+                                      </p:to>
+                                    </p:set>
+                                  </p:childTnLst>
+                                </p:cTn>
+                              </p:par>
+                            </p:childTnLst>
+                          </p:cTn>
+                        </p:par>
+                      </p:childTnLst>
+                    </p:cTn>
+                  </p:par>
+                  <p:par>
+                    <p:cTn id="15" fill="hold">
+                      <p:stCondLst>
+                        <p:cond delay="indefinite"/>
+                      </p:stCondLst>
+                      <p:childTnLst>
+                        <p:par>
+                          <p:cTn id="16" fill="hold">
+                            <p:stCondLst>
+                              <p:cond delay="0"/>
+                            </p:stCondLst>
+                            <p:childTnLst>
+                              <p:par>
+                                <p:cTn id="17" presetID="1" presetClass="entr" presetSubtype="0" fill="hold" nodeType="clickEffect">
+                                  <p:stCondLst>
+                                    <p:cond delay="0"/>
+                                  </p:stCondLst>
+                                  <p:childTnLst>
+                                    <p:set>
+                                      <p:cBhvr>
+                                        <p:cTn id="18" dur="1" fill="hold">
+                                          <p:stCondLst>
+                                            <p:cond delay="0"/>
+                                          </p:stCondLst>
+                                        </p:cTn>
+                                        <p:tgtEl>
+                                          <p:spTgt spid="6"/>
+                                        </p:tgtEl>
+                                        <p:attrNameLst>
+                                          <p:attrName>style.visibility</p:attrName>
+                                        </p:attrNameLst>
+                                      </p:cBhvr>
+                                      <p:to>
+                                        <p:strVal val="visible"/>
+                                      </p:to>
+                                    </p:set>
+                                  </p:childTnLst>
+                                </p:cTn>
+                              </p:par>
+                            </p:childTnLst>
+                          </p:cTn>
+                        </p:par>
+                      </p:childTnLst>
+                    </p:cTn>
+                  </p:par>
+                </p:childTnLst>
+              </p:cTn>
+              <p:prevCondLst>
+                <p:cond evt="onPrev" delay="0">
+                  <p:tgtEl>
+                    <p:sldTgt/>
+                  </p:tgtEl>
+                </p:cond>
+              </p:prevCondLst>
+              <p:nextCondLst>
+                <p:cond evt="onNext" delay="0">
+                  <p:tgtEl>
+                    <p:sldTgt/>
+                  </p:tgtEl>
+                </p:cond>
+              </p:nextCondLst>
+            </p:seq>
+          </p:childTnLst>
+        </p:cTn>
       </p:par>
     </p:tnLst>
+    <p:bldLst>
+      <p:bldP spid="3" grpId="0" build="p"/>
+      <p:bldP spid="4" grpId="0" build="p"/>
+    </p:bldLst>
   </p:timing>
 </p:sld>
 </file>
@@ -13825,7 +15762,7 @@
   <p:timing>
     <p:tnLst>
       <p:par>
-        <p:cTn id="1" dur="indefinite" restart="never" nodeType="tmRoot"/>
+        <p:cTn xmlns:p14="http://schemas.microsoft.com/office/powerpoint/2010/main" id="1" dur="indefinite" restart="never" nodeType="tmRoot"/>
       </p:par>
     </p:tnLst>
   </p:timing>
@@ -13941,7 +15878,7 @@
   <p:timing>
     <p:tnLst>
       <p:par>
-        <p:cTn id="1" dur="indefinite" restart="never" nodeType="tmRoot"/>
+        <p:cTn xmlns:p14="http://schemas.microsoft.com/office/powerpoint/2010/main" id="1" dur="indefinite" restart="never" nodeType="tmRoot"/>
       </p:par>
     </p:tnLst>
   </p:timing>
@@ -14498,7 +16435,7 @@
   <p:timing>
     <p:tnLst>
       <p:par>
-        <p:cTn id="1" dur="indefinite" restart="never" nodeType="tmRoot"/>
+        <p:cTn xmlns:p14="http://schemas.microsoft.com/office/powerpoint/2010/main" id="1" dur="indefinite" restart="never" nodeType="tmRoot"/>
       </p:par>
     </p:tnLst>
   </p:timing>
@@ -14952,7 +16889,7 @@
   <p:timing>
     <p:tnLst>
       <p:par>
-        <p:cTn id="1" dur="indefinite" restart="never" nodeType="tmRoot"/>
+        <p:cTn xmlns:p14="http://schemas.microsoft.com/office/powerpoint/2010/main" id="1" dur="indefinite" restart="never" nodeType="tmRoot"/>
       </p:par>
     </p:tnLst>
   </p:timing>
@@ -15038,8 +16975,8 @@
         </p:nvSpPr>
         <p:spPr>
           <a:xfrm>
-            <a:off x="1097280" y="2077079"/>
-            <a:ext cx="4791891" cy="3883455"/>
+            <a:off x="1097280" y="2077080"/>
+            <a:ext cx="4791891" cy="3003461"/>
           </a:xfrm>
         </p:spPr>
         <p:txBody>
@@ -15114,17 +17051,13 @@
             </a:pPr>
             <a:r>
               <a:rPr lang="en-US" dirty="0" smtClean="0"/>
-              <a:t>Review and further topics</a:t>
-            </a:r>
-          </a:p>
-          <a:p>
-            <a:pPr marL="0" indent="0">
-              <a:buNone/>
-            </a:pPr>
-            <a:r>
-              <a:rPr lang="en-US" dirty="0" smtClean="0"/>
-              <a:t>See the supplemental materials for more background and examples on each of these topics</a:t>
-            </a:r>
+              <a:t>Review and further </a:t>
+            </a:r>
+            <a:r>
+              <a:rPr lang="en-US" dirty="0" smtClean="0"/>
+              <a:t>topics</a:t>
+            </a:r>
+            <a:endParaRPr lang="en-US" dirty="0" smtClean="0"/>
           </a:p>
         </p:txBody>
       </p:sp>
@@ -15153,6 +17086,67 @@
           </a:graphicData>
         </a:graphic>
       </p:graphicFrame>
+      <p:sp>
+        <p:nvSpPr>
+          <p:cNvPr id="4" name="TextBox 3"/>
+          <p:cNvSpPr txBox="1"/>
+          <p:nvPr/>
+        </p:nvSpPr>
+        <p:spPr>
+          <a:xfrm>
+            <a:off x="1036375" y="5314129"/>
+            <a:ext cx="4860743" cy="1292662"/>
+          </a:xfrm>
+          <a:prstGeom prst="rect">
+            <a:avLst/>
+          </a:prstGeom>
+          <a:noFill/>
+        </p:spPr>
+        <p:txBody>
+          <a:bodyPr wrap="square" rtlCol="0">
+            <a:spAutoFit/>
+          </a:bodyPr>
+          <a:lstStyle/>
+          <a:p>
+            <a:r>
+              <a:rPr lang="en-US" sz="2000" dirty="0">
+                <a:solidFill>
+                  <a:schemeClr val="tx1">
+                    <a:lumMod val="75000"/>
+                    <a:lumOff val="25000"/>
+                  </a:schemeClr>
+                </a:solidFill>
+              </a:rPr>
+              <a:t>See the supplemental </a:t>
+            </a:r>
+            <a:r>
+              <a:rPr lang="en-US" sz="2000" dirty="0" smtClean="0">
+                <a:solidFill>
+                  <a:schemeClr val="tx1">
+                    <a:lumMod val="75000"/>
+                    <a:lumOff val="25000"/>
+                  </a:schemeClr>
+                </a:solidFill>
+              </a:rPr>
+              <a:t>workshop materials </a:t>
+            </a:r>
+            <a:r>
+              <a:rPr lang="en-US" sz="2000" dirty="0">
+                <a:solidFill>
+                  <a:schemeClr val="tx1">
+                    <a:lumMod val="75000"/>
+                    <a:lumOff val="25000"/>
+                  </a:schemeClr>
+                </a:solidFill>
+              </a:rPr>
+              <a:t>for more background and examples on each of these topics</a:t>
+            </a:r>
+          </a:p>
+          <a:p>
+            <a:endParaRPr lang="en-US" dirty="0"/>
+          </a:p>
+        </p:txBody>
+      </p:sp>
     </p:spTree>
     <p:extLst>
       <p:ext uri="{BB962C8B-B14F-4D97-AF65-F5344CB8AC3E}">
@@ -15166,9 +17160,80 @@
   <p:timing>
     <p:tnLst>
       <p:par>
-        <p:cTn id="1" dur="indefinite" restart="never" nodeType="tmRoot"/>
+        <p:cTn xmlns:p14="http://schemas.microsoft.com/office/powerpoint/2010/main" id="1" dur="indefinite" restart="never" nodeType="tmRoot">
+          <p:childTnLst>
+            <p:seq concurrent="1" nextAc="seek">
+              <p:cTn id="2" dur="indefinite" nodeType="mainSeq">
+                <p:childTnLst>
+                  <p:par>
+                    <p:cTn id="3" fill="hold">
+                      <p:stCondLst>
+                        <p:cond delay="indefinite"/>
+                      </p:stCondLst>
+                      <p:childTnLst>
+                        <p:par>
+                          <p:cTn id="4" fill="hold">
+                            <p:stCondLst>
+                              <p:cond delay="0"/>
+                            </p:stCondLst>
+                            <p:childTnLst>
+                              <p:par>
+                                <p:cTn id="5" presetID="1" presetClass="entr" presetSubtype="0" fill="hold" grpId="0" nodeType="clickEffect">
+                                  <p:stCondLst>
+                                    <p:cond delay="0"/>
+                                  </p:stCondLst>
+                                  <p:childTnLst>
+                                    <p:set>
+                                      <p:cBhvr>
+                                        <p:cTn id="6" dur="1" fill="hold">
+                                          <p:stCondLst>
+                                            <p:cond delay="0"/>
+                                          </p:stCondLst>
+                                        </p:cTn>
+                                        <p:tgtEl>
+                                          <p:spTgt spid="4"/>
+                                        </p:tgtEl>
+                                        <p:attrNameLst>
+                                          <p:attrName>style.visibility</p:attrName>
+                                        </p:attrNameLst>
+                                      </p:cBhvr>
+                                      <p:to>
+                                        <p:strVal val="visible"/>
+                                      </p:to>
+                                    </p:set>
+                                  </p:childTnLst>
+                                </p:cTn>
+                              </p:par>
+                            </p:childTnLst>
+                          </p:cTn>
+                        </p:par>
+                      </p:childTnLst>
+                    </p:cTn>
+                  </p:par>
+                </p:childTnLst>
+              </p:cTn>
+              <p:prevCondLst>
+                <p:cond evt="onPrev" delay="0">
+                  <p:tgtEl>
+                    <p:sldTgt/>
+                  </p:tgtEl>
+                </p:cond>
+              </p:prevCondLst>
+              <p:nextCondLst>
+                <p:cond evt="onNext" delay="0">
+                  <p:tgtEl>
+                    <p:sldTgt/>
+                  </p:tgtEl>
+                </p:cond>
+              </p:nextCondLst>
+            </p:seq>
+          </p:childTnLst>
+        </p:cTn>
       </p:par>
     </p:tnLst>
+    <p:bldLst>
+      <p:bldP spid="4" grpId="0"/>
+    </p:bldLst>
   </p:timing>
 </p:sld>
 </file>
@@ -15486,9 +17551,208 @@
   <p:timing>
     <p:tnLst>
       <p:par>
-        <p:cTn id="1" dur="indefinite" restart="never" nodeType="tmRoot"/>
+        <p:cTn xmlns:p14="http://schemas.microsoft.com/office/powerpoint/2010/main" id="1" dur="indefinite" restart="never" nodeType="tmRoot">
+          <p:childTnLst>
+            <p:seq concurrent="1" nextAc="seek">
+              <p:cTn id="2" dur="indefinite" nodeType="mainSeq">
+                <p:childTnLst>
+                  <p:par>
+                    <p:cTn id="3" fill="hold">
+                      <p:stCondLst>
+                        <p:cond delay="indefinite"/>
+                      </p:stCondLst>
+                      <p:childTnLst>
+                        <p:par>
+                          <p:cTn id="4" fill="hold">
+                            <p:stCondLst>
+                              <p:cond delay="0"/>
+                            </p:stCondLst>
+                            <p:childTnLst>
+                              <p:par>
+                                <p:cTn id="5" presetID="1" presetClass="entr" presetSubtype="0" fill="hold" grpId="0" nodeType="clickEffect">
+                                  <p:stCondLst>
+                                    <p:cond delay="0"/>
+                                  </p:stCondLst>
+                                  <p:childTnLst>
+                                    <p:set>
+                                      <p:cBhvr>
+                                        <p:cTn id="6" dur="1" fill="hold">
+                                          <p:stCondLst>
+                                            <p:cond delay="0"/>
+                                          </p:stCondLst>
+                                        </p:cTn>
+                                        <p:tgtEl>
+                                          <p:spTgt spid="4">
+                                            <p:txEl>
+                                              <p:pRg st="0" end="0"/>
+                                            </p:txEl>
+                                          </p:spTgt>
+                                        </p:tgtEl>
+                                        <p:attrNameLst>
+                                          <p:attrName>style.visibility</p:attrName>
+                                        </p:attrNameLst>
+                                      </p:cBhvr>
+                                      <p:to>
+                                        <p:strVal val="visible"/>
+                                      </p:to>
+                                    </p:set>
+                                  </p:childTnLst>
+                                </p:cTn>
+                              </p:par>
+                              <p:par>
+                                <p:cTn id="7" presetID="1" presetClass="entr" presetSubtype="0" fill="hold" grpId="0" nodeType="withEffect">
+                                  <p:stCondLst>
+                                    <p:cond delay="0"/>
+                                  </p:stCondLst>
+                                  <p:childTnLst>
+                                    <p:set>
+                                      <p:cBhvr>
+                                        <p:cTn id="8" dur="1" fill="hold">
+                                          <p:stCondLst>
+                                            <p:cond delay="0"/>
+                                          </p:stCondLst>
+                                        </p:cTn>
+                                        <p:tgtEl>
+                                          <p:spTgt spid="4">
+                                            <p:txEl>
+                                              <p:pRg st="1" end="1"/>
+                                            </p:txEl>
+                                          </p:spTgt>
+                                        </p:tgtEl>
+                                        <p:attrNameLst>
+                                          <p:attrName>style.visibility</p:attrName>
+                                        </p:attrNameLst>
+                                      </p:cBhvr>
+                                      <p:to>
+                                        <p:strVal val="visible"/>
+                                      </p:to>
+                                    </p:set>
+                                  </p:childTnLst>
+                                </p:cTn>
+                              </p:par>
+                              <p:par>
+                                <p:cTn id="9" presetID="1" presetClass="entr" presetSubtype="0" fill="hold" grpId="0" nodeType="withEffect">
+                                  <p:stCondLst>
+                                    <p:cond delay="0"/>
+                                  </p:stCondLst>
+                                  <p:childTnLst>
+                                    <p:set>
+                                      <p:cBhvr>
+                                        <p:cTn id="10" dur="1" fill="hold">
+                                          <p:stCondLst>
+                                            <p:cond delay="0"/>
+                                          </p:stCondLst>
+                                        </p:cTn>
+                                        <p:tgtEl>
+                                          <p:spTgt spid="4">
+                                            <p:txEl>
+                                              <p:pRg st="2" end="2"/>
+                                            </p:txEl>
+                                          </p:spTgt>
+                                        </p:tgtEl>
+                                        <p:attrNameLst>
+                                          <p:attrName>style.visibility</p:attrName>
+                                        </p:attrNameLst>
+                                      </p:cBhvr>
+                                      <p:to>
+                                        <p:strVal val="visible"/>
+                                      </p:to>
+                                    </p:set>
+                                  </p:childTnLst>
+                                </p:cTn>
+                              </p:par>
+                              <p:par>
+                                <p:cTn id="11" presetID="1" presetClass="entr" presetSubtype="0" fill="hold" grpId="0" nodeType="withEffect">
+                                  <p:stCondLst>
+                                    <p:cond delay="0"/>
+                                  </p:stCondLst>
+                                  <p:childTnLst>
+                                    <p:set>
+                                      <p:cBhvr>
+                                        <p:cTn id="12" dur="1" fill="hold">
+                                          <p:stCondLst>
+                                            <p:cond delay="0"/>
+                                          </p:stCondLst>
+                                        </p:cTn>
+                                        <p:tgtEl>
+                                          <p:spTgt spid="4">
+                                            <p:txEl>
+                                              <p:pRg st="3" end="3"/>
+                                            </p:txEl>
+                                          </p:spTgt>
+                                        </p:tgtEl>
+                                        <p:attrNameLst>
+                                          <p:attrName>style.visibility</p:attrName>
+                                        </p:attrNameLst>
+                                      </p:cBhvr>
+                                      <p:to>
+                                        <p:strVal val="visible"/>
+                                      </p:to>
+                                    </p:set>
+                                  </p:childTnLst>
+                                </p:cTn>
+                              </p:par>
+                              <p:par>
+                                <p:cTn id="13" presetID="1" presetClass="entr" presetSubtype="0" fill="hold" grpId="0" nodeType="withEffect">
+                                  <p:stCondLst>
+                                    <p:cond delay="0"/>
+                                  </p:stCondLst>
+                                  <p:childTnLst>
+                                    <p:set>
+                                      <p:cBhvr>
+                                        <p:cTn id="14" dur="1" fill="hold">
+                                          <p:stCondLst>
+                                            <p:cond delay="0"/>
+                                          </p:stCondLst>
+                                        </p:cTn>
+                                        <p:tgtEl>
+                                          <p:spTgt spid="4">
+                                            <p:txEl>
+                                              <p:pRg st="4" end="4"/>
+                                            </p:txEl>
+                                          </p:spTgt>
+                                        </p:tgtEl>
+                                        <p:attrNameLst>
+                                          <p:attrName>style.visibility</p:attrName>
+                                        </p:attrNameLst>
+                                      </p:cBhvr>
+                                      <p:to>
+                                        <p:strVal val="visible"/>
+                                      </p:to>
+                                    </p:set>
+                                  </p:childTnLst>
+                                </p:cTn>
+                              </p:par>
+                            </p:childTnLst>
+                          </p:cTn>
+                        </p:par>
+                      </p:childTnLst>
+                    </p:cTn>
+                  </p:par>
+                </p:childTnLst>
+              </p:cTn>
+              <p:prevCondLst>
+                <p:cond evt="onPrev" delay="0">
+                  <p:tgtEl>
+                    <p:sldTgt/>
+                  </p:tgtEl>
+                </p:cond>
+              </p:prevCondLst>
+              <p:nextCondLst>
+                <p:cond evt="onNext" delay="0">
+                  <p:tgtEl>
+                    <p:sldTgt/>
+                  </p:tgtEl>
+                </p:cond>
+              </p:nextCondLst>
+            </p:seq>
+          </p:childTnLst>
+        </p:cTn>
       </p:par>
     </p:tnLst>
+    <p:bldLst>
+      <p:bldP spid="4" grpId="0" build="p"/>
+    </p:bldLst>
   </p:timing>
 </p:sld>
 </file>
@@ -15770,7 +18034,7 @@
   <a:extraClrSchemeLst/>
   <a:extLst>
     <a:ext uri="{05A4C25C-085E-4340-85A3-A5531E510DB2}">
-      <thm15:themeFamily xmlns:thm15="http://schemas.microsoft.com/office/thememl/2012/main" name="Retrospect" id="{5F128B03-DCCA-4EEB-AB3B-CF2899314A46}" vid="{02006FA4-1611-4B07-AF7F-85CF6D20EB3E}"/>
+      <thm15:themeFamily xmlns:thm15="http://schemas.microsoft.com/office/thememl/2012/main" xmlns="" name="Retrospect" id="{5F128B03-DCCA-4EEB-AB3B-CF2899314A46}" vid="{02006FA4-1611-4B07-AF7F-85CF6D20EB3E}"/>
     </a:ext>
   </a:extLst>
 </a:theme>

</xml_diff>